<commit_message>
update week5 part 02
</commit_message>
<xml_diff>
--- a/docs/Lectures/Week05/Week05_Park02.pptx
+++ b/docs/Lectures/Week05/Week05_Park02.pptx
@@ -5,10 +5,10 @@
     <p:sldMasterId id="2147483685" r:id="rId1"/>
   </p:sldMasterIdLst>
   <p:notesMasterIdLst>
-    <p:notesMasterId r:id="rId12"/>
+    <p:notesMasterId r:id="rId22"/>
   </p:notesMasterIdLst>
   <p:handoutMasterIdLst>
-    <p:handoutMasterId r:id="rId13"/>
+    <p:handoutMasterId r:id="rId23"/>
   </p:handoutMasterIdLst>
   <p:sldIdLst>
     <p:sldId id="256" r:id="rId2"/>
@@ -16,11 +16,21 @@
     <p:sldId id="323" r:id="rId4"/>
     <p:sldId id="341" r:id="rId5"/>
     <p:sldId id="328" r:id="rId6"/>
-    <p:sldId id="327" r:id="rId7"/>
-    <p:sldId id="326" r:id="rId8"/>
-    <p:sldId id="330" r:id="rId9"/>
-    <p:sldId id="331" r:id="rId10"/>
-    <p:sldId id="332" r:id="rId11"/>
+    <p:sldId id="342" r:id="rId7"/>
+    <p:sldId id="343" r:id="rId8"/>
+    <p:sldId id="344" r:id="rId9"/>
+    <p:sldId id="345" r:id="rId10"/>
+    <p:sldId id="346" r:id="rId11"/>
+    <p:sldId id="347" r:id="rId12"/>
+    <p:sldId id="348" r:id="rId13"/>
+    <p:sldId id="349" r:id="rId14"/>
+    <p:sldId id="350" r:id="rId15"/>
+    <p:sldId id="351" r:id="rId16"/>
+    <p:sldId id="327" r:id="rId17"/>
+    <p:sldId id="326" r:id="rId18"/>
+    <p:sldId id="330" r:id="rId19"/>
+    <p:sldId id="331" r:id="rId20"/>
+    <p:sldId id="332" r:id="rId21"/>
   </p:sldIdLst>
   <p:sldSz cx="12192000" cy="6858000"/>
   <p:notesSz cx="6858000" cy="9144000"/>
@@ -221,7 +231,7 @@
           <a:p>
             <a:fld id="{3AF106B3-F2DA-48D3-8BC9-D8AF4A5AEC52}" type="datetimeFigureOut">
               <a:rPr lang="en-US" smtClean="0"/>
-              <a:t>2/9/2025</a:t>
+              <a:t>2/10/2025</a:t>
             </a:fld>
             <a:endParaRPr lang="en-US"/>
           </a:p>
@@ -399,7 +409,7 @@
           <a:p>
             <a:fld id="{F12EB5DA-1790-4C4A-B092-095C6475A200}" type="datetimeFigureOut">
               <a:rPr lang="en-US" smtClean="0"/>
-              <a:t>2/9/2025</a:t>
+              <a:t>2/10/2025</a:t>
             </a:fld>
             <a:endParaRPr lang="en-US"/>
           </a:p>
@@ -904,7 +914,7 @@
           <a:p>
             <a:fld id="{ED291B17-9318-49DB-B28B-6E5994AE9581}" type="datetime1">
               <a:rPr lang="en-US" smtClean="0"/>
-              <a:t>2/9/2025</a:t>
+              <a:t>2/10/2025</a:t>
             </a:fld>
             <a:endParaRPr lang="en-US" dirty="0"/>
           </a:p>
@@ -1107,7 +1117,7 @@
           <a:p>
             <a:fld id="{2CED4963-E985-44C4-B8C4-FDD613B7C2F8}" type="datetime1">
               <a:rPr lang="en-US" smtClean="0"/>
-              <a:t>2/9/2025</a:t>
+              <a:t>2/10/2025</a:t>
             </a:fld>
             <a:endParaRPr lang="en-US" dirty="0"/>
           </a:p>
@@ -1468,7 +1478,7 @@
           <a:p>
             <a:fld id="{ED291B17-9318-49DB-B28B-6E5994AE9581}" type="datetime1">
               <a:rPr lang="en-US" smtClean="0"/>
-              <a:t>2/9/2025</a:t>
+              <a:t>2/10/2025</a:t>
             </a:fld>
             <a:endParaRPr lang="en-US" dirty="0"/>
           </a:p>
@@ -1664,7 +1674,7 @@
           <a:p>
             <a:fld id="{78DD82B9-B8EE-4375-B6FF-88FA6ABB15D9}" type="datetime1">
               <a:rPr lang="en-US" smtClean="0"/>
-              <a:t>2/9/2025</a:t>
+              <a:t>2/10/2025</a:t>
             </a:fld>
             <a:endParaRPr lang="en-US" dirty="0"/>
           </a:p>
@@ -1975,7 +1985,7 @@
           <a:p>
             <a:fld id="{B2497495-0637-405E-AE64-5CC7506D51F5}" type="datetime1">
               <a:rPr lang="en-US" smtClean="0"/>
-              <a:t>2/9/2025</a:t>
+              <a:t>2/10/2025</a:t>
             </a:fld>
             <a:endParaRPr lang="en-US" dirty="0"/>
           </a:p>
@@ -2225,7 +2235,7 @@
           <a:p>
             <a:fld id="{7BFFD690-9426-415D-8B65-26881E07B2D4}" type="datetime1">
               <a:rPr lang="en-US" smtClean="0"/>
-              <a:t>2/9/2025</a:t>
+              <a:t>2/10/2025</a:t>
             </a:fld>
             <a:endParaRPr lang="en-US" dirty="0"/>
           </a:p>
@@ -2644,7 +2654,7 @@
           <a:p>
             <a:fld id="{04C4989A-474C-40DE-95B9-011C28B71673}" type="datetime1">
               <a:rPr lang="en-US" smtClean="0"/>
-              <a:t>2/9/2025</a:t>
+              <a:t>2/10/2025</a:t>
             </a:fld>
             <a:endParaRPr lang="en-US" dirty="0"/>
           </a:p>
@@ -2766,7 +2776,7 @@
           <a:p>
             <a:fld id="{5DB4ED54-5B5E-4A04-93D3-5772E3CE3818}" type="datetime1">
               <a:rPr lang="en-US" smtClean="0"/>
-              <a:t>2/9/2025</a:t>
+              <a:t>2/10/2025</a:t>
             </a:fld>
             <a:endParaRPr lang="en-US" dirty="0"/>
           </a:p>
@@ -2861,7 +2871,7 @@
           <a:p>
             <a:fld id="{4EDE50D6-574B-40AF-946F-D52A04ADE379}" type="datetime1">
               <a:rPr lang="en-US" smtClean="0"/>
-              <a:t>2/9/2025</a:t>
+              <a:t>2/10/2025</a:t>
             </a:fld>
             <a:endParaRPr lang="en-US" dirty="0"/>
           </a:p>
@@ -3236,7 +3246,7 @@
           <a:p>
             <a:fld id="{D82884F1-FFEA-405F-9602-3DCA865EDA4E}" type="datetime1">
               <a:rPr lang="en-US" smtClean="0"/>
-              <a:t>2/9/2025</a:t>
+              <a:t>2/10/2025</a:t>
             </a:fld>
             <a:endParaRPr lang="en-US" dirty="0"/>
           </a:p>
@@ -3527,7 +3537,7 @@
           <a:p>
             <a:fld id="{7E18DB4A-8810-4A10-AD5C-D5E2C667F5B3}" type="datetime1">
               <a:rPr lang="en-US" smtClean="0"/>
-              <a:t>2/9/2025</a:t>
+              <a:t>2/10/2025</a:t>
             </a:fld>
             <a:endParaRPr lang="en-US" dirty="0"/>
           </a:p>
@@ -3740,7 +3750,7 @@
           <a:p>
             <a:fld id="{ED291B17-9318-49DB-B28B-6E5994AE9581}" type="datetime1">
               <a:rPr lang="en-US" smtClean="0"/>
-              <a:t>2/9/2025</a:t>
+              <a:t>2/10/2025</a:t>
             </a:fld>
             <a:endParaRPr lang="en-US" dirty="0"/>
           </a:p>
@@ -4819,10 +4829,1378 @@
       </p:grpSpPr>
       <p:sp>
         <p:nvSpPr>
+          <p:cNvPr id="3" name="Content Placeholder 2">
+            <a:extLst>
+              <a:ext uri="{FF2B5EF4-FFF2-40B4-BE49-F238E27FC236}">
+                <a16:creationId xmlns:a16="http://schemas.microsoft.com/office/drawing/2014/main" id="{FA1B1DC5-5C8F-51D6-2B65-9F6B52B8848E}"/>
+              </a:ext>
+            </a:extLst>
+          </p:cNvPr>
+          <p:cNvSpPr>
+            <a:spLocks noGrp="1"/>
+          </p:cNvSpPr>
+          <p:nvPr>
+            <p:ph idx="1"/>
+          </p:nvPr>
+        </p:nvSpPr>
+        <p:spPr>
+          <a:xfrm>
+            <a:off x="581192" y="1426464"/>
+            <a:ext cx="11029615" cy="2697861"/>
+          </a:xfrm>
+        </p:spPr>
+        <p:txBody>
+          <a:bodyPr>
+            <a:normAutofit/>
+          </a:bodyPr>
+          <a:lstStyle/>
+          <a:p>
+            <a:r>
+              <a:rPr lang="en-US" sz="2000" dirty="0"/>
+              <a:t>List express subway stations within 50 meters of one-way major streets.</a:t>
+            </a:r>
+          </a:p>
+          <a:p>
+            <a:pPr marL="324000" lvl="1" indent="0">
+              <a:buNone/>
+            </a:pPr>
+            <a:r>
+              <a:rPr lang="en-US" sz="2000" dirty="0">
+                <a:solidFill>
+                  <a:srgbClr val="00B0F0"/>
+                </a:solidFill>
+              </a:rPr>
+              <a:t>SELECT </a:t>
+            </a:r>
+            <a:r>
+              <a:rPr lang="en-US" sz="2000" dirty="0" err="1">
+                <a:solidFill>
+                  <a:srgbClr val="00B0F0"/>
+                </a:solidFill>
+              </a:rPr>
+              <a:t>station_name</a:t>
+            </a:r>
+            <a:r>
+              <a:rPr lang="en-US" sz="2000" dirty="0">
+                <a:solidFill>
+                  <a:srgbClr val="00B0F0"/>
+                </a:solidFill>
+              </a:rPr>
+              <a:t>, name AS </a:t>
+            </a:r>
+            <a:r>
+              <a:rPr lang="en-US" sz="2000" dirty="0" err="1">
+                <a:solidFill>
+                  <a:srgbClr val="00B0F0"/>
+                </a:solidFill>
+              </a:rPr>
+              <a:t>street_name</a:t>
+            </a:r>
+            <a:endParaRPr lang="en-US" sz="2000" dirty="0">
+              <a:solidFill>
+                <a:srgbClr val="00B0F0"/>
+              </a:solidFill>
+            </a:endParaRPr>
+          </a:p>
+          <a:p>
+            <a:pPr marL="324000" lvl="1" indent="0">
+              <a:buNone/>
+            </a:pPr>
+            <a:r>
+              <a:rPr lang="en-US" sz="2000" dirty="0">
+                <a:solidFill>
+                  <a:srgbClr val="00B0F0"/>
+                </a:solidFill>
+              </a:rPr>
+              <a:t>FROM ch05.subway, ch05.streets</a:t>
+            </a:r>
+          </a:p>
+          <a:p>
+            <a:pPr marL="324000" lvl="1" indent="0">
+              <a:buNone/>
+            </a:pPr>
+            <a:r>
+              <a:rPr lang="en-US" sz="2000" dirty="0">
+                <a:solidFill>
+                  <a:srgbClr val="00B0F0"/>
+                </a:solidFill>
+              </a:rPr>
+              <a:t>WHERE </a:t>
+            </a:r>
+            <a:r>
+              <a:rPr lang="en-US" sz="2000" dirty="0" err="1">
+                <a:solidFill>
+                  <a:srgbClr val="00B0F0"/>
+                </a:solidFill>
+              </a:rPr>
+              <a:t>express_stop</a:t>
+            </a:r>
+            <a:r>
+              <a:rPr lang="en-US" sz="2000" dirty="0">
+                <a:solidFill>
+                  <a:srgbClr val="00B0F0"/>
+                </a:solidFill>
+              </a:rPr>
+              <a:t> = '</a:t>
+            </a:r>
+            <a:r>
+              <a:rPr lang="en-US" sz="2000" dirty="0" err="1">
+                <a:solidFill>
+                  <a:srgbClr val="00B0F0"/>
+                </a:solidFill>
+              </a:rPr>
+              <a:t>Yes'AND</a:t>
+            </a:r>
+            <a:r>
+              <a:rPr lang="en-US" sz="2000" dirty="0">
+                <a:solidFill>
+                  <a:srgbClr val="00B0F0"/>
+                </a:solidFill>
+              </a:rPr>
+              <a:t> </a:t>
+            </a:r>
+            <a:r>
+              <a:rPr lang="en-US" sz="2000" dirty="0" err="1">
+                <a:solidFill>
+                  <a:srgbClr val="00B0F0"/>
+                </a:solidFill>
+              </a:rPr>
+              <a:t>road_type</a:t>
+            </a:r>
+            <a:r>
+              <a:rPr lang="en-US" sz="2000" dirty="0">
+                <a:solidFill>
+                  <a:srgbClr val="00B0F0"/>
+                </a:solidFill>
+              </a:rPr>
+              <a:t> = '</a:t>
+            </a:r>
+            <a:r>
+              <a:rPr lang="en-US" sz="2000" dirty="0" err="1">
+                <a:solidFill>
+                  <a:srgbClr val="00B0F0"/>
+                </a:solidFill>
+              </a:rPr>
+              <a:t>Major'AND</a:t>
+            </a:r>
+            <a:r>
+              <a:rPr lang="en-US" sz="2000" dirty="0">
+                <a:solidFill>
+                  <a:srgbClr val="00B0F0"/>
+                </a:solidFill>
+              </a:rPr>
+              <a:t> </a:t>
+            </a:r>
+            <a:r>
+              <a:rPr lang="en-US" sz="2000" dirty="0" err="1">
+                <a:solidFill>
+                  <a:srgbClr val="00B0F0"/>
+                </a:solidFill>
+              </a:rPr>
+              <a:t>oneway</a:t>
+            </a:r>
+            <a:r>
+              <a:rPr lang="en-US" sz="2000" dirty="0">
+                <a:solidFill>
+                  <a:srgbClr val="00B0F0"/>
+                </a:solidFill>
+              </a:rPr>
+              <a:t> = '</a:t>
+            </a:r>
+            <a:r>
+              <a:rPr lang="en-US" sz="2000" dirty="0" err="1">
+                <a:solidFill>
+                  <a:srgbClr val="00B0F0"/>
+                </a:solidFill>
+              </a:rPr>
+              <a:t>Yes'AND</a:t>
+            </a:r>
+            <a:r>
+              <a:rPr lang="en-US" sz="2000" dirty="0">
+                <a:solidFill>
+                  <a:srgbClr val="00B0F0"/>
+                </a:solidFill>
+              </a:rPr>
+              <a:t> </a:t>
+            </a:r>
+            <a:r>
+              <a:rPr lang="en-US" sz="2000" dirty="0" err="1">
+                <a:solidFill>
+                  <a:srgbClr val="00B0F0"/>
+                </a:solidFill>
+              </a:rPr>
+              <a:t>ST_Intersects</a:t>
+            </a:r>
+            <a:r>
+              <a:rPr lang="en-US" sz="2000" dirty="0">
+                <a:solidFill>
+                  <a:srgbClr val="00B0F0"/>
+                </a:solidFill>
+              </a:rPr>
+              <a:t>(</a:t>
+            </a:r>
+            <a:r>
+              <a:rPr lang="en-US" sz="2000" dirty="0" err="1">
+                <a:solidFill>
+                  <a:srgbClr val="00B0F0"/>
+                </a:solidFill>
+              </a:rPr>
+              <a:t>ST_Buffer</a:t>
+            </a:r>
+            <a:r>
+              <a:rPr lang="en-US" sz="2000" dirty="0">
+                <a:solidFill>
+                  <a:srgbClr val="00B0F0"/>
+                </a:solidFill>
+              </a:rPr>
+              <a:t>(ch05.subway.geom, 50), ch05.streets.geom);</a:t>
+            </a:r>
+          </a:p>
+        </p:txBody>
+      </p:sp>
+      <p:sp>
+        <p:nvSpPr>
+          <p:cNvPr id="4" name="TextBox 3">
+            <a:extLst>
+              <a:ext uri="{FF2B5EF4-FFF2-40B4-BE49-F238E27FC236}">
+                <a16:creationId xmlns:a16="http://schemas.microsoft.com/office/drawing/2014/main" id="{315A5990-DC54-DDC4-3634-E4DBE02D943E}"/>
+              </a:ext>
+            </a:extLst>
+          </p:cNvPr>
+          <p:cNvSpPr txBox="1"/>
+          <p:nvPr/>
+        </p:nvSpPr>
+        <p:spPr>
+          <a:xfrm>
+            <a:off x="504992" y="743916"/>
+            <a:ext cx="5514808" cy="523220"/>
+          </a:xfrm>
+          <a:prstGeom prst="rect">
+            <a:avLst/>
+          </a:prstGeom>
+          <a:noFill/>
+        </p:spPr>
+        <p:txBody>
+          <a:bodyPr wrap="square" rtlCol="0">
+            <a:spAutoFit/>
+          </a:bodyPr>
+          <a:lstStyle/>
+          <a:p>
+            <a:r>
+              <a:rPr lang="en-US" sz="2800" dirty="0"/>
+              <a:t>Exercise</a:t>
+            </a:r>
+            <a:r>
+              <a:rPr lang="en-US" altLang="zh-CN" sz="2800" dirty="0"/>
+              <a:t> 3</a:t>
+            </a:r>
+            <a:r>
+              <a:rPr lang="en-US" sz="2800" dirty="0"/>
+              <a:t>: </a:t>
+            </a:r>
+            <a:r>
+              <a:rPr lang="en-US" sz="2800" dirty="0" err="1"/>
+              <a:t>ST_Intersects</a:t>
+            </a:r>
+            <a:endParaRPr lang="en-US" sz="2800" dirty="0"/>
+          </a:p>
+        </p:txBody>
+      </p:sp>
+    </p:spTree>
+    <p:extLst>
+      <p:ext uri="{BB962C8B-B14F-4D97-AF65-F5344CB8AC3E}">
+        <p14:creationId xmlns:p14="http://schemas.microsoft.com/office/powerpoint/2010/main" val="3127353908"/>
+      </p:ext>
+    </p:extLst>
+  </p:cSld>
+  <p:clrMapOvr>
+    <a:masterClrMapping/>
+  </p:clrMapOvr>
+</p:sld>
+</file>
+
+<file path=ppt/slides/slide11.xml><?xml version="1.0" encoding="utf-8"?>
+<p:sld xmlns:a="http://schemas.openxmlformats.org/drawingml/2006/main" xmlns:r="http://schemas.openxmlformats.org/officeDocument/2006/relationships" xmlns:p="http://schemas.openxmlformats.org/presentationml/2006/main">
+  <p:cSld>
+    <p:spTree>
+      <p:nvGrpSpPr>
+        <p:cNvPr id="1" name=""/>
+        <p:cNvGrpSpPr/>
+        <p:nvPr/>
+      </p:nvGrpSpPr>
+      <p:grpSpPr>
+        <a:xfrm>
+          <a:off x="0" y="0"/>
+          <a:ext cx="0" cy="0"/>
+          <a:chOff x="0" y="0"/>
+          <a:chExt cx="0" cy="0"/>
+        </a:xfrm>
+      </p:grpSpPr>
+      <p:sp>
+        <p:nvSpPr>
+          <p:cNvPr id="3" name="Content Placeholder 2">
+            <a:extLst>
+              <a:ext uri="{FF2B5EF4-FFF2-40B4-BE49-F238E27FC236}">
+                <a16:creationId xmlns:a16="http://schemas.microsoft.com/office/drawing/2014/main" id="{6E4898B9-733B-2765-4ABA-D82A5BB6E3E1}"/>
+              </a:ext>
+            </a:extLst>
+          </p:cNvPr>
+          <p:cNvSpPr>
+            <a:spLocks noGrp="1"/>
+          </p:cNvSpPr>
+          <p:nvPr>
+            <p:ph idx="1"/>
+          </p:nvPr>
+        </p:nvSpPr>
+        <p:spPr>
+          <a:xfrm>
+            <a:off x="581192" y="1426463"/>
+            <a:ext cx="5324308" cy="1535811"/>
+          </a:xfrm>
+        </p:spPr>
+        <p:txBody>
+          <a:bodyPr>
+            <a:normAutofit/>
+          </a:bodyPr>
+          <a:lstStyle/>
+          <a:p>
+            <a:r>
+              <a:rPr lang="en-US" dirty="0" err="1">
+                <a:solidFill>
+                  <a:srgbClr val="00B0F0"/>
+                </a:solidFill>
+              </a:rPr>
+              <a:t>ST_Intersects</a:t>
+            </a:r>
+            <a:r>
+              <a:rPr lang="en-US" dirty="0">
+                <a:solidFill>
+                  <a:srgbClr val="00B0F0"/>
+                </a:solidFill>
+              </a:rPr>
+              <a:t>(geometry A, geometry B) </a:t>
+            </a:r>
+            <a:r>
+              <a:rPr lang="en-US" dirty="0"/>
+              <a:t>returns (TRUE) if the two shapes have any space in common, i.e., if their boundaries or interiors intersect.</a:t>
+            </a:r>
+          </a:p>
+        </p:txBody>
+      </p:sp>
+      <p:sp>
+        <p:nvSpPr>
+          <p:cNvPr id="4" name="TextBox 3">
+            <a:extLst>
+              <a:ext uri="{FF2B5EF4-FFF2-40B4-BE49-F238E27FC236}">
+                <a16:creationId xmlns:a16="http://schemas.microsoft.com/office/drawing/2014/main" id="{3A2B8C12-A13E-D171-01EF-EB91FBC41DAD}"/>
+              </a:ext>
+            </a:extLst>
+          </p:cNvPr>
+          <p:cNvSpPr txBox="1"/>
+          <p:nvPr/>
+        </p:nvSpPr>
+        <p:spPr>
+          <a:xfrm>
+            <a:off x="581192" y="621040"/>
+            <a:ext cx="2542310" cy="523220"/>
+          </a:xfrm>
+          <a:prstGeom prst="rect">
+            <a:avLst/>
+          </a:prstGeom>
+          <a:noFill/>
+        </p:spPr>
+        <p:txBody>
+          <a:bodyPr wrap="square" rtlCol="0">
+            <a:spAutoFit/>
+          </a:bodyPr>
+          <a:lstStyle/>
+          <a:p>
+            <a:r>
+              <a:rPr lang="en-US" sz="2800" dirty="0" err="1"/>
+              <a:t>ST_Disjoint</a:t>
+            </a:r>
+            <a:endParaRPr lang="en-US" sz="2800" dirty="0"/>
+          </a:p>
+        </p:txBody>
+      </p:sp>
+      <p:pic>
+        <p:nvPicPr>
+          <p:cNvPr id="7" name="Picture 6">
+            <a:extLst>
+              <a:ext uri="{FF2B5EF4-FFF2-40B4-BE49-F238E27FC236}">
+                <a16:creationId xmlns:a16="http://schemas.microsoft.com/office/drawing/2014/main" id="{4E534A10-2292-DDE3-1763-57297070F733}"/>
+              </a:ext>
+            </a:extLst>
+          </p:cNvPr>
+          <p:cNvPicPr>
+            <a:picLocks noChangeAspect="1"/>
+          </p:cNvPicPr>
+          <p:nvPr/>
+        </p:nvPicPr>
+        <p:blipFill>
+          <a:blip r:embed="rId2"/>
+          <a:stretch>
+            <a:fillRect/>
+          </a:stretch>
+        </p:blipFill>
+        <p:spPr>
+          <a:xfrm>
+            <a:off x="6953249" y="748252"/>
+            <a:ext cx="4391025" cy="5563629"/>
+          </a:xfrm>
+          <a:prstGeom prst="rect">
+            <a:avLst/>
+          </a:prstGeom>
+        </p:spPr>
+      </p:pic>
+    </p:spTree>
+    <p:extLst>
+      <p:ext uri="{BB962C8B-B14F-4D97-AF65-F5344CB8AC3E}">
+        <p14:creationId xmlns:p14="http://schemas.microsoft.com/office/powerpoint/2010/main" val="3482726137"/>
+      </p:ext>
+    </p:extLst>
+  </p:cSld>
+  <p:clrMapOvr>
+    <a:masterClrMapping/>
+  </p:clrMapOvr>
+</p:sld>
+</file>
+
+<file path=ppt/slides/slide12.xml><?xml version="1.0" encoding="utf-8"?>
+<p:sld xmlns:a="http://schemas.openxmlformats.org/drawingml/2006/main" xmlns:r="http://schemas.openxmlformats.org/officeDocument/2006/relationships" xmlns:p="http://schemas.openxmlformats.org/presentationml/2006/main">
+  <p:cSld>
+    <p:spTree>
+      <p:nvGrpSpPr>
+        <p:cNvPr id="1" name=""/>
+        <p:cNvGrpSpPr/>
+        <p:nvPr/>
+      </p:nvGrpSpPr>
+      <p:grpSpPr>
+        <a:xfrm>
+          <a:off x="0" y="0"/>
+          <a:ext cx="0" cy="0"/>
+          <a:chOff x="0" y="0"/>
+          <a:chExt cx="0" cy="0"/>
+        </a:xfrm>
+      </p:grpSpPr>
+      <p:sp>
+        <p:nvSpPr>
+          <p:cNvPr id="5" name="Content Placeholder 4">
+            <a:extLst>
+              <a:ext uri="{FF2B5EF4-FFF2-40B4-BE49-F238E27FC236}">
+                <a16:creationId xmlns:a16="http://schemas.microsoft.com/office/drawing/2014/main" id="{0DEA7FD2-61CD-8E59-CFBE-9C4EF7358AF2}"/>
+              </a:ext>
+            </a:extLst>
+          </p:cNvPr>
+          <p:cNvSpPr txBox="1">
+            <a:spLocks noGrp="1"/>
+          </p:cNvSpPr>
+          <p:nvPr>
+            <p:ph idx="1"/>
+          </p:nvPr>
+        </p:nvSpPr>
+        <p:spPr>
+          <a:xfrm>
+            <a:off x="580858" y="1452061"/>
+            <a:ext cx="11029950" cy="2631490"/>
+          </a:xfrm>
+          <a:prstGeom prst="rect">
+            <a:avLst/>
+          </a:prstGeom>
+          <a:noFill/>
+        </p:spPr>
+        <p:txBody>
+          <a:bodyPr wrap="square" rtlCol="0">
+            <a:spAutoFit/>
+          </a:bodyPr>
+          <a:lstStyle/>
+          <a:p>
+            <a:r>
+              <a:rPr lang="en-US" sz="2000" dirty="0"/>
+              <a:t>Find streets that do not intersect with any subway station.</a:t>
+            </a:r>
+          </a:p>
+          <a:p>
+            <a:pPr marL="324000" lvl="1" indent="0">
+              <a:buNone/>
+            </a:pPr>
+            <a:r>
+              <a:rPr lang="en-US" sz="2000" dirty="0">
+                <a:solidFill>
+                  <a:srgbClr val="00B0F0"/>
+                </a:solidFill>
+              </a:rPr>
+              <a:t>SELECT name</a:t>
+            </a:r>
+          </a:p>
+          <a:p>
+            <a:pPr marL="324000" lvl="1" indent="0">
+              <a:buNone/>
+            </a:pPr>
+            <a:r>
+              <a:rPr lang="en-US" sz="2000" dirty="0">
+                <a:solidFill>
+                  <a:srgbClr val="00B0F0"/>
+                </a:solidFill>
+              </a:rPr>
+              <a:t>FROM ch05.streets</a:t>
+            </a:r>
+          </a:p>
+          <a:p>
+            <a:pPr marL="324000" lvl="1" indent="0">
+              <a:buNone/>
+            </a:pPr>
+            <a:r>
+              <a:rPr lang="en-US" sz="2000" dirty="0">
+                <a:solidFill>
+                  <a:srgbClr val="00B0F0"/>
+                </a:solidFill>
+              </a:rPr>
+              <a:t>WHERE NOT EXISTS (</a:t>
+            </a:r>
+          </a:p>
+          <a:p>
+            <a:pPr marL="324000" lvl="1" indent="0">
+              <a:buNone/>
+            </a:pPr>
+            <a:r>
+              <a:rPr lang="en-US" sz="2000" dirty="0">
+                <a:solidFill>
+                  <a:srgbClr val="00B0F0"/>
+                </a:solidFill>
+              </a:rPr>
+              <a:t>SELECT 1 FROM ch05.subway </a:t>
+            </a:r>
+          </a:p>
+          <a:p>
+            <a:pPr marL="324000" lvl="1" indent="0">
+              <a:buNone/>
+            </a:pPr>
+            <a:r>
+              <a:rPr lang="en-US" sz="2000" dirty="0">
+                <a:solidFill>
+                  <a:srgbClr val="00B0F0"/>
+                </a:solidFill>
+              </a:rPr>
+              <a:t>WHERE </a:t>
+            </a:r>
+            <a:r>
+              <a:rPr lang="en-US" sz="2000" dirty="0" err="1">
+                <a:solidFill>
+                  <a:srgbClr val="00B0F0"/>
+                </a:solidFill>
+              </a:rPr>
+              <a:t>ST_Disjoint</a:t>
+            </a:r>
+            <a:r>
+              <a:rPr lang="en-US" sz="2000" dirty="0">
+                <a:solidFill>
+                  <a:srgbClr val="00B0F0"/>
+                </a:solidFill>
+              </a:rPr>
+              <a:t>(ch05.streets.geom, </a:t>
+            </a:r>
+            <a:r>
+              <a:rPr lang="en-US" sz="2000" dirty="0" err="1">
+                <a:solidFill>
+                  <a:srgbClr val="00B0F0"/>
+                </a:solidFill>
+              </a:rPr>
+              <a:t>ST_Buffer</a:t>
+            </a:r>
+            <a:r>
+              <a:rPr lang="en-US" sz="2000" dirty="0">
+                <a:solidFill>
+                  <a:srgbClr val="00B0F0"/>
+                </a:solidFill>
+              </a:rPr>
+              <a:t>(ch05.subway.geom, 50)) = FALSE);</a:t>
+            </a:r>
+          </a:p>
+        </p:txBody>
+      </p:sp>
+      <p:sp>
+        <p:nvSpPr>
+          <p:cNvPr id="4" name="TextBox 3">
+            <a:extLst>
+              <a:ext uri="{FF2B5EF4-FFF2-40B4-BE49-F238E27FC236}">
+                <a16:creationId xmlns:a16="http://schemas.microsoft.com/office/drawing/2014/main" id="{484B1751-F76A-2FBB-FCFC-16D4EF8C2F07}"/>
+              </a:ext>
+            </a:extLst>
+          </p:cNvPr>
+          <p:cNvSpPr txBox="1"/>
+          <p:nvPr/>
+        </p:nvSpPr>
+        <p:spPr>
+          <a:xfrm>
+            <a:off x="504992" y="743916"/>
+            <a:ext cx="5514808" cy="523220"/>
+          </a:xfrm>
+          <a:prstGeom prst="rect">
+            <a:avLst/>
+          </a:prstGeom>
+          <a:noFill/>
+        </p:spPr>
+        <p:txBody>
+          <a:bodyPr wrap="square" rtlCol="0">
+            <a:spAutoFit/>
+          </a:bodyPr>
+          <a:lstStyle/>
+          <a:p>
+            <a:r>
+              <a:rPr lang="en-US" sz="2800" dirty="0"/>
+              <a:t>Example</a:t>
+            </a:r>
+            <a:r>
+              <a:rPr lang="en-US" altLang="zh-CN" sz="2800" dirty="0"/>
+              <a:t> 1</a:t>
+            </a:r>
+            <a:r>
+              <a:rPr lang="en-US" sz="2800" dirty="0"/>
+              <a:t>: </a:t>
+            </a:r>
+            <a:r>
+              <a:rPr lang="en-US" sz="2800" dirty="0" err="1"/>
+              <a:t>ST_Disjoint</a:t>
+            </a:r>
+            <a:endParaRPr lang="en-US" sz="2800" dirty="0"/>
+          </a:p>
+        </p:txBody>
+      </p:sp>
+    </p:spTree>
+    <p:extLst>
+      <p:ext uri="{BB962C8B-B14F-4D97-AF65-F5344CB8AC3E}">
+        <p14:creationId xmlns:p14="http://schemas.microsoft.com/office/powerpoint/2010/main" val="43407044"/>
+      </p:ext>
+    </p:extLst>
+  </p:cSld>
+  <p:clrMapOvr>
+    <a:masterClrMapping/>
+  </p:clrMapOvr>
+</p:sld>
+</file>
+
+<file path=ppt/slides/slide13.xml><?xml version="1.0" encoding="utf-8"?>
+<p:sld xmlns:a="http://schemas.openxmlformats.org/drawingml/2006/main" xmlns:r="http://schemas.openxmlformats.org/officeDocument/2006/relationships" xmlns:p="http://schemas.openxmlformats.org/presentationml/2006/main">
+  <p:cSld>
+    <p:spTree>
+      <p:nvGrpSpPr>
+        <p:cNvPr id="1" name=""/>
+        <p:cNvGrpSpPr/>
+        <p:nvPr/>
+      </p:nvGrpSpPr>
+      <p:grpSpPr>
+        <a:xfrm>
+          <a:off x="0" y="0"/>
+          <a:ext cx="0" cy="0"/>
+          <a:chOff x="0" y="0"/>
+          <a:chExt cx="0" cy="0"/>
+        </a:xfrm>
+      </p:grpSpPr>
+      <p:sp>
+        <p:nvSpPr>
+          <p:cNvPr id="3" name="Content Placeholder 2">
+            <a:extLst>
+              <a:ext uri="{FF2B5EF4-FFF2-40B4-BE49-F238E27FC236}">
+                <a16:creationId xmlns:a16="http://schemas.microsoft.com/office/drawing/2014/main" id="{2F9E5E82-3C5D-323F-970D-EF112FB5DA03}"/>
+              </a:ext>
+            </a:extLst>
+          </p:cNvPr>
+          <p:cNvSpPr>
+            <a:spLocks noGrp="1"/>
+          </p:cNvSpPr>
+          <p:nvPr>
+            <p:ph idx="1"/>
+          </p:nvPr>
+        </p:nvSpPr>
+        <p:spPr>
+          <a:xfrm>
+            <a:off x="581191" y="1416938"/>
+            <a:ext cx="11029615" cy="3288411"/>
+          </a:xfrm>
+        </p:spPr>
+        <p:txBody>
+          <a:bodyPr>
+            <a:noAutofit/>
+          </a:bodyPr>
+          <a:lstStyle/>
+          <a:p>
+            <a:r>
+              <a:rPr lang="en-US" sz="2000" dirty="0"/>
+              <a:t>List one-way streets that do not intersect with any subway station.</a:t>
+            </a:r>
+          </a:p>
+          <a:p>
+            <a:pPr marL="324000" lvl="1" indent="0">
+              <a:buNone/>
+            </a:pPr>
+            <a:r>
+              <a:rPr lang="en-US" sz="1800" dirty="0">
+                <a:solidFill>
+                  <a:srgbClr val="00B0F0"/>
+                </a:solidFill>
+              </a:rPr>
+              <a:t>SELECT name</a:t>
+            </a:r>
+          </a:p>
+          <a:p>
+            <a:pPr marL="324000" lvl="1" indent="0">
+              <a:buNone/>
+            </a:pPr>
+            <a:r>
+              <a:rPr lang="en-US" sz="1800" dirty="0">
+                <a:solidFill>
+                  <a:srgbClr val="00B0F0"/>
+                </a:solidFill>
+              </a:rPr>
+              <a:t>FROM ch05.streets</a:t>
+            </a:r>
+          </a:p>
+          <a:p>
+            <a:pPr marL="324000" lvl="1" indent="0">
+              <a:buNone/>
+            </a:pPr>
+            <a:r>
+              <a:rPr lang="en-US" sz="1800" dirty="0">
+                <a:solidFill>
+                  <a:srgbClr val="00B0F0"/>
+                </a:solidFill>
+              </a:rPr>
+              <a:t>WHERE </a:t>
+            </a:r>
+            <a:r>
+              <a:rPr lang="en-US" sz="1800" dirty="0" err="1">
+                <a:solidFill>
+                  <a:srgbClr val="00B0F0"/>
+                </a:solidFill>
+              </a:rPr>
+              <a:t>oneway</a:t>
+            </a:r>
+            <a:r>
+              <a:rPr lang="en-US" sz="1800" dirty="0">
+                <a:solidFill>
+                  <a:srgbClr val="00B0F0"/>
+                </a:solidFill>
+              </a:rPr>
+              <a:t> = 'Yes’</a:t>
+            </a:r>
+          </a:p>
+          <a:p>
+            <a:pPr marL="324000" lvl="1" indent="0">
+              <a:buNone/>
+            </a:pPr>
+            <a:r>
+              <a:rPr lang="en-US" sz="1800" dirty="0">
+                <a:solidFill>
+                  <a:srgbClr val="00B0F0"/>
+                </a:solidFill>
+              </a:rPr>
+              <a:t>AND NOT EXISTS ( </a:t>
+            </a:r>
+          </a:p>
+          <a:p>
+            <a:pPr marL="324000" lvl="1" indent="0">
+              <a:buNone/>
+            </a:pPr>
+            <a:r>
+              <a:rPr lang="en-US" sz="1800" dirty="0">
+                <a:solidFill>
+                  <a:srgbClr val="00B0F0"/>
+                </a:solidFill>
+              </a:rPr>
+              <a:t>SELECT 1 FROM ch05.subway </a:t>
+            </a:r>
+          </a:p>
+          <a:p>
+            <a:pPr marL="324000" lvl="1" indent="0">
+              <a:buNone/>
+            </a:pPr>
+            <a:r>
+              <a:rPr lang="en-US" sz="1800" dirty="0">
+                <a:solidFill>
+                  <a:srgbClr val="00B0F0"/>
+                </a:solidFill>
+              </a:rPr>
+              <a:t>WHERE </a:t>
+            </a:r>
+            <a:r>
+              <a:rPr lang="en-US" sz="1800" dirty="0" err="1">
+                <a:solidFill>
+                  <a:srgbClr val="00B0F0"/>
+                </a:solidFill>
+              </a:rPr>
+              <a:t>ST_Disjoint</a:t>
+            </a:r>
+            <a:r>
+              <a:rPr lang="en-US" sz="1800" dirty="0">
+                <a:solidFill>
+                  <a:srgbClr val="00B0F0"/>
+                </a:solidFill>
+              </a:rPr>
+              <a:t>(ch05.streets.geom, </a:t>
+            </a:r>
+            <a:r>
+              <a:rPr lang="en-US" sz="1800" dirty="0" err="1">
+                <a:solidFill>
+                  <a:srgbClr val="00B0F0"/>
+                </a:solidFill>
+              </a:rPr>
+              <a:t>ST_Buffer</a:t>
+            </a:r>
+            <a:r>
+              <a:rPr lang="en-US" sz="1800" dirty="0">
+                <a:solidFill>
+                  <a:srgbClr val="00B0F0"/>
+                </a:solidFill>
+              </a:rPr>
+              <a:t>(ch05.subway.geom, 50)) = FALSE);</a:t>
+            </a:r>
+          </a:p>
+        </p:txBody>
+      </p:sp>
+      <p:sp>
+        <p:nvSpPr>
+          <p:cNvPr id="4" name="TextBox 3">
+            <a:extLst>
+              <a:ext uri="{FF2B5EF4-FFF2-40B4-BE49-F238E27FC236}">
+                <a16:creationId xmlns:a16="http://schemas.microsoft.com/office/drawing/2014/main" id="{DE421040-9A45-B9E1-81EB-4AC79DC7CF67}"/>
+              </a:ext>
+            </a:extLst>
+          </p:cNvPr>
+          <p:cNvSpPr txBox="1"/>
+          <p:nvPr/>
+        </p:nvSpPr>
+        <p:spPr>
+          <a:xfrm>
+            <a:off x="504992" y="743916"/>
+            <a:ext cx="5514808" cy="523220"/>
+          </a:xfrm>
+          <a:prstGeom prst="rect">
+            <a:avLst/>
+          </a:prstGeom>
+          <a:noFill/>
+        </p:spPr>
+        <p:txBody>
+          <a:bodyPr wrap="square" rtlCol="0">
+            <a:spAutoFit/>
+          </a:bodyPr>
+          <a:lstStyle/>
+          <a:p>
+            <a:r>
+              <a:rPr lang="en-US" sz="2800" dirty="0"/>
+              <a:t>Exercise</a:t>
+            </a:r>
+            <a:r>
+              <a:rPr lang="en-US" altLang="zh-CN" sz="2800" dirty="0"/>
+              <a:t> 1</a:t>
+            </a:r>
+            <a:r>
+              <a:rPr lang="en-US" sz="2800" dirty="0"/>
+              <a:t>: </a:t>
+            </a:r>
+            <a:r>
+              <a:rPr lang="en-US" sz="2800" dirty="0" err="1"/>
+              <a:t>ST_Disjoint</a:t>
+            </a:r>
+            <a:endParaRPr lang="en-US" sz="2800" dirty="0"/>
+          </a:p>
+        </p:txBody>
+      </p:sp>
+    </p:spTree>
+    <p:extLst>
+      <p:ext uri="{BB962C8B-B14F-4D97-AF65-F5344CB8AC3E}">
+        <p14:creationId xmlns:p14="http://schemas.microsoft.com/office/powerpoint/2010/main" val="964224813"/>
+      </p:ext>
+    </p:extLst>
+  </p:cSld>
+  <p:clrMapOvr>
+    <a:masterClrMapping/>
+  </p:clrMapOvr>
+</p:sld>
+</file>
+
+<file path=ppt/slides/slide14.xml><?xml version="1.0" encoding="utf-8"?>
+<p:sld xmlns:a="http://schemas.openxmlformats.org/drawingml/2006/main" xmlns:r="http://schemas.openxmlformats.org/officeDocument/2006/relationships" xmlns:p="http://schemas.openxmlformats.org/presentationml/2006/main">
+  <p:cSld>
+    <p:spTree>
+      <p:nvGrpSpPr>
+        <p:cNvPr id="1" name=""/>
+        <p:cNvGrpSpPr/>
+        <p:nvPr/>
+      </p:nvGrpSpPr>
+      <p:grpSpPr>
+        <a:xfrm>
+          <a:off x="0" y="0"/>
+          <a:ext cx="0" cy="0"/>
+          <a:chOff x="0" y="0"/>
+          <a:chExt cx="0" cy="0"/>
+        </a:xfrm>
+      </p:grpSpPr>
+      <p:sp>
+        <p:nvSpPr>
+          <p:cNvPr id="3" name="Content Placeholder 2">
+            <a:extLst>
+              <a:ext uri="{FF2B5EF4-FFF2-40B4-BE49-F238E27FC236}">
+                <a16:creationId xmlns:a16="http://schemas.microsoft.com/office/drawing/2014/main" id="{560FAE92-1044-2D93-DCDA-90DC459FBE12}"/>
+              </a:ext>
+            </a:extLst>
+          </p:cNvPr>
+          <p:cNvSpPr>
+            <a:spLocks noGrp="1"/>
+          </p:cNvSpPr>
+          <p:nvPr>
+            <p:ph idx="1"/>
+          </p:nvPr>
+        </p:nvSpPr>
+        <p:spPr>
+          <a:xfrm>
+            <a:off x="504992" y="1512843"/>
+            <a:ext cx="11029615" cy="3259181"/>
+          </a:xfrm>
+        </p:spPr>
+        <p:txBody>
+          <a:bodyPr>
+            <a:noAutofit/>
+          </a:bodyPr>
+          <a:lstStyle/>
+          <a:p>
+            <a:r>
+              <a:rPr lang="en-US" sz="2000" dirty="0"/>
+              <a:t>List neighborhoods with no subway stations.</a:t>
+            </a:r>
+          </a:p>
+          <a:p>
+            <a:pPr marL="324000" lvl="1" indent="0">
+              <a:buNone/>
+            </a:pPr>
+            <a:r>
+              <a:rPr lang="en-US" sz="2000" dirty="0">
+                <a:solidFill>
+                  <a:srgbClr val="00B0F0"/>
+                </a:solidFill>
+              </a:rPr>
+              <a:t>SELECT </a:t>
+            </a:r>
+            <a:r>
+              <a:rPr lang="en-US" sz="2000" dirty="0" err="1">
+                <a:solidFill>
+                  <a:srgbClr val="00B0F0"/>
+                </a:solidFill>
+              </a:rPr>
+              <a:t>boroname</a:t>
+            </a:r>
+            <a:endParaRPr lang="en-US" sz="2000" dirty="0">
+              <a:solidFill>
+                <a:srgbClr val="00B0F0"/>
+              </a:solidFill>
+            </a:endParaRPr>
+          </a:p>
+          <a:p>
+            <a:pPr marL="324000" lvl="1" indent="0">
+              <a:buNone/>
+            </a:pPr>
+            <a:r>
+              <a:rPr lang="en-US" sz="2000" dirty="0">
+                <a:solidFill>
+                  <a:srgbClr val="00B0F0"/>
+                </a:solidFill>
+              </a:rPr>
+              <a:t>FROM ch05.neighborhoods</a:t>
+            </a:r>
+          </a:p>
+          <a:p>
+            <a:pPr marL="324000" lvl="1" indent="0">
+              <a:buNone/>
+            </a:pPr>
+            <a:r>
+              <a:rPr lang="en-US" sz="2000" dirty="0">
+                <a:solidFill>
+                  <a:srgbClr val="00B0F0"/>
+                </a:solidFill>
+              </a:rPr>
+              <a:t>WHERE NOT EXISTS ( </a:t>
+            </a:r>
+          </a:p>
+          <a:p>
+            <a:pPr marL="324000" lvl="1" indent="0">
+              <a:buNone/>
+            </a:pPr>
+            <a:r>
+              <a:rPr lang="en-US" sz="2000" dirty="0">
+                <a:solidFill>
+                  <a:srgbClr val="00B0F0"/>
+                </a:solidFill>
+              </a:rPr>
+              <a:t>SELECT 1 FROM ch05.subway    </a:t>
+            </a:r>
+          </a:p>
+          <a:p>
+            <a:pPr marL="324000" lvl="1" indent="0">
+              <a:buNone/>
+            </a:pPr>
+            <a:r>
+              <a:rPr lang="en-US" sz="2000" dirty="0">
+                <a:solidFill>
+                  <a:srgbClr val="00B0F0"/>
+                </a:solidFill>
+              </a:rPr>
+              <a:t>WHERE </a:t>
+            </a:r>
+            <a:r>
+              <a:rPr lang="en-US" sz="2000" dirty="0" err="1">
+                <a:solidFill>
+                  <a:srgbClr val="00B0F0"/>
+                </a:solidFill>
+              </a:rPr>
+              <a:t>ST_Disjoint</a:t>
+            </a:r>
+            <a:r>
+              <a:rPr lang="en-US" sz="2000" dirty="0">
+                <a:solidFill>
+                  <a:srgbClr val="00B0F0"/>
+                </a:solidFill>
+              </a:rPr>
+              <a:t>(ch05.neighborhoods.geom, ch05.subway.geom) = FALSE);</a:t>
+            </a:r>
+          </a:p>
+        </p:txBody>
+      </p:sp>
+      <p:sp>
+        <p:nvSpPr>
+          <p:cNvPr id="4" name="TextBox 3">
+            <a:extLst>
+              <a:ext uri="{FF2B5EF4-FFF2-40B4-BE49-F238E27FC236}">
+                <a16:creationId xmlns:a16="http://schemas.microsoft.com/office/drawing/2014/main" id="{91F3053D-754E-8441-461A-44E8C55A4153}"/>
+              </a:ext>
+            </a:extLst>
+          </p:cNvPr>
+          <p:cNvSpPr txBox="1"/>
+          <p:nvPr/>
+        </p:nvSpPr>
+        <p:spPr>
+          <a:xfrm>
+            <a:off x="504992" y="743916"/>
+            <a:ext cx="5514808" cy="523220"/>
+          </a:xfrm>
+          <a:prstGeom prst="rect">
+            <a:avLst/>
+          </a:prstGeom>
+          <a:noFill/>
+        </p:spPr>
+        <p:txBody>
+          <a:bodyPr wrap="square" rtlCol="0">
+            <a:spAutoFit/>
+          </a:bodyPr>
+          <a:lstStyle/>
+          <a:p>
+            <a:r>
+              <a:rPr lang="en-US" sz="2800" dirty="0"/>
+              <a:t>Example</a:t>
+            </a:r>
+            <a:r>
+              <a:rPr lang="en-US" altLang="zh-CN" sz="2800" dirty="0"/>
+              <a:t> 2</a:t>
+            </a:r>
+            <a:r>
+              <a:rPr lang="en-US" sz="2800" dirty="0"/>
+              <a:t>: </a:t>
+            </a:r>
+            <a:r>
+              <a:rPr lang="en-US" sz="2800" dirty="0" err="1"/>
+              <a:t>ST_Disjoint</a:t>
+            </a:r>
+            <a:endParaRPr lang="en-US" sz="2800" dirty="0"/>
+          </a:p>
+        </p:txBody>
+      </p:sp>
+    </p:spTree>
+    <p:extLst>
+      <p:ext uri="{BB962C8B-B14F-4D97-AF65-F5344CB8AC3E}">
+        <p14:creationId xmlns:p14="http://schemas.microsoft.com/office/powerpoint/2010/main" val="3851545665"/>
+      </p:ext>
+    </p:extLst>
+  </p:cSld>
+  <p:clrMapOvr>
+    <a:masterClrMapping/>
+  </p:clrMapOvr>
+</p:sld>
+</file>
+
+<file path=ppt/slides/slide15.xml><?xml version="1.0" encoding="utf-8"?>
+<p:sld xmlns:a="http://schemas.openxmlformats.org/drawingml/2006/main" xmlns:r="http://schemas.openxmlformats.org/officeDocument/2006/relationships" xmlns:p="http://schemas.openxmlformats.org/presentationml/2006/main">
+  <p:cSld>
+    <p:spTree>
+      <p:nvGrpSpPr>
+        <p:cNvPr id="1" name=""/>
+        <p:cNvGrpSpPr/>
+        <p:nvPr/>
+      </p:nvGrpSpPr>
+      <p:grpSpPr>
+        <a:xfrm>
+          <a:off x="0" y="0"/>
+          <a:ext cx="0" cy="0"/>
+          <a:chOff x="0" y="0"/>
+          <a:chExt cx="0" cy="0"/>
+        </a:xfrm>
+      </p:grpSpPr>
+      <p:sp>
+        <p:nvSpPr>
+          <p:cNvPr id="3" name="Content Placeholder 2">
+            <a:extLst>
+              <a:ext uri="{FF2B5EF4-FFF2-40B4-BE49-F238E27FC236}">
+                <a16:creationId xmlns:a16="http://schemas.microsoft.com/office/drawing/2014/main" id="{7A5F7DF1-4BCE-BE52-535B-C03DD3B0D222}"/>
+              </a:ext>
+            </a:extLst>
+          </p:cNvPr>
+          <p:cNvSpPr>
+            <a:spLocks noGrp="1"/>
+          </p:cNvSpPr>
+          <p:nvPr>
+            <p:ph idx="1"/>
+          </p:nvPr>
+        </p:nvSpPr>
+        <p:spPr>
+          <a:xfrm>
+            <a:off x="581191" y="1483613"/>
+            <a:ext cx="11029615" cy="3688461"/>
+          </a:xfrm>
+        </p:spPr>
+        <p:txBody>
+          <a:bodyPr>
+            <a:normAutofit/>
+          </a:bodyPr>
+          <a:lstStyle/>
+          <a:p>
+            <a:r>
+              <a:rPr lang="en-US" dirty="0"/>
+              <a:t>Find subway stations that are disjoint from major roads.</a:t>
+            </a:r>
+          </a:p>
+          <a:p>
+            <a:pPr marL="324000" lvl="1" indent="0">
+              <a:buNone/>
+            </a:pPr>
+            <a:r>
+              <a:rPr lang="en-US" sz="1800" dirty="0">
+                <a:solidFill>
+                  <a:srgbClr val="00B0F0"/>
+                </a:solidFill>
+              </a:rPr>
+              <a:t>SELECT </a:t>
+            </a:r>
+            <a:r>
+              <a:rPr lang="en-US" sz="1800" dirty="0" err="1">
+                <a:solidFill>
+                  <a:srgbClr val="00B0F0"/>
+                </a:solidFill>
+              </a:rPr>
+              <a:t>station_name</a:t>
+            </a:r>
+            <a:endParaRPr lang="en-US" sz="1800" dirty="0">
+              <a:solidFill>
+                <a:srgbClr val="00B0F0"/>
+              </a:solidFill>
+            </a:endParaRPr>
+          </a:p>
+          <a:p>
+            <a:pPr marL="324000" lvl="1" indent="0">
+              <a:buNone/>
+            </a:pPr>
+            <a:r>
+              <a:rPr lang="en-US" sz="1800" dirty="0">
+                <a:solidFill>
+                  <a:srgbClr val="00B0F0"/>
+                </a:solidFill>
+              </a:rPr>
+              <a:t>FROM ch05.subway</a:t>
+            </a:r>
+          </a:p>
+          <a:p>
+            <a:pPr marL="324000" lvl="1" indent="0">
+              <a:buNone/>
+            </a:pPr>
+            <a:r>
+              <a:rPr lang="en-US" sz="1800" dirty="0">
+                <a:solidFill>
+                  <a:srgbClr val="00B0F0"/>
+                </a:solidFill>
+              </a:rPr>
+              <a:t>WHERE NOT EXISTS (</a:t>
+            </a:r>
+          </a:p>
+          <a:p>
+            <a:pPr marL="324000" lvl="1" indent="0">
+              <a:buNone/>
+            </a:pPr>
+            <a:r>
+              <a:rPr lang="en-US" sz="1800" dirty="0">
+                <a:solidFill>
+                  <a:srgbClr val="00B0F0"/>
+                </a:solidFill>
+              </a:rPr>
+              <a:t>SELECT 1 FROM ch05.streets    </a:t>
+            </a:r>
+          </a:p>
+          <a:p>
+            <a:pPr marL="324000" lvl="1" indent="0">
+              <a:buNone/>
+            </a:pPr>
+            <a:r>
+              <a:rPr lang="en-US" sz="1800" dirty="0">
+                <a:solidFill>
+                  <a:srgbClr val="00B0F0"/>
+                </a:solidFill>
+              </a:rPr>
+              <a:t>WHERE </a:t>
+            </a:r>
+            <a:r>
+              <a:rPr lang="en-US" sz="1800" dirty="0" err="1">
+                <a:solidFill>
+                  <a:srgbClr val="00B0F0"/>
+                </a:solidFill>
+              </a:rPr>
+              <a:t>road_type</a:t>
+            </a:r>
+            <a:r>
+              <a:rPr lang="en-US" sz="1800" dirty="0">
+                <a:solidFill>
+                  <a:srgbClr val="00B0F0"/>
+                </a:solidFill>
+              </a:rPr>
+              <a:t> = 'Major'    </a:t>
+            </a:r>
+          </a:p>
+          <a:p>
+            <a:pPr marL="324000" lvl="1" indent="0">
+              <a:buNone/>
+            </a:pPr>
+            <a:r>
+              <a:rPr lang="en-US" sz="1800" dirty="0">
+                <a:solidFill>
+                  <a:srgbClr val="00B0F0"/>
+                </a:solidFill>
+              </a:rPr>
+              <a:t>AND </a:t>
+            </a:r>
+            <a:r>
+              <a:rPr lang="en-US" sz="1800" dirty="0" err="1">
+                <a:solidFill>
+                  <a:srgbClr val="00B0F0"/>
+                </a:solidFill>
+              </a:rPr>
+              <a:t>ST_Disjoint</a:t>
+            </a:r>
+            <a:r>
+              <a:rPr lang="en-US" sz="1800" dirty="0">
+                <a:solidFill>
+                  <a:srgbClr val="00B0F0"/>
+                </a:solidFill>
+              </a:rPr>
+              <a:t>(</a:t>
+            </a:r>
+            <a:r>
+              <a:rPr lang="en-US" sz="1800" dirty="0" err="1">
+                <a:solidFill>
+                  <a:srgbClr val="00B0F0"/>
+                </a:solidFill>
+              </a:rPr>
+              <a:t>ST_Buffer</a:t>
+            </a:r>
+            <a:r>
+              <a:rPr lang="en-US" sz="1800" dirty="0">
+                <a:solidFill>
+                  <a:srgbClr val="00B0F0"/>
+                </a:solidFill>
+              </a:rPr>
+              <a:t>(ch05.subway.geom, 50), ch05.streets.geom) = FALSE);</a:t>
+            </a:r>
+          </a:p>
+        </p:txBody>
+      </p:sp>
+      <p:sp>
+        <p:nvSpPr>
+          <p:cNvPr id="4" name="TextBox 3">
+            <a:extLst>
+              <a:ext uri="{FF2B5EF4-FFF2-40B4-BE49-F238E27FC236}">
+                <a16:creationId xmlns:a16="http://schemas.microsoft.com/office/drawing/2014/main" id="{484A90A6-4F20-8935-0B63-0BD0B8C0A82E}"/>
+              </a:ext>
+            </a:extLst>
+          </p:cNvPr>
+          <p:cNvSpPr txBox="1"/>
+          <p:nvPr/>
+        </p:nvSpPr>
+        <p:spPr>
+          <a:xfrm>
+            <a:off x="504992" y="743916"/>
+            <a:ext cx="5514808" cy="523220"/>
+          </a:xfrm>
+          <a:prstGeom prst="rect">
+            <a:avLst/>
+          </a:prstGeom>
+          <a:noFill/>
+        </p:spPr>
+        <p:txBody>
+          <a:bodyPr wrap="square" rtlCol="0">
+            <a:spAutoFit/>
+          </a:bodyPr>
+          <a:lstStyle/>
+          <a:p>
+            <a:r>
+              <a:rPr lang="en-US" sz="2800" dirty="0"/>
+              <a:t>Exercise</a:t>
+            </a:r>
+            <a:r>
+              <a:rPr lang="en-US" altLang="zh-CN" sz="2800" dirty="0"/>
+              <a:t> 2</a:t>
+            </a:r>
+            <a:r>
+              <a:rPr lang="en-US" sz="2800" dirty="0"/>
+              <a:t>: </a:t>
+            </a:r>
+            <a:r>
+              <a:rPr lang="en-US" sz="2800" dirty="0" err="1"/>
+              <a:t>ST_Disjoint</a:t>
+            </a:r>
+            <a:endParaRPr lang="en-US" sz="2800" dirty="0"/>
+          </a:p>
+        </p:txBody>
+      </p:sp>
+    </p:spTree>
+    <p:extLst>
+      <p:ext uri="{BB962C8B-B14F-4D97-AF65-F5344CB8AC3E}">
+        <p14:creationId xmlns:p14="http://schemas.microsoft.com/office/powerpoint/2010/main" val="1994899666"/>
+      </p:ext>
+    </p:extLst>
+  </p:cSld>
+  <p:clrMapOvr>
+    <a:masterClrMapping/>
+  </p:clrMapOvr>
+</p:sld>
+</file>
+
+<file path=ppt/slides/slide16.xml><?xml version="1.0" encoding="utf-8"?>
+<p:sld xmlns:a="http://schemas.openxmlformats.org/drawingml/2006/main" xmlns:r="http://schemas.openxmlformats.org/officeDocument/2006/relationships" xmlns:p="http://schemas.openxmlformats.org/presentationml/2006/main">
+  <p:cSld>
+    <p:spTree>
+      <p:nvGrpSpPr>
+        <p:cNvPr id="1" name=""/>
+        <p:cNvGrpSpPr/>
+        <p:nvPr/>
+      </p:nvGrpSpPr>
+      <p:grpSpPr>
+        <a:xfrm>
+          <a:off x="0" y="0"/>
+          <a:ext cx="0" cy="0"/>
+          <a:chOff x="0" y="0"/>
+          <a:chExt cx="0" cy="0"/>
+        </a:xfrm>
+      </p:grpSpPr>
+      <p:sp>
+        <p:nvSpPr>
           <p:cNvPr id="2" name="Title 1">
             <a:extLst>
               <a:ext uri="{FF2B5EF4-FFF2-40B4-BE49-F238E27FC236}">
-                <a16:creationId xmlns:a16="http://schemas.microsoft.com/office/drawing/2014/main" id="{6AFDAB0B-1269-9F6C-D8A0-E3650409C648}"/>
+                <a16:creationId xmlns:a16="http://schemas.microsoft.com/office/drawing/2014/main" id="{68997778-0D92-C897-B435-DC143BD6E979}"/>
               </a:ext>
             </a:extLst>
           </p:cNvPr>
@@ -4835,13 +6213,16 @@
         </p:nvSpPr>
         <p:spPr/>
         <p:txBody>
-          <a:bodyPr/>
+          <a:bodyPr>
+            <a:normAutofit/>
+          </a:bodyPr>
           <a:lstStyle/>
           <a:p>
             <a:r>
-              <a:rPr lang="en-US" dirty="0"/>
-              <a:t>TOOLS IN PGADMIN 4 - VIEWS</a:t>
-            </a:r>
+              <a:rPr lang="en-US" b="1" dirty="0"/>
+              <a:t>Scenario 2</a:t>
+            </a:r>
+            <a:endParaRPr lang="en-US" dirty="0"/>
           </a:p>
         </p:txBody>
       </p:sp>
@@ -4850,7 +6231,7 @@
           <p:cNvPr id="3" name="Content Placeholder 2">
             <a:extLst>
               <a:ext uri="{FF2B5EF4-FFF2-40B4-BE49-F238E27FC236}">
-                <a16:creationId xmlns:a16="http://schemas.microsoft.com/office/drawing/2014/main" id="{57CF7F19-5B2B-AB2D-263A-2A3D1302199B}"/>
+                <a16:creationId xmlns:a16="http://schemas.microsoft.com/office/drawing/2014/main" id="{86BB65ED-F08E-6AF8-CE05-FABCF43D860C}"/>
               </a:ext>
             </a:extLst>
           </p:cNvPr>
@@ -4861,30 +6242,34 @@
             <p:ph idx="1"/>
           </p:nvPr>
         </p:nvSpPr>
-        <p:spPr/>
-        <p:txBody>
-          <a:bodyPr/>
+        <p:spPr>
+          <a:xfrm>
+            <a:off x="581192" y="2340864"/>
+            <a:ext cx="11029615" cy="2051027"/>
+          </a:xfrm>
+        </p:spPr>
+        <p:txBody>
+          <a:bodyPr>
+            <a:normAutofit/>
+          </a:bodyPr>
           <a:lstStyle/>
           <a:p>
-            <a:r>
-              <a:rPr lang="en-US" dirty="0"/>
-              <a:t>Simplify complex queries with views for better data visualization.</a:t>
-            </a:r>
-          </a:p>
-          <a:p>
-            <a:endParaRPr lang="en-US" dirty="0"/>
+            <a:pPr lvl="1"/>
+            <a:r>
+              <a:rPr lang="en-US" sz="1800" dirty="0"/>
+              <a:t>Identify potential flood zones by buffering the coastline and identifying streets within the buffer.</a:t>
+            </a:r>
           </a:p>
           <a:p>
             <a:pPr marL="594000" lvl="2" indent="0">
               <a:buNone/>
             </a:pPr>
-            <a:r>
-              <a:rPr lang="en-US" dirty="0">
-                <a:solidFill>
-                  <a:srgbClr val="00B0F0"/>
-                </a:solidFill>
-              </a:rPr>
-              <a:t>CREATE VIEW ch05.residential_near_stations AS </a:t>
+            <a:br>
+              <a:rPr lang="en-US" sz="1800" dirty="0"/>
+            </a:br>
+            <a:r>
+              <a:rPr lang="en-US" sz="1800" dirty="0"/>
+              <a:t>SELECT s.NAME  </a:t>
             </a:r>
           </a:p>
           <a:p>
@@ -4892,44 +6277,24 @@
               <a:buNone/>
             </a:pPr>
             <a:r>
-              <a:rPr lang="en-US" dirty="0">
-                <a:solidFill>
-                  <a:srgbClr val="00B0F0"/>
-                </a:solidFill>
-              </a:rPr>
-              <a:t>SELECT s.NAME AS </a:t>
-            </a:r>
-            <a:r>
-              <a:rPr lang="en-US" dirty="0" err="1">
-                <a:solidFill>
-                  <a:srgbClr val="00B0F0"/>
-                </a:solidFill>
-              </a:rPr>
-              <a:t>street_name</a:t>
-            </a:r>
-            <a:r>
-              <a:rPr lang="en-US" dirty="0">
-                <a:solidFill>
-                  <a:srgbClr val="00B0F0"/>
-                </a:solidFill>
-              </a:rPr>
-              <a:t>, st.NAME AS </a:t>
-            </a:r>
-            <a:r>
-              <a:rPr lang="en-US" dirty="0" err="1">
-                <a:solidFill>
-                  <a:srgbClr val="00B0F0"/>
-                </a:solidFill>
-              </a:rPr>
-              <a:t>station_name</a:t>
-            </a:r>
-            <a:r>
-              <a:rPr lang="en-US" dirty="0">
-                <a:solidFill>
-                  <a:srgbClr val="00B0F0"/>
-                </a:solidFill>
-              </a:rPr>
-              <a:t> </a:t>
+              <a:rPr lang="en-US" sz="1800" dirty="0"/>
+              <a:t>FROM </a:t>
+            </a:r>
+            <a:r>
+              <a:rPr lang="en-US" sz="1800" dirty="0" err="1"/>
+              <a:t>nyc_streets</a:t>
+            </a:r>
+            <a:r>
+              <a:rPr lang="en-US" sz="1800" dirty="0"/>
+              <a:t> s, </a:t>
+            </a:r>
+            <a:r>
+              <a:rPr lang="en-US" sz="1800" dirty="0" err="1"/>
+              <a:t>nyc_coastline</a:t>
+            </a:r>
+            <a:r>
+              <a:rPr lang="en-US" sz="1800" dirty="0"/>
+              <a:t> c  </a:t>
             </a:r>
           </a:p>
           <a:p>
@@ -4937,131 +6302,40 @@
               <a:buNone/>
             </a:pPr>
             <a:r>
-              <a:rPr lang="en-US" dirty="0">
-                <a:solidFill>
-                  <a:srgbClr val="00B0F0"/>
-                </a:solidFill>
-              </a:rPr>
-              <a:t>FROM ch05.nyc_streets s </a:t>
-            </a:r>
-          </a:p>
-          <a:p>
-            <a:pPr marL="594000" lvl="2" indent="0">
-              <a:buNone/>
-            </a:pPr>
-            <a:r>
-              <a:rPr lang="en-US" dirty="0">
-                <a:solidFill>
-                  <a:srgbClr val="00B0F0"/>
-                </a:solidFill>
-              </a:rPr>
-              <a:t>JOIN ch05.nyc_subway_stations </a:t>
-            </a:r>
-            <a:r>
-              <a:rPr lang="en-US" dirty="0" err="1">
-                <a:solidFill>
-                  <a:srgbClr val="00B0F0"/>
-                </a:solidFill>
-              </a:rPr>
-              <a:t>st</a:t>
-            </a:r>
-            <a:r>
-              <a:rPr lang="en-US" dirty="0">
-                <a:solidFill>
-                  <a:srgbClr val="00B0F0"/>
-                </a:solidFill>
-              </a:rPr>
-              <a:t> </a:t>
-            </a:r>
-          </a:p>
-          <a:p>
-            <a:pPr marL="594000" lvl="2" indent="0">
-              <a:buNone/>
-            </a:pPr>
-            <a:r>
-              <a:rPr lang="en-US" dirty="0">
-                <a:solidFill>
-                  <a:srgbClr val="00B0F0"/>
-                </a:solidFill>
-              </a:rPr>
-              <a:t>ON </a:t>
-            </a:r>
-            <a:r>
-              <a:rPr lang="en-US" dirty="0" err="1">
-                <a:solidFill>
-                  <a:srgbClr val="00B0F0"/>
-                </a:solidFill>
-              </a:rPr>
-              <a:t>ST_DWithin</a:t>
-            </a:r>
-            <a:r>
-              <a:rPr lang="en-US" dirty="0">
-                <a:solidFill>
-                  <a:srgbClr val="00B0F0"/>
-                </a:solidFill>
-              </a:rPr>
+              <a:rPr lang="en-US" sz="1800" dirty="0"/>
+              <a:t>WHERE </a:t>
+            </a:r>
+            <a:r>
+              <a:rPr lang="en-US" sz="1800" dirty="0" err="1"/>
+              <a:t>ST_Intersects</a:t>
+            </a:r>
+            <a:r>
+              <a:rPr lang="en-US" sz="1800" dirty="0"/>
               <a:t>(</a:t>
             </a:r>
             <a:r>
-              <a:rPr lang="en-US" dirty="0" err="1">
-                <a:solidFill>
-                  <a:srgbClr val="00B0F0"/>
-                </a:solidFill>
-              </a:rPr>
+              <a:rPr lang="en-US" sz="1800" dirty="0" err="1"/>
+              <a:t>ST_Buffer</a:t>
+            </a:r>
+            <a:r>
+              <a:rPr lang="en-US" sz="1800" dirty="0"/>
+              <a:t>(</a:t>
+            </a:r>
+            <a:r>
+              <a:rPr lang="en-US" sz="1800" dirty="0" err="1"/>
+              <a:t>c.geometry</a:t>
+            </a:r>
+            <a:r>
+              <a:rPr lang="en-US" sz="1800" dirty="0"/>
+              <a:t>, 1000), </a:t>
+            </a:r>
+            <a:r>
+              <a:rPr lang="en-US" sz="1800" dirty="0" err="1"/>
               <a:t>s.geometry</a:t>
             </a:r>
             <a:r>
-              <a:rPr lang="en-US" dirty="0">
-                <a:solidFill>
-                  <a:srgbClr val="00B0F0"/>
-                </a:solidFill>
-              </a:rPr>
-              <a:t>, </a:t>
-            </a:r>
-            <a:r>
-              <a:rPr lang="en-US" dirty="0" err="1">
-                <a:solidFill>
-                  <a:srgbClr val="00B0F0"/>
-                </a:solidFill>
-              </a:rPr>
-              <a:t>st.geometry</a:t>
-            </a:r>
-            <a:r>
-              <a:rPr lang="en-US" dirty="0">
-                <a:solidFill>
-                  <a:srgbClr val="00B0F0"/>
-                </a:solidFill>
-              </a:rPr>
-              <a:t>, 300) </a:t>
-            </a:r>
-          </a:p>
-          <a:p>
-            <a:pPr marL="594000" lvl="2" indent="0">
-              <a:buNone/>
-            </a:pPr>
-            <a:r>
-              <a:rPr lang="en-US" dirty="0">
-                <a:solidFill>
-                  <a:srgbClr val="00B0F0"/>
-                </a:solidFill>
-              </a:rPr>
-              <a:t>WHERE </a:t>
-            </a:r>
-            <a:r>
-              <a:rPr lang="en-US" dirty="0" err="1">
-                <a:solidFill>
-                  <a:srgbClr val="00B0F0"/>
-                </a:solidFill>
-              </a:rPr>
-              <a:t>s.TYPE</a:t>
-            </a:r>
-            <a:r>
-              <a:rPr lang="en-US" dirty="0">
-                <a:solidFill>
-                  <a:srgbClr val="00B0F0"/>
-                </a:solidFill>
-              </a:rPr>
-              <a:t> = 'residential';</a:t>
+              <a:rPr lang="en-US" sz="1800" dirty="0"/>
+              <a:t>);</a:t>
             </a:r>
           </a:p>
         </p:txBody>
@@ -5069,7 +6343,804 @@
     </p:spTree>
     <p:extLst>
       <p:ext uri="{BB962C8B-B14F-4D97-AF65-F5344CB8AC3E}">
-        <p14:creationId xmlns:p14="http://schemas.microsoft.com/office/powerpoint/2010/main" val="3857661707"/>
+        <p14:creationId xmlns:p14="http://schemas.microsoft.com/office/powerpoint/2010/main" val="78832131"/>
+      </p:ext>
+    </p:extLst>
+  </p:cSld>
+  <p:clrMapOvr>
+    <a:masterClrMapping/>
+  </p:clrMapOvr>
+</p:sld>
+</file>
+
+<file path=ppt/slides/slide17.xml><?xml version="1.0" encoding="utf-8"?>
+<p:sld xmlns:a="http://schemas.openxmlformats.org/drawingml/2006/main" xmlns:r="http://schemas.openxmlformats.org/officeDocument/2006/relationships" xmlns:p="http://schemas.openxmlformats.org/presentationml/2006/main">
+  <p:cSld>
+    <p:spTree>
+      <p:nvGrpSpPr>
+        <p:cNvPr id="1" name=""/>
+        <p:cNvGrpSpPr/>
+        <p:nvPr/>
+      </p:nvGrpSpPr>
+      <p:grpSpPr>
+        <a:xfrm>
+          <a:off x="0" y="0"/>
+          <a:ext cx="0" cy="0"/>
+          <a:chOff x="0" y="0"/>
+          <a:chExt cx="0" cy="0"/>
+        </a:xfrm>
+      </p:grpSpPr>
+      <p:sp>
+        <p:nvSpPr>
+          <p:cNvPr id="2" name="Title 1">
+            <a:extLst>
+              <a:ext uri="{FF2B5EF4-FFF2-40B4-BE49-F238E27FC236}">
+                <a16:creationId xmlns:a16="http://schemas.microsoft.com/office/drawing/2014/main" id="{E9A99951-2173-336C-6657-79F75A79B63A}"/>
+              </a:ext>
+            </a:extLst>
+          </p:cNvPr>
+          <p:cNvSpPr>
+            <a:spLocks noGrp="1"/>
+          </p:cNvSpPr>
+          <p:nvPr>
+            <p:ph type="title"/>
+          </p:nvPr>
+        </p:nvSpPr>
+        <p:spPr>
+          <a:xfrm>
+            <a:off x="581192" y="702156"/>
+            <a:ext cx="11029616" cy="600171"/>
+          </a:xfrm>
+        </p:spPr>
+        <p:txBody>
+          <a:bodyPr>
+            <a:normAutofit/>
+          </a:bodyPr>
+          <a:lstStyle/>
+          <a:p>
+            <a:r>
+              <a:rPr lang="en-US" dirty="0"/>
+              <a:t>Real-World Project Example</a:t>
+            </a:r>
+          </a:p>
+        </p:txBody>
+      </p:sp>
+      <p:sp>
+        <p:nvSpPr>
+          <p:cNvPr id="3" name="Content Placeholder 2">
+            <a:extLst>
+              <a:ext uri="{FF2B5EF4-FFF2-40B4-BE49-F238E27FC236}">
+                <a16:creationId xmlns:a16="http://schemas.microsoft.com/office/drawing/2014/main" id="{5D5C0DB1-FCD0-2193-7033-AB0BEA2196DC}"/>
+              </a:ext>
+            </a:extLst>
+          </p:cNvPr>
+          <p:cNvSpPr>
+            <a:spLocks noGrp="1"/>
+          </p:cNvSpPr>
+          <p:nvPr>
+            <p:ph idx="1"/>
+          </p:nvPr>
+        </p:nvSpPr>
+        <p:spPr>
+          <a:xfrm>
+            <a:off x="581193" y="1454172"/>
+            <a:ext cx="11029615" cy="2833809"/>
+          </a:xfrm>
+        </p:spPr>
+        <p:txBody>
+          <a:bodyPr>
+            <a:normAutofit/>
+          </a:bodyPr>
+          <a:lstStyle/>
+          <a:p>
+            <a:pPr>
+              <a:buFont typeface="Wingdings" panose="05000000000000000000" pitchFamily="2" charset="2"/>
+              <a:buChar char="§"/>
+            </a:pPr>
+            <a:r>
+              <a:rPr lang="en-US" b="1" dirty="0"/>
+              <a:t>NYC Emergency Response Planning:</a:t>
+            </a:r>
+            <a:endParaRPr lang="en-US" dirty="0"/>
+          </a:p>
+          <a:p>
+            <a:pPr marL="742950" lvl="1" indent="-285750">
+              <a:buFont typeface="Arial" panose="020B0604020202020204" pitchFamily="34" charset="0"/>
+              <a:buChar char="•"/>
+            </a:pPr>
+            <a:r>
+              <a:rPr lang="en-US" dirty="0"/>
+              <a:t>Buffer zones around subway stations are used to plan emergency evacuation routes and resource allocation.</a:t>
+            </a:r>
+          </a:p>
+          <a:p>
+            <a:pPr marL="742950" lvl="1" indent="-285750">
+              <a:buFont typeface="Arial" panose="020B0604020202020204" pitchFamily="34" charset="0"/>
+              <a:buChar char="•"/>
+            </a:pPr>
+            <a:r>
+              <a:rPr lang="en-US" b="1" dirty="0"/>
+              <a:t>Example:</a:t>
+            </a:r>
+            <a:r>
+              <a:rPr lang="en-US" dirty="0"/>
+              <a:t> During Hurricane Sandy, buffer analysis helped identify critical infrastructure within flood-prone zones, aiding in evacuation and resource deployment.</a:t>
+            </a:r>
+          </a:p>
+          <a:p>
+            <a:pPr marL="594000" lvl="2" indent="0">
+              <a:buNone/>
+            </a:pPr>
+            <a:r>
+              <a:rPr lang="en-US" dirty="0">
+                <a:solidFill>
+                  <a:srgbClr val="00B0F0"/>
+                </a:solidFill>
+              </a:rPr>
+              <a:t>SELECT st.NAME AS </a:t>
+            </a:r>
+            <a:r>
+              <a:rPr lang="en-US" dirty="0" err="1">
+                <a:solidFill>
+                  <a:srgbClr val="00B0F0"/>
+                </a:solidFill>
+              </a:rPr>
+              <a:t>station_name</a:t>
+            </a:r>
+            <a:r>
+              <a:rPr lang="en-US" dirty="0">
+                <a:solidFill>
+                  <a:srgbClr val="00B0F0"/>
+                </a:solidFill>
+              </a:rPr>
+              <a:t>, s.NAME AS </a:t>
+            </a:r>
+            <a:r>
+              <a:rPr lang="en-US" dirty="0" err="1">
+                <a:solidFill>
+                  <a:srgbClr val="00B0F0"/>
+                </a:solidFill>
+              </a:rPr>
+              <a:t>street_name</a:t>
+            </a:r>
+            <a:r>
+              <a:rPr lang="en-US" dirty="0">
+                <a:solidFill>
+                  <a:srgbClr val="00B0F0"/>
+                </a:solidFill>
+              </a:rPr>
+              <a:t>  </a:t>
+            </a:r>
+          </a:p>
+          <a:p>
+            <a:pPr marL="594000" lvl="2" indent="0">
+              <a:buNone/>
+            </a:pPr>
+            <a:r>
+              <a:rPr lang="en-US" dirty="0">
+                <a:solidFill>
+                  <a:srgbClr val="00B0F0"/>
+                </a:solidFill>
+              </a:rPr>
+              <a:t>FROM </a:t>
+            </a:r>
+            <a:r>
+              <a:rPr lang="en-US" dirty="0" err="1">
+                <a:solidFill>
+                  <a:srgbClr val="00B0F0"/>
+                </a:solidFill>
+              </a:rPr>
+              <a:t>nyc_subway_stations</a:t>
+            </a:r>
+            <a:r>
+              <a:rPr lang="en-US" dirty="0">
+                <a:solidFill>
+                  <a:srgbClr val="00B0F0"/>
+                </a:solidFill>
+              </a:rPr>
+              <a:t> </a:t>
+            </a:r>
+            <a:r>
+              <a:rPr lang="en-US" dirty="0" err="1">
+                <a:solidFill>
+                  <a:srgbClr val="00B0F0"/>
+                </a:solidFill>
+              </a:rPr>
+              <a:t>st</a:t>
+            </a:r>
+            <a:r>
+              <a:rPr lang="en-US" dirty="0">
+                <a:solidFill>
+                  <a:srgbClr val="00B0F0"/>
+                </a:solidFill>
+              </a:rPr>
+              <a:t>, </a:t>
+            </a:r>
+            <a:r>
+              <a:rPr lang="en-US" dirty="0" err="1">
+                <a:solidFill>
+                  <a:srgbClr val="00B0F0"/>
+                </a:solidFill>
+              </a:rPr>
+              <a:t>nyc_streets</a:t>
+            </a:r>
+            <a:r>
+              <a:rPr lang="en-US" dirty="0">
+                <a:solidFill>
+                  <a:srgbClr val="00B0F0"/>
+                </a:solidFill>
+              </a:rPr>
+              <a:t> s  </a:t>
+            </a:r>
+          </a:p>
+          <a:p>
+            <a:pPr marL="594000" lvl="2" indent="0">
+              <a:buNone/>
+            </a:pPr>
+            <a:r>
+              <a:rPr lang="en-US" dirty="0">
+                <a:solidFill>
+                  <a:srgbClr val="00B0F0"/>
+                </a:solidFill>
+              </a:rPr>
+              <a:t>WHERE </a:t>
+            </a:r>
+            <a:r>
+              <a:rPr lang="en-US" dirty="0" err="1">
+                <a:solidFill>
+                  <a:srgbClr val="00B0F0"/>
+                </a:solidFill>
+              </a:rPr>
+              <a:t>ST_DWithin</a:t>
+            </a:r>
+            <a:r>
+              <a:rPr lang="en-US" dirty="0">
+                <a:solidFill>
+                  <a:srgbClr val="00B0F0"/>
+                </a:solidFill>
+              </a:rPr>
+              <a:t>(</a:t>
+            </a:r>
+            <a:r>
+              <a:rPr lang="en-US" dirty="0" err="1">
+                <a:solidFill>
+                  <a:srgbClr val="00B0F0"/>
+                </a:solidFill>
+              </a:rPr>
+              <a:t>st.geometry</a:t>
+            </a:r>
+            <a:r>
+              <a:rPr lang="en-US" dirty="0">
+                <a:solidFill>
+                  <a:srgbClr val="00B0F0"/>
+                </a:solidFill>
+              </a:rPr>
+              <a:t>, </a:t>
+            </a:r>
+            <a:r>
+              <a:rPr lang="en-US" dirty="0" err="1">
+                <a:solidFill>
+                  <a:srgbClr val="00B0F0"/>
+                </a:solidFill>
+              </a:rPr>
+              <a:t>s.geometry</a:t>
+            </a:r>
+            <a:r>
+              <a:rPr lang="en-US" dirty="0">
+                <a:solidFill>
+                  <a:srgbClr val="00B0F0"/>
+                </a:solidFill>
+              </a:rPr>
+              <a:t>, 300)  AND </a:t>
+            </a:r>
+            <a:r>
+              <a:rPr lang="en-US" dirty="0" err="1">
+                <a:solidFill>
+                  <a:srgbClr val="00B0F0"/>
+                </a:solidFill>
+              </a:rPr>
+              <a:t>st.BOROUGH</a:t>
+            </a:r>
+            <a:r>
+              <a:rPr lang="en-US" dirty="0">
+                <a:solidFill>
+                  <a:srgbClr val="00B0F0"/>
+                </a:solidFill>
+              </a:rPr>
+              <a:t> = 'Manhattan'  AND </a:t>
+            </a:r>
+            <a:r>
+              <a:rPr lang="en-US" dirty="0" err="1">
+                <a:solidFill>
+                  <a:srgbClr val="00B0F0"/>
+                </a:solidFill>
+              </a:rPr>
+              <a:t>s.TYPE</a:t>
+            </a:r>
+            <a:r>
+              <a:rPr lang="en-US" dirty="0">
+                <a:solidFill>
+                  <a:srgbClr val="00B0F0"/>
+                </a:solidFill>
+              </a:rPr>
+              <a:t> = 'residential';</a:t>
+            </a:r>
+          </a:p>
+        </p:txBody>
+      </p:sp>
+    </p:spTree>
+    <p:extLst>
+      <p:ext uri="{BB962C8B-B14F-4D97-AF65-F5344CB8AC3E}">
+        <p14:creationId xmlns:p14="http://schemas.microsoft.com/office/powerpoint/2010/main" val="3118275270"/>
+      </p:ext>
+    </p:extLst>
+  </p:cSld>
+  <p:clrMapOvr>
+    <a:masterClrMapping/>
+  </p:clrMapOvr>
+</p:sld>
+</file>
+
+<file path=ppt/slides/slide18.xml><?xml version="1.0" encoding="utf-8"?>
+<p:sld xmlns:a="http://schemas.openxmlformats.org/drawingml/2006/main" xmlns:r="http://schemas.openxmlformats.org/officeDocument/2006/relationships" xmlns:p="http://schemas.openxmlformats.org/presentationml/2006/main">
+  <p:cSld>
+    <p:spTree>
+      <p:nvGrpSpPr>
+        <p:cNvPr id="1" name=""/>
+        <p:cNvGrpSpPr/>
+        <p:nvPr/>
+      </p:nvGrpSpPr>
+      <p:grpSpPr>
+        <a:xfrm>
+          <a:off x="0" y="0"/>
+          <a:ext cx="0" cy="0"/>
+          <a:chOff x="0" y="0"/>
+          <a:chExt cx="0" cy="0"/>
+        </a:xfrm>
+      </p:grpSpPr>
+      <p:sp>
+        <p:nvSpPr>
+          <p:cNvPr id="2" name="Title 1">
+            <a:extLst>
+              <a:ext uri="{FF2B5EF4-FFF2-40B4-BE49-F238E27FC236}">
+                <a16:creationId xmlns:a16="http://schemas.microsoft.com/office/drawing/2014/main" id="{64E36CD5-3DBF-BAE6-7CF6-585C5F525485}"/>
+              </a:ext>
+            </a:extLst>
+          </p:cNvPr>
+          <p:cNvSpPr>
+            <a:spLocks noGrp="1"/>
+          </p:cNvSpPr>
+          <p:nvPr>
+            <p:ph type="title"/>
+          </p:nvPr>
+        </p:nvSpPr>
+        <p:spPr/>
+        <p:txBody>
+          <a:bodyPr/>
+          <a:lstStyle/>
+          <a:p>
+            <a:r>
+              <a:rPr lang="en-US" dirty="0"/>
+              <a:t>TOOLS IN PGADMIN 4 – MATERIALIZED VIEWS</a:t>
+            </a:r>
+          </a:p>
+        </p:txBody>
+      </p:sp>
+      <p:sp>
+        <p:nvSpPr>
+          <p:cNvPr id="3" name="Content Placeholder 2">
+            <a:extLst>
+              <a:ext uri="{FF2B5EF4-FFF2-40B4-BE49-F238E27FC236}">
+                <a16:creationId xmlns:a16="http://schemas.microsoft.com/office/drawing/2014/main" id="{861D47DB-0F47-DE91-A1F8-68D7581EF238}"/>
+              </a:ext>
+            </a:extLst>
+          </p:cNvPr>
+          <p:cNvSpPr>
+            <a:spLocks noGrp="1"/>
+          </p:cNvSpPr>
+          <p:nvPr>
+            <p:ph idx="1"/>
+          </p:nvPr>
+        </p:nvSpPr>
+        <p:spPr>
+          <a:xfrm>
+            <a:off x="581192" y="2340864"/>
+            <a:ext cx="11029615" cy="1935861"/>
+          </a:xfrm>
+        </p:spPr>
+        <p:txBody>
+          <a:bodyPr/>
+          <a:lstStyle/>
+          <a:p>
+            <a:r>
+              <a:rPr lang="en-US" dirty="0"/>
+              <a:t>Create materialized views to store complex buffer analysis results for faster querying.</a:t>
+            </a:r>
+          </a:p>
+          <a:p>
+            <a:pPr marL="324000" lvl="1" indent="0">
+              <a:buNone/>
+            </a:pPr>
+            <a:r>
+              <a:rPr lang="en-US" dirty="0">
+                <a:solidFill>
+                  <a:srgbClr val="00B0F0"/>
+                </a:solidFill>
+              </a:rPr>
+              <a:t>CREATE MATERIALIZED VIEW ch05.station_buffers AS </a:t>
+            </a:r>
+          </a:p>
+          <a:p>
+            <a:pPr marL="324000" lvl="1" indent="0">
+              <a:buNone/>
+            </a:pPr>
+            <a:r>
+              <a:rPr lang="en-US" dirty="0">
+                <a:solidFill>
+                  <a:srgbClr val="00B0F0"/>
+                </a:solidFill>
+              </a:rPr>
+              <a:t>SELECT NAME, </a:t>
+            </a:r>
+            <a:r>
+              <a:rPr lang="en-US" dirty="0" err="1">
+                <a:solidFill>
+                  <a:srgbClr val="00B0F0"/>
+                </a:solidFill>
+              </a:rPr>
+              <a:t>ST_Buffer</a:t>
+            </a:r>
+            <a:r>
+              <a:rPr lang="en-US" dirty="0">
+                <a:solidFill>
+                  <a:srgbClr val="00B0F0"/>
+                </a:solidFill>
+              </a:rPr>
+              <a:t>(geometry, 300) AS </a:t>
+            </a:r>
+            <a:r>
+              <a:rPr lang="en-US" dirty="0" err="1">
+                <a:solidFill>
+                  <a:srgbClr val="00B0F0"/>
+                </a:solidFill>
+              </a:rPr>
+              <a:t>buffer_geom</a:t>
+            </a:r>
+            <a:r>
+              <a:rPr lang="en-US" dirty="0">
+                <a:solidFill>
+                  <a:srgbClr val="00B0F0"/>
+                </a:solidFill>
+              </a:rPr>
+              <a:t> </a:t>
+            </a:r>
+          </a:p>
+          <a:p>
+            <a:pPr marL="324000" lvl="1" indent="0">
+              <a:buNone/>
+            </a:pPr>
+            <a:r>
+              <a:rPr lang="en-US" dirty="0">
+                <a:solidFill>
+                  <a:srgbClr val="00B0F0"/>
+                </a:solidFill>
+              </a:rPr>
+              <a:t>FROM ch05.nyc_subway_stations;</a:t>
+            </a:r>
+          </a:p>
+        </p:txBody>
+      </p:sp>
+    </p:spTree>
+    <p:extLst>
+      <p:ext uri="{BB962C8B-B14F-4D97-AF65-F5344CB8AC3E}">
+        <p14:creationId xmlns:p14="http://schemas.microsoft.com/office/powerpoint/2010/main" val="2854411829"/>
+      </p:ext>
+    </p:extLst>
+  </p:cSld>
+  <p:clrMapOvr>
+    <a:masterClrMapping/>
+  </p:clrMapOvr>
+</p:sld>
+</file>
+
+<file path=ppt/slides/slide19.xml><?xml version="1.0" encoding="utf-8"?>
+<p:sld xmlns:a="http://schemas.openxmlformats.org/drawingml/2006/main" xmlns:r="http://schemas.openxmlformats.org/officeDocument/2006/relationships" xmlns:p="http://schemas.openxmlformats.org/presentationml/2006/main">
+  <p:cSld>
+    <p:spTree>
+      <p:nvGrpSpPr>
+        <p:cNvPr id="1" name=""/>
+        <p:cNvGrpSpPr/>
+        <p:nvPr/>
+      </p:nvGrpSpPr>
+      <p:grpSpPr>
+        <a:xfrm>
+          <a:off x="0" y="0"/>
+          <a:ext cx="0" cy="0"/>
+          <a:chOff x="0" y="0"/>
+          <a:chExt cx="0" cy="0"/>
+        </a:xfrm>
+      </p:grpSpPr>
+      <p:sp>
+        <p:nvSpPr>
+          <p:cNvPr id="2" name="Title 1">
+            <a:extLst>
+              <a:ext uri="{FF2B5EF4-FFF2-40B4-BE49-F238E27FC236}">
+                <a16:creationId xmlns:a16="http://schemas.microsoft.com/office/drawing/2014/main" id="{E0EC588A-D6DE-08A3-EFFB-AF7F0822DC33}"/>
+              </a:ext>
+            </a:extLst>
+          </p:cNvPr>
+          <p:cNvSpPr>
+            <a:spLocks noGrp="1"/>
+          </p:cNvSpPr>
+          <p:nvPr>
+            <p:ph type="title"/>
+          </p:nvPr>
+        </p:nvSpPr>
+        <p:spPr/>
+        <p:txBody>
+          <a:bodyPr/>
+          <a:lstStyle/>
+          <a:p>
+            <a:r>
+              <a:rPr lang="en-US" dirty="0"/>
+              <a:t>TOOLS IN PGADMIN 4 - FUNCTIONS</a:t>
+            </a:r>
+          </a:p>
+        </p:txBody>
+      </p:sp>
+      <p:sp>
+        <p:nvSpPr>
+          <p:cNvPr id="3" name="Content Placeholder 2">
+            <a:extLst>
+              <a:ext uri="{FF2B5EF4-FFF2-40B4-BE49-F238E27FC236}">
+                <a16:creationId xmlns:a16="http://schemas.microsoft.com/office/drawing/2014/main" id="{BE6037DF-D050-5883-3EC2-3BDD696D1E25}"/>
+              </a:ext>
+            </a:extLst>
+          </p:cNvPr>
+          <p:cNvSpPr>
+            <a:spLocks noGrp="1"/>
+          </p:cNvSpPr>
+          <p:nvPr>
+            <p:ph idx="1"/>
+          </p:nvPr>
+        </p:nvSpPr>
+        <p:spPr/>
+        <p:txBody>
+          <a:bodyPr>
+            <a:normAutofit lnSpcReduction="10000"/>
+          </a:bodyPr>
+          <a:lstStyle/>
+          <a:p>
+            <a:r>
+              <a:rPr lang="en-US" dirty="0"/>
+              <a:t>Write custom SQL functions to automate repetitive buffer analysis tasks.</a:t>
+            </a:r>
+          </a:p>
+          <a:p>
+            <a:endParaRPr lang="en-US" dirty="0"/>
+          </a:p>
+          <a:p>
+            <a:pPr marL="324000" lvl="1" indent="0">
+              <a:buNone/>
+            </a:pPr>
+            <a:r>
+              <a:rPr lang="en-US" dirty="0">
+                <a:solidFill>
+                  <a:srgbClr val="00B0F0"/>
+                </a:solidFill>
+              </a:rPr>
+              <a:t>CREATE FUNCTION ch05.get_stations_within_buffer(distance FLOAT) </a:t>
+            </a:r>
+          </a:p>
+          <a:p>
+            <a:pPr marL="324000" lvl="1" indent="0">
+              <a:buNone/>
+            </a:pPr>
+            <a:r>
+              <a:rPr lang="en-US" dirty="0">
+                <a:solidFill>
+                  <a:srgbClr val="00B0F0"/>
+                </a:solidFill>
+              </a:rPr>
+              <a:t>RETURNS TABLE(</a:t>
+            </a:r>
+            <a:r>
+              <a:rPr lang="en-US" dirty="0" err="1">
+                <a:solidFill>
+                  <a:srgbClr val="00B0F0"/>
+                </a:solidFill>
+              </a:rPr>
+              <a:t>station_name</a:t>
+            </a:r>
+            <a:r>
+              <a:rPr lang="en-US" dirty="0">
+                <a:solidFill>
+                  <a:srgbClr val="00B0F0"/>
+                </a:solidFill>
+              </a:rPr>
+              <a:t> TEXT, </a:t>
+            </a:r>
+            <a:r>
+              <a:rPr lang="en-US" dirty="0" err="1">
+                <a:solidFill>
+                  <a:srgbClr val="00B0F0"/>
+                </a:solidFill>
+              </a:rPr>
+              <a:t>street_name</a:t>
+            </a:r>
+            <a:r>
+              <a:rPr lang="en-US" dirty="0">
+                <a:solidFill>
+                  <a:srgbClr val="00B0F0"/>
+                </a:solidFill>
+              </a:rPr>
+              <a:t> TEXT) AS $$</a:t>
+            </a:r>
+          </a:p>
+          <a:p>
+            <a:pPr marL="324000" lvl="1" indent="0">
+              <a:buNone/>
+            </a:pPr>
+            <a:r>
+              <a:rPr lang="en-US" dirty="0">
+                <a:solidFill>
+                  <a:srgbClr val="00B0F0"/>
+                </a:solidFill>
+              </a:rPr>
+              <a:t>BEGIN  </a:t>
+            </a:r>
+          </a:p>
+          <a:p>
+            <a:pPr marL="324000" lvl="1" indent="0">
+              <a:buNone/>
+            </a:pPr>
+            <a:r>
+              <a:rPr lang="en-US" dirty="0">
+                <a:solidFill>
+                  <a:srgbClr val="00B0F0"/>
+                </a:solidFill>
+              </a:rPr>
+              <a:t>RETURN QUERY   </a:t>
+            </a:r>
+          </a:p>
+          <a:p>
+            <a:pPr marL="324000" lvl="1" indent="0">
+              <a:buNone/>
+            </a:pPr>
+            <a:r>
+              <a:rPr lang="en-US" dirty="0">
+                <a:solidFill>
+                  <a:srgbClr val="00B0F0"/>
+                </a:solidFill>
+              </a:rPr>
+              <a:t>SELECT st.NAME, s.NAME   </a:t>
+            </a:r>
+          </a:p>
+          <a:p>
+            <a:pPr marL="324000" lvl="1" indent="0">
+              <a:buNone/>
+            </a:pPr>
+            <a:r>
+              <a:rPr lang="en-US" dirty="0">
+                <a:solidFill>
+                  <a:srgbClr val="00B0F0"/>
+                </a:solidFill>
+              </a:rPr>
+              <a:t>FROM ch05.nyc_subway_stations </a:t>
+            </a:r>
+            <a:r>
+              <a:rPr lang="en-US" dirty="0" err="1">
+                <a:solidFill>
+                  <a:srgbClr val="00B0F0"/>
+                </a:solidFill>
+              </a:rPr>
+              <a:t>st</a:t>
+            </a:r>
+            <a:r>
+              <a:rPr lang="en-US" dirty="0">
+                <a:solidFill>
+                  <a:srgbClr val="00B0F0"/>
+                </a:solidFill>
+              </a:rPr>
+              <a:t>, ch05.nyc_streets s   </a:t>
+            </a:r>
+          </a:p>
+          <a:p>
+            <a:pPr marL="324000" lvl="1" indent="0">
+              <a:buNone/>
+            </a:pPr>
+            <a:r>
+              <a:rPr lang="en-US" dirty="0">
+                <a:solidFill>
+                  <a:srgbClr val="00B0F0"/>
+                </a:solidFill>
+              </a:rPr>
+              <a:t>WHERE </a:t>
+            </a:r>
+            <a:r>
+              <a:rPr lang="en-US" dirty="0" err="1">
+                <a:solidFill>
+                  <a:srgbClr val="00B0F0"/>
+                </a:solidFill>
+              </a:rPr>
+              <a:t>ST_DWithin</a:t>
+            </a:r>
+            <a:r>
+              <a:rPr lang="en-US" dirty="0">
+                <a:solidFill>
+                  <a:srgbClr val="00B0F0"/>
+                </a:solidFill>
+              </a:rPr>
+              <a:t>(</a:t>
+            </a:r>
+            <a:r>
+              <a:rPr lang="en-US" dirty="0" err="1">
+                <a:solidFill>
+                  <a:srgbClr val="00B0F0"/>
+                </a:solidFill>
+              </a:rPr>
+              <a:t>st.geometry</a:t>
+            </a:r>
+            <a:r>
+              <a:rPr lang="en-US" dirty="0">
+                <a:solidFill>
+                  <a:srgbClr val="00B0F0"/>
+                </a:solidFill>
+              </a:rPr>
+              <a:t>, </a:t>
+            </a:r>
+            <a:r>
+              <a:rPr lang="en-US" dirty="0" err="1">
+                <a:solidFill>
+                  <a:srgbClr val="00B0F0"/>
+                </a:solidFill>
+              </a:rPr>
+              <a:t>s.geometry</a:t>
+            </a:r>
+            <a:r>
+              <a:rPr lang="en-US" dirty="0">
+                <a:solidFill>
+                  <a:srgbClr val="00B0F0"/>
+                </a:solidFill>
+              </a:rPr>
+              <a:t>, distance);</a:t>
+            </a:r>
+          </a:p>
+          <a:p>
+            <a:pPr marL="324000" lvl="1" indent="0">
+              <a:buNone/>
+            </a:pPr>
+            <a:r>
+              <a:rPr lang="en-US" dirty="0">
+                <a:solidFill>
+                  <a:srgbClr val="00B0F0"/>
+                </a:solidFill>
+              </a:rPr>
+              <a:t>END;$$ LANGUAGE </a:t>
+            </a:r>
+            <a:r>
+              <a:rPr lang="en-US" dirty="0" err="1">
+                <a:solidFill>
+                  <a:srgbClr val="00B0F0"/>
+                </a:solidFill>
+              </a:rPr>
+              <a:t>plpgsql</a:t>
+            </a:r>
+            <a:r>
+              <a:rPr lang="en-US" dirty="0">
+                <a:solidFill>
+                  <a:srgbClr val="00B0F0"/>
+                </a:solidFill>
+              </a:rPr>
+              <a:t>;</a:t>
+            </a:r>
+          </a:p>
+        </p:txBody>
+      </p:sp>
+    </p:spTree>
+    <p:extLst>
+      <p:ext uri="{BB962C8B-B14F-4D97-AF65-F5344CB8AC3E}">
+        <p14:creationId xmlns:p14="http://schemas.microsoft.com/office/powerpoint/2010/main" val="2221672660"/>
       </p:ext>
     </p:extLst>
   </p:cSld>
@@ -5305,6 +7376,285 @@
     <p:extLst>
       <p:ext uri="{BB962C8B-B14F-4D97-AF65-F5344CB8AC3E}">
         <p14:creationId xmlns:p14="http://schemas.microsoft.com/office/powerpoint/2010/main" val="1888964802"/>
+      </p:ext>
+    </p:extLst>
+  </p:cSld>
+  <p:clrMapOvr>
+    <a:masterClrMapping/>
+  </p:clrMapOvr>
+</p:sld>
+</file>
+
+<file path=ppt/slides/slide20.xml><?xml version="1.0" encoding="utf-8"?>
+<p:sld xmlns:a="http://schemas.openxmlformats.org/drawingml/2006/main" xmlns:r="http://schemas.openxmlformats.org/officeDocument/2006/relationships" xmlns:p="http://schemas.openxmlformats.org/presentationml/2006/main">
+  <p:cSld>
+    <p:spTree>
+      <p:nvGrpSpPr>
+        <p:cNvPr id="1" name=""/>
+        <p:cNvGrpSpPr/>
+        <p:nvPr/>
+      </p:nvGrpSpPr>
+      <p:grpSpPr>
+        <a:xfrm>
+          <a:off x="0" y="0"/>
+          <a:ext cx="0" cy="0"/>
+          <a:chOff x="0" y="0"/>
+          <a:chExt cx="0" cy="0"/>
+        </a:xfrm>
+      </p:grpSpPr>
+      <p:sp>
+        <p:nvSpPr>
+          <p:cNvPr id="2" name="Title 1">
+            <a:extLst>
+              <a:ext uri="{FF2B5EF4-FFF2-40B4-BE49-F238E27FC236}">
+                <a16:creationId xmlns:a16="http://schemas.microsoft.com/office/drawing/2014/main" id="{6AFDAB0B-1269-9F6C-D8A0-E3650409C648}"/>
+              </a:ext>
+            </a:extLst>
+          </p:cNvPr>
+          <p:cNvSpPr>
+            <a:spLocks noGrp="1"/>
+          </p:cNvSpPr>
+          <p:nvPr>
+            <p:ph type="title"/>
+          </p:nvPr>
+        </p:nvSpPr>
+        <p:spPr/>
+        <p:txBody>
+          <a:bodyPr/>
+          <a:lstStyle/>
+          <a:p>
+            <a:r>
+              <a:rPr lang="en-US" dirty="0"/>
+              <a:t>TOOLS IN PGADMIN 4 - VIEWS</a:t>
+            </a:r>
+          </a:p>
+        </p:txBody>
+      </p:sp>
+      <p:sp>
+        <p:nvSpPr>
+          <p:cNvPr id="3" name="Content Placeholder 2">
+            <a:extLst>
+              <a:ext uri="{FF2B5EF4-FFF2-40B4-BE49-F238E27FC236}">
+                <a16:creationId xmlns:a16="http://schemas.microsoft.com/office/drawing/2014/main" id="{57CF7F19-5B2B-AB2D-263A-2A3D1302199B}"/>
+              </a:ext>
+            </a:extLst>
+          </p:cNvPr>
+          <p:cNvSpPr>
+            <a:spLocks noGrp="1"/>
+          </p:cNvSpPr>
+          <p:nvPr>
+            <p:ph idx="1"/>
+          </p:nvPr>
+        </p:nvSpPr>
+        <p:spPr/>
+        <p:txBody>
+          <a:bodyPr/>
+          <a:lstStyle/>
+          <a:p>
+            <a:r>
+              <a:rPr lang="en-US" dirty="0"/>
+              <a:t>Simplify complex queries with views for better data visualization.</a:t>
+            </a:r>
+          </a:p>
+          <a:p>
+            <a:endParaRPr lang="en-US" dirty="0"/>
+          </a:p>
+          <a:p>
+            <a:pPr marL="594000" lvl="2" indent="0">
+              <a:buNone/>
+            </a:pPr>
+            <a:r>
+              <a:rPr lang="en-US" dirty="0">
+                <a:solidFill>
+                  <a:srgbClr val="00B0F0"/>
+                </a:solidFill>
+              </a:rPr>
+              <a:t>CREATE VIEW ch05.residential_near_stations AS </a:t>
+            </a:r>
+          </a:p>
+          <a:p>
+            <a:pPr marL="594000" lvl="2" indent="0">
+              <a:buNone/>
+            </a:pPr>
+            <a:r>
+              <a:rPr lang="en-US" dirty="0">
+                <a:solidFill>
+                  <a:srgbClr val="00B0F0"/>
+                </a:solidFill>
+              </a:rPr>
+              <a:t>SELECT s.NAME AS </a:t>
+            </a:r>
+            <a:r>
+              <a:rPr lang="en-US" dirty="0" err="1">
+                <a:solidFill>
+                  <a:srgbClr val="00B0F0"/>
+                </a:solidFill>
+              </a:rPr>
+              <a:t>street_name</a:t>
+            </a:r>
+            <a:r>
+              <a:rPr lang="en-US" dirty="0">
+                <a:solidFill>
+                  <a:srgbClr val="00B0F0"/>
+                </a:solidFill>
+              </a:rPr>
+              <a:t>, st.NAME AS </a:t>
+            </a:r>
+            <a:r>
+              <a:rPr lang="en-US" dirty="0" err="1">
+                <a:solidFill>
+                  <a:srgbClr val="00B0F0"/>
+                </a:solidFill>
+              </a:rPr>
+              <a:t>station_name</a:t>
+            </a:r>
+            <a:r>
+              <a:rPr lang="en-US" dirty="0">
+                <a:solidFill>
+                  <a:srgbClr val="00B0F0"/>
+                </a:solidFill>
+              </a:rPr>
+              <a:t> </a:t>
+            </a:r>
+          </a:p>
+          <a:p>
+            <a:pPr marL="594000" lvl="2" indent="0">
+              <a:buNone/>
+            </a:pPr>
+            <a:r>
+              <a:rPr lang="en-US" dirty="0">
+                <a:solidFill>
+                  <a:srgbClr val="00B0F0"/>
+                </a:solidFill>
+              </a:rPr>
+              <a:t>FROM ch05.nyc_streets s </a:t>
+            </a:r>
+          </a:p>
+          <a:p>
+            <a:pPr marL="594000" lvl="2" indent="0">
+              <a:buNone/>
+            </a:pPr>
+            <a:r>
+              <a:rPr lang="en-US" dirty="0">
+                <a:solidFill>
+                  <a:srgbClr val="00B0F0"/>
+                </a:solidFill>
+              </a:rPr>
+              <a:t>JOIN ch05.nyc_subway_stations </a:t>
+            </a:r>
+            <a:r>
+              <a:rPr lang="en-US" dirty="0" err="1">
+                <a:solidFill>
+                  <a:srgbClr val="00B0F0"/>
+                </a:solidFill>
+              </a:rPr>
+              <a:t>st</a:t>
+            </a:r>
+            <a:r>
+              <a:rPr lang="en-US" dirty="0">
+                <a:solidFill>
+                  <a:srgbClr val="00B0F0"/>
+                </a:solidFill>
+              </a:rPr>
+              <a:t> </a:t>
+            </a:r>
+          </a:p>
+          <a:p>
+            <a:pPr marL="594000" lvl="2" indent="0">
+              <a:buNone/>
+            </a:pPr>
+            <a:r>
+              <a:rPr lang="en-US" dirty="0">
+                <a:solidFill>
+                  <a:srgbClr val="00B0F0"/>
+                </a:solidFill>
+              </a:rPr>
+              <a:t>ON </a:t>
+            </a:r>
+            <a:r>
+              <a:rPr lang="en-US" dirty="0" err="1">
+                <a:solidFill>
+                  <a:srgbClr val="00B0F0"/>
+                </a:solidFill>
+              </a:rPr>
+              <a:t>ST_DWithin</a:t>
+            </a:r>
+            <a:r>
+              <a:rPr lang="en-US" dirty="0">
+                <a:solidFill>
+                  <a:srgbClr val="00B0F0"/>
+                </a:solidFill>
+              </a:rPr>
+              <a:t>(</a:t>
+            </a:r>
+            <a:r>
+              <a:rPr lang="en-US" dirty="0" err="1">
+                <a:solidFill>
+                  <a:srgbClr val="00B0F0"/>
+                </a:solidFill>
+              </a:rPr>
+              <a:t>s.geometry</a:t>
+            </a:r>
+            <a:r>
+              <a:rPr lang="en-US" dirty="0">
+                <a:solidFill>
+                  <a:srgbClr val="00B0F0"/>
+                </a:solidFill>
+              </a:rPr>
+              <a:t>, </a:t>
+            </a:r>
+            <a:r>
+              <a:rPr lang="en-US" dirty="0" err="1">
+                <a:solidFill>
+                  <a:srgbClr val="00B0F0"/>
+                </a:solidFill>
+              </a:rPr>
+              <a:t>st.geometry</a:t>
+            </a:r>
+            <a:r>
+              <a:rPr lang="en-US" dirty="0">
+                <a:solidFill>
+                  <a:srgbClr val="00B0F0"/>
+                </a:solidFill>
+              </a:rPr>
+              <a:t>, 300) </a:t>
+            </a:r>
+          </a:p>
+          <a:p>
+            <a:pPr marL="594000" lvl="2" indent="0">
+              <a:buNone/>
+            </a:pPr>
+            <a:r>
+              <a:rPr lang="en-US" dirty="0">
+                <a:solidFill>
+                  <a:srgbClr val="00B0F0"/>
+                </a:solidFill>
+              </a:rPr>
+              <a:t>WHERE </a:t>
+            </a:r>
+            <a:r>
+              <a:rPr lang="en-US" dirty="0" err="1">
+                <a:solidFill>
+                  <a:srgbClr val="00B0F0"/>
+                </a:solidFill>
+              </a:rPr>
+              <a:t>s.TYPE</a:t>
+            </a:r>
+            <a:r>
+              <a:rPr lang="en-US" dirty="0">
+                <a:solidFill>
+                  <a:srgbClr val="00B0F0"/>
+                </a:solidFill>
+              </a:rPr>
+              <a:t> = 'residential';</a:t>
+            </a:r>
+          </a:p>
+        </p:txBody>
+      </p:sp>
+    </p:spTree>
+    <p:extLst>
+      <p:ext uri="{BB962C8B-B14F-4D97-AF65-F5344CB8AC3E}">
+        <p14:creationId xmlns:p14="http://schemas.microsoft.com/office/powerpoint/2010/main" val="3857661707"/>
       </p:ext>
     </p:extLst>
   </p:cSld>
@@ -6021,31 +8371,35 @@
           <a:chExt cx="0" cy="0"/>
         </a:xfrm>
       </p:grpSpPr>
-      <p:sp>
-        <p:nvSpPr>
-          <p:cNvPr id="3" name="Content Placeholder 2">
+      <p:pic>
+        <p:nvPicPr>
+          <p:cNvPr id="4" name="Content Placeholder 3">
             <a:extLst>
               <a:ext uri="{FF2B5EF4-FFF2-40B4-BE49-F238E27FC236}">
-                <a16:creationId xmlns:a16="http://schemas.microsoft.com/office/drawing/2014/main" id="{E9BE8762-560B-06E5-A636-513AE61E8224}"/>
+                <a16:creationId xmlns:a16="http://schemas.microsoft.com/office/drawing/2014/main" id="{011EB1D5-0AFC-852E-AC8C-65814213A793}"/>
               </a:ext>
             </a:extLst>
           </p:cNvPr>
-          <p:cNvSpPr>
-            <a:spLocks noGrp="1"/>
-          </p:cNvSpPr>
+          <p:cNvPicPr>
+            <a:picLocks noGrp="1" noChangeAspect="1"/>
+          </p:cNvPicPr>
           <p:nvPr>
             <p:ph idx="1"/>
           </p:nvPr>
-        </p:nvSpPr>
-        <p:spPr/>
-        <p:txBody>
-          <a:bodyPr/>
-          <a:lstStyle/>
-          <a:p>
-            <a:endParaRPr lang="en-US"/>
-          </a:p>
-        </p:txBody>
-      </p:sp>
+        </p:nvPicPr>
+        <p:blipFill>
+          <a:blip r:embed="rId2"/>
+          <a:stretch>
+            <a:fillRect/>
+          </a:stretch>
+        </p:blipFill>
+        <p:spPr>
+          <a:xfrm>
+            <a:off x="6900692" y="1243657"/>
+            <a:ext cx="4410512" cy="4974263"/>
+          </a:xfrm>
+        </p:spPr>
+      </p:pic>
       <p:sp>
         <p:nvSpPr>
           <p:cNvPr id="6" name="TextBox 5">
@@ -6130,8 +8484,8 @@
         </p:nvSpPr>
         <p:spPr>
           <a:xfrm>
-            <a:off x="657392" y="1343336"/>
-            <a:ext cx="11029615" cy="1843209"/>
+            <a:off x="657392" y="1333811"/>
+            <a:ext cx="11029615" cy="2209489"/>
           </a:xfrm>
         </p:spPr>
         <p:txBody>
@@ -6140,7 +8494,11 @@
           <a:p>
             <a:r>
               <a:rPr lang="en-US" dirty="0"/>
-              <a:t>Find all streets within 500 meters of subway stations in Manhattan.</a:t>
+              <a:t> </a:t>
+            </a:r>
+            <a:r>
+              <a:rPr lang="en-US" sz="2400" dirty="0"/>
+              <a:t>Find all streets within 50 meters of subway stations (using buffer).</a:t>
             </a:r>
           </a:p>
           <a:p>
@@ -6148,105 +8506,38 @@
               <a:buNone/>
             </a:pPr>
             <a:r>
-              <a:rPr lang="en-US" dirty="0">
-                <a:solidFill>
-                  <a:srgbClr val="00B0F0"/>
-                </a:solidFill>
-              </a:rPr>
-              <a:t>SELECT s.NAME AS </a:t>
-            </a:r>
-            <a:r>
-              <a:rPr lang="en-US" dirty="0" err="1">
-                <a:solidFill>
-                  <a:srgbClr val="00B0F0"/>
-                </a:solidFill>
-              </a:rPr>
-              <a:t>street_name</a:t>
-            </a:r>
-            <a:r>
-              <a:rPr lang="en-US" dirty="0">
-                <a:solidFill>
-                  <a:srgbClr val="00B0F0"/>
-                </a:solidFill>
-              </a:rPr>
-              <a:t>, st.NAME AS </a:t>
-            </a:r>
-            <a:r>
-              <a:rPr lang="en-US" dirty="0" err="1">
-                <a:solidFill>
-                  <a:srgbClr val="00B0F0"/>
-                </a:solidFill>
-              </a:rPr>
-              <a:t>station_name</a:t>
-            </a:r>
-            <a:r>
-              <a:rPr lang="en-US" dirty="0">
-                <a:solidFill>
-                  <a:srgbClr val="00B0F0"/>
-                </a:solidFill>
-              </a:rPr>
-              <a:t>  </a:t>
-            </a:r>
+              <a:rPr lang="en-US" sz="1800" dirty="0">
+                <a:solidFill>
+                  <a:srgbClr val="00B0F0"/>
+                </a:solidFill>
+              </a:rPr>
+              <a:t>SELECT name, </a:t>
+            </a:r>
+            <a:r>
+              <a:rPr lang="en-US" sz="1800" dirty="0" err="1">
+                <a:solidFill>
+                  <a:srgbClr val="00B0F0"/>
+                </a:solidFill>
+              </a:rPr>
+              <a:t>borough_name</a:t>
+            </a:r>
+            <a:endParaRPr lang="en-US" sz="1800" dirty="0">
+              <a:solidFill>
+                <a:srgbClr val="00B0F0"/>
+              </a:solidFill>
+            </a:endParaRPr>
           </a:p>
           <a:p>
             <a:pPr marL="324000" lvl="1" indent="0">
               <a:buNone/>
             </a:pPr>
             <a:r>
-              <a:rPr lang="en-US" dirty="0">
-                <a:solidFill>
-                  <a:srgbClr val="00B0F0"/>
-                </a:solidFill>
-              </a:rPr>
-              <a:t>FROM </a:t>
-            </a:r>
-            <a:r>
-              <a:rPr lang="en-US" dirty="0" err="1">
-                <a:solidFill>
-                  <a:srgbClr val="00B0F0"/>
-                </a:solidFill>
-              </a:rPr>
-              <a:t>nyc_streets</a:t>
-            </a:r>
-            <a:r>
-              <a:rPr lang="en-US" dirty="0">
-                <a:solidFill>
-                  <a:srgbClr val="00B0F0"/>
-                </a:solidFill>
-              </a:rPr>
-              <a:t> s, </a:t>
-            </a:r>
-            <a:r>
-              <a:rPr lang="en-US" dirty="0" err="1">
-                <a:solidFill>
-                  <a:srgbClr val="00B0F0"/>
-                </a:solidFill>
-              </a:rPr>
-              <a:t>nyc_subway_stations</a:t>
-            </a:r>
-            <a:r>
-              <a:rPr lang="en-US" dirty="0">
-                <a:solidFill>
-                  <a:srgbClr val="00B0F0"/>
-                </a:solidFill>
-              </a:rPr>
-              <a:t> </a:t>
-            </a:r>
-            <a:r>
-              <a:rPr lang="en-US" dirty="0" err="1">
-                <a:solidFill>
-                  <a:srgbClr val="00B0F0"/>
-                </a:solidFill>
-              </a:rPr>
-              <a:t>st</a:t>
-            </a:r>
-            <a:r>
-              <a:rPr lang="en-US" dirty="0">
-                <a:solidFill>
-                  <a:srgbClr val="00B0F0"/>
-                </a:solidFill>
-              </a:rPr>
-              <a:t>  </a:t>
+              <a:rPr lang="en-US" sz="1800" dirty="0">
+                <a:solidFill>
+                  <a:srgbClr val="00B0F0"/>
+                </a:solidFill>
+              </a:rPr>
+              <a:t>FROM ch05.streets , ch05.subway</a:t>
             </a:r>
           </a:p>
           <a:p>
@@ -6254,7 +8545,7 @@
               <a:buNone/>
             </a:pPr>
             <a:r>
-              <a:rPr lang="en-US" dirty="0">
+              <a:rPr lang="en-US" sz="1800" dirty="0">
                 <a:solidFill>
                   <a:srgbClr val="00B0F0"/>
                 </a:solidFill>
@@ -6262,68 +8553,36 @@
               <a:t>WHERE </a:t>
             </a:r>
             <a:r>
-              <a:rPr lang="en-US" dirty="0" err="1">
-                <a:solidFill>
-                  <a:srgbClr val="00B0F0"/>
-                </a:solidFill>
-              </a:rPr>
-              <a:t>ST_DWithin</a:t>
-            </a:r>
-            <a:r>
-              <a:rPr lang="en-US" dirty="0">
-                <a:solidFill>
-                  <a:srgbClr val="00B0F0"/>
-                </a:solidFill>
-              </a:rPr>
-              <a:t>(</a:t>
-            </a:r>
-            <a:r>
-              <a:rPr lang="en-US" dirty="0" err="1">
-                <a:solidFill>
-                  <a:srgbClr val="00B0F0"/>
-                </a:solidFill>
-              </a:rPr>
-              <a:t>s.geometry</a:t>
-            </a:r>
-            <a:r>
-              <a:rPr lang="en-US" dirty="0">
-                <a:solidFill>
-                  <a:srgbClr val="00B0F0"/>
-                </a:solidFill>
-              </a:rPr>
-              <a:t>, </a:t>
-            </a:r>
-            <a:r>
-              <a:rPr lang="en-US" dirty="0" err="1">
-                <a:solidFill>
-                  <a:srgbClr val="00B0F0"/>
-                </a:solidFill>
-              </a:rPr>
-              <a:t>st.geometry</a:t>
-            </a:r>
-            <a:r>
-              <a:rPr lang="en-US" dirty="0">
-                <a:solidFill>
-                  <a:srgbClr val="00B0F0"/>
-                </a:solidFill>
-              </a:rPr>
-              <a:t>, 500)  AND </a:t>
-            </a:r>
-            <a:r>
-              <a:rPr lang="en-US" dirty="0" err="1">
-                <a:solidFill>
-                  <a:srgbClr val="00B0F0"/>
-                </a:solidFill>
-              </a:rPr>
-              <a:t>st.BOROUGH</a:t>
-            </a:r>
-            <a:r>
-              <a:rPr lang="en-US" dirty="0">
-                <a:solidFill>
-                  <a:srgbClr val="00B0F0"/>
-                </a:solidFill>
-              </a:rPr>
-              <a:t> = 'Manhattan';</a:t>
+              <a:rPr lang="en-US" sz="1800" dirty="0" err="1">
+                <a:solidFill>
+                  <a:srgbClr val="00B0F0"/>
+                </a:solidFill>
+              </a:rPr>
+              <a:t>ST_Intersects</a:t>
+            </a:r>
+            <a:r>
+              <a:rPr lang="en-US" sz="1800" dirty="0">
+                <a:solidFill>
+                  <a:srgbClr val="00B0F0"/>
+                </a:solidFill>
+              </a:rPr>
+              <a:t>(ch05.streets.geom, </a:t>
+            </a:r>
+            <a:r>
+              <a:rPr lang="en-US" sz="1800" dirty="0" err="1">
+                <a:solidFill>
+                  <a:srgbClr val="00B0F0"/>
+                </a:solidFill>
+              </a:rPr>
+              <a:t>ST_Buffer</a:t>
+            </a:r>
+            <a:r>
+              <a:rPr lang="en-US" sz="1800" dirty="0">
+                <a:solidFill>
+                  <a:srgbClr val="00B0F0"/>
+                </a:solidFill>
+              </a:rPr>
+              <a:t>(ch05.subway.geom, 50))</a:t>
             </a:r>
           </a:p>
         </p:txBody>
@@ -6342,7 +8601,7 @@
         </p:nvSpPr>
         <p:spPr>
           <a:xfrm>
-            <a:off x="657392" y="820116"/>
+            <a:off x="657392" y="705816"/>
             <a:ext cx="5514808" cy="523220"/>
           </a:xfrm>
           <a:prstGeom prst="rect">
@@ -6358,15 +8617,19 @@
           <a:p>
             <a:r>
               <a:rPr lang="en-US" sz="2800" dirty="0"/>
-              <a:t>Exercise: </a:t>
+              <a:t>Ex</a:t>
+            </a:r>
+            <a:r>
+              <a:rPr lang="en-US" altLang="zh-CN" sz="2800" dirty="0"/>
+              <a:t>ample 1</a:t>
+            </a:r>
+            <a:r>
+              <a:rPr lang="en-US" sz="2800" dirty="0"/>
+              <a:t>: </a:t>
             </a:r>
             <a:r>
               <a:rPr lang="en-US" sz="2800" dirty="0" err="1"/>
-              <a:t>ST_DW</a:t>
-            </a:r>
-            <a:r>
-              <a:rPr lang="en-US" altLang="zh-CN" sz="2800" dirty="0" err="1"/>
-              <a:t>ithin</a:t>
+              <a:t>ST_Intersects</a:t>
             </a:r>
             <a:endParaRPr lang="en-US" sz="2800" dirty="0"/>
           </a:p>
@@ -6404,10 +8667,10 @@
       </p:grpSpPr>
       <p:sp>
         <p:nvSpPr>
-          <p:cNvPr id="2" name="Title 1">
+          <p:cNvPr id="3" name="Content Placeholder 2">
             <a:extLst>
               <a:ext uri="{FF2B5EF4-FFF2-40B4-BE49-F238E27FC236}">
-                <a16:creationId xmlns:a16="http://schemas.microsoft.com/office/drawing/2014/main" id="{68997778-0D92-C897-B435-DC143BD6E979}"/>
+                <a16:creationId xmlns:a16="http://schemas.microsoft.com/office/drawing/2014/main" id="{6A9CA78D-49EC-E613-9580-B1B826112245}"/>
               </a:ext>
             </a:extLst>
           </p:cNvPr>
@@ -6415,10 +8678,15 @@
             <a:spLocks noGrp="1"/>
           </p:cNvSpPr>
           <p:nvPr>
-            <p:ph type="title"/>
-          </p:nvPr>
-        </p:nvSpPr>
-        <p:spPr/>
+            <p:ph idx="1"/>
+          </p:nvPr>
+        </p:nvSpPr>
+        <p:spPr>
+          <a:xfrm>
+            <a:off x="657392" y="1359789"/>
+            <a:ext cx="11029615" cy="2221611"/>
+          </a:xfrm>
+        </p:spPr>
         <p:txBody>
           <a:bodyPr>
             <a:normAutofit/>
@@ -6426,131 +8694,164 @@
           <a:lstStyle/>
           <a:p>
             <a:r>
-              <a:rPr lang="en-US" b="1" dirty="0"/>
-              <a:t>Scenario 2</a:t>
-            </a:r>
-            <a:endParaRPr lang="en-US" dirty="0"/>
-          </a:p>
-        </p:txBody>
-      </p:sp>
-      <p:sp>
-        <p:nvSpPr>
-          <p:cNvPr id="3" name="Content Placeholder 2">
+              <a:rPr lang="en-US" sz="2000" dirty="0"/>
+              <a:t>Find all one-way streets within 50 meters of subway stations.</a:t>
+            </a:r>
+          </a:p>
+          <a:p>
+            <a:pPr marL="324000" lvl="1" indent="0">
+              <a:buNone/>
+            </a:pPr>
+            <a:r>
+              <a:rPr lang="en-US" sz="2000" dirty="0">
+                <a:solidFill>
+                  <a:srgbClr val="00B0F0"/>
+                </a:solidFill>
+              </a:rPr>
+              <a:t>SELECT name, </a:t>
+            </a:r>
+            <a:r>
+              <a:rPr lang="en-US" sz="2000" dirty="0" err="1">
+                <a:solidFill>
+                  <a:srgbClr val="00B0F0"/>
+                </a:solidFill>
+              </a:rPr>
+              <a:t>borough_name</a:t>
+            </a:r>
+            <a:endParaRPr lang="en-US" sz="2000" dirty="0">
+              <a:solidFill>
+                <a:srgbClr val="00B0F0"/>
+              </a:solidFill>
+            </a:endParaRPr>
+          </a:p>
+          <a:p>
+            <a:pPr marL="324000" lvl="1" indent="0">
+              <a:buNone/>
+            </a:pPr>
+            <a:r>
+              <a:rPr lang="en-US" sz="2000" dirty="0">
+                <a:solidFill>
+                  <a:srgbClr val="00B0F0"/>
+                </a:solidFill>
+              </a:rPr>
+              <a:t>FROM ch05.streets, ch05.subway</a:t>
+            </a:r>
+          </a:p>
+          <a:p>
+            <a:pPr marL="324000" lvl="1" indent="0">
+              <a:buNone/>
+            </a:pPr>
+            <a:r>
+              <a:rPr lang="en-US" sz="2000" dirty="0">
+                <a:solidFill>
+                  <a:srgbClr val="00B0F0"/>
+                </a:solidFill>
+              </a:rPr>
+              <a:t>WHERE </a:t>
+            </a:r>
+            <a:r>
+              <a:rPr lang="en-US" sz="2000" dirty="0" err="1">
+                <a:solidFill>
+                  <a:srgbClr val="00B0F0"/>
+                </a:solidFill>
+              </a:rPr>
+              <a:t>oneway</a:t>
+            </a:r>
+            <a:r>
+              <a:rPr lang="en-US" sz="2000" dirty="0">
+                <a:solidFill>
+                  <a:srgbClr val="00B0F0"/>
+                </a:solidFill>
+              </a:rPr>
+              <a:t> = 'Yes’ AND </a:t>
+            </a:r>
+            <a:r>
+              <a:rPr lang="en-US" sz="2000" dirty="0" err="1">
+                <a:solidFill>
+                  <a:srgbClr val="00B0F0"/>
+                </a:solidFill>
+              </a:rPr>
+              <a:t>ST_Intersects</a:t>
+            </a:r>
+            <a:r>
+              <a:rPr lang="en-US" sz="2000" dirty="0">
+                <a:solidFill>
+                  <a:srgbClr val="00B0F0"/>
+                </a:solidFill>
+              </a:rPr>
+              <a:t>(ch05.streets.geom, </a:t>
+            </a:r>
+            <a:r>
+              <a:rPr lang="en-US" sz="2000" dirty="0" err="1">
+                <a:solidFill>
+                  <a:srgbClr val="00B0F0"/>
+                </a:solidFill>
+              </a:rPr>
+              <a:t>ST_Buffer</a:t>
+            </a:r>
+            <a:r>
+              <a:rPr lang="en-US" sz="2000" dirty="0">
+                <a:solidFill>
+                  <a:srgbClr val="00B0F0"/>
+                </a:solidFill>
+              </a:rPr>
+              <a:t>(ch05.subway.geom, 50))</a:t>
+            </a:r>
+          </a:p>
+        </p:txBody>
+      </p:sp>
+      <p:sp>
+        <p:nvSpPr>
+          <p:cNvPr id="4" name="TextBox 3">
             <a:extLst>
               <a:ext uri="{FF2B5EF4-FFF2-40B4-BE49-F238E27FC236}">
-                <a16:creationId xmlns:a16="http://schemas.microsoft.com/office/drawing/2014/main" id="{86BB65ED-F08E-6AF8-CE05-FABCF43D860C}"/>
+                <a16:creationId xmlns:a16="http://schemas.microsoft.com/office/drawing/2014/main" id="{DCAA6E37-B83C-AF15-4609-B21F02744E0F}"/>
               </a:ext>
             </a:extLst>
           </p:cNvPr>
-          <p:cNvSpPr>
-            <a:spLocks noGrp="1"/>
-          </p:cNvSpPr>
-          <p:nvPr>
-            <p:ph idx="1"/>
-          </p:nvPr>
+          <p:cNvSpPr txBox="1"/>
+          <p:nvPr/>
         </p:nvSpPr>
         <p:spPr>
           <a:xfrm>
-            <a:off x="581192" y="2340864"/>
-            <a:ext cx="11029615" cy="2051027"/>
+            <a:off x="657392" y="705816"/>
+            <a:ext cx="5514808" cy="523220"/>
           </a:xfrm>
+          <a:prstGeom prst="rect">
+            <a:avLst/>
+          </a:prstGeom>
+          <a:noFill/>
         </p:spPr>
         <p:txBody>
-          <a:bodyPr>
-            <a:normAutofit/>
+          <a:bodyPr wrap="square" rtlCol="0">
+            <a:spAutoFit/>
           </a:bodyPr>
           <a:lstStyle/>
           <a:p>
-            <a:pPr lvl="1"/>
-            <a:r>
-              <a:rPr lang="en-US" sz="1800" dirty="0"/>
-              <a:t>Identify potential flood zones by buffering the coastline and identifying streets within the buffer.</a:t>
-            </a:r>
-          </a:p>
-          <a:p>
-            <a:pPr marL="594000" lvl="2" indent="0">
-              <a:buNone/>
-            </a:pPr>
-            <a:br>
-              <a:rPr lang="en-US" sz="1800" dirty="0"/>
-            </a:br>
-            <a:r>
-              <a:rPr lang="en-US" sz="1800" dirty="0"/>
-              <a:t>SELECT s.NAME  </a:t>
-            </a:r>
-          </a:p>
-          <a:p>
-            <a:pPr marL="594000" lvl="2" indent="0">
-              <a:buNone/>
-            </a:pPr>
-            <a:r>
-              <a:rPr lang="en-US" sz="1800" dirty="0"/>
-              <a:t>FROM </a:t>
-            </a:r>
-            <a:r>
-              <a:rPr lang="en-US" sz="1800" dirty="0" err="1"/>
-              <a:t>nyc_streets</a:t>
-            </a:r>
-            <a:r>
-              <a:rPr lang="en-US" sz="1800" dirty="0"/>
-              <a:t> s, </a:t>
-            </a:r>
-            <a:r>
-              <a:rPr lang="en-US" sz="1800" dirty="0" err="1"/>
-              <a:t>nyc_coastline</a:t>
-            </a:r>
-            <a:r>
-              <a:rPr lang="en-US" sz="1800" dirty="0"/>
-              <a:t> c  </a:t>
-            </a:r>
-          </a:p>
-          <a:p>
-            <a:pPr marL="594000" lvl="2" indent="0">
-              <a:buNone/>
-            </a:pPr>
-            <a:r>
-              <a:rPr lang="en-US" sz="1800" dirty="0"/>
-              <a:t>WHERE </a:t>
-            </a:r>
-            <a:r>
-              <a:rPr lang="en-US" sz="1800" dirty="0" err="1"/>
+            <a:r>
+              <a:rPr lang="en-US" sz="2800" dirty="0"/>
+              <a:t>Exercise</a:t>
+            </a:r>
+            <a:r>
+              <a:rPr lang="en-US" altLang="zh-CN" sz="2800" dirty="0"/>
+              <a:t> 1</a:t>
+            </a:r>
+            <a:r>
+              <a:rPr lang="en-US" sz="2800" dirty="0"/>
+              <a:t>: </a:t>
+            </a:r>
+            <a:r>
+              <a:rPr lang="en-US" sz="2800" dirty="0" err="1"/>
               <a:t>ST_Intersects</a:t>
             </a:r>
-            <a:r>
-              <a:rPr lang="en-US" sz="1800" dirty="0"/>
-              <a:t>(</a:t>
-            </a:r>
-            <a:r>
-              <a:rPr lang="en-US" sz="1800" dirty="0" err="1"/>
-              <a:t>ST_Buffer</a:t>
-            </a:r>
-            <a:r>
-              <a:rPr lang="en-US" sz="1800" dirty="0"/>
-              <a:t>(</a:t>
-            </a:r>
-            <a:r>
-              <a:rPr lang="en-US" sz="1800" dirty="0" err="1"/>
-              <a:t>c.geometry</a:t>
-            </a:r>
-            <a:r>
-              <a:rPr lang="en-US" sz="1800" dirty="0"/>
-              <a:t>, 1000), </a:t>
-            </a:r>
-            <a:r>
-              <a:rPr lang="en-US" sz="1800" dirty="0" err="1"/>
-              <a:t>s.geometry</a:t>
-            </a:r>
-            <a:r>
-              <a:rPr lang="en-US" sz="1800" dirty="0"/>
-              <a:t>);</a:t>
-            </a:r>
+            <a:endParaRPr lang="en-US" sz="2800" dirty="0"/>
           </a:p>
         </p:txBody>
       </p:sp>
     </p:spTree>
     <p:extLst>
       <p:ext uri="{BB962C8B-B14F-4D97-AF65-F5344CB8AC3E}">
-        <p14:creationId xmlns:p14="http://schemas.microsoft.com/office/powerpoint/2010/main" val="78832131"/>
+        <p14:creationId xmlns:p14="http://schemas.microsoft.com/office/powerpoint/2010/main" val="2061068511"/>
       </p:ext>
     </p:extLst>
   </p:cSld>
@@ -6579,10 +8880,10 @@
       </p:grpSpPr>
       <p:sp>
         <p:nvSpPr>
-          <p:cNvPr id="2" name="Title 1">
+          <p:cNvPr id="3" name="Content Placeholder 2">
             <a:extLst>
               <a:ext uri="{FF2B5EF4-FFF2-40B4-BE49-F238E27FC236}">
-                <a16:creationId xmlns:a16="http://schemas.microsoft.com/office/drawing/2014/main" id="{E9A99951-2173-336C-6657-79F75A79B63A}"/>
+                <a16:creationId xmlns:a16="http://schemas.microsoft.com/office/drawing/2014/main" id="{30D8807F-2FB5-2F5E-6648-A02CD73FB141}"/>
               </a:ext>
             </a:extLst>
           </p:cNvPr>
@@ -6590,13 +8891,13 @@
             <a:spLocks noGrp="1"/>
           </p:cNvSpPr>
           <p:nvPr>
-            <p:ph type="title"/>
+            <p:ph idx="1"/>
           </p:nvPr>
         </p:nvSpPr>
         <p:spPr>
           <a:xfrm>
-            <a:off x="581192" y="702156"/>
-            <a:ext cx="11029616" cy="600171"/>
+            <a:off x="581191" y="1340739"/>
+            <a:ext cx="11029615" cy="2554986"/>
           </a:xfrm>
         </p:spPr>
         <p:txBody>
@@ -6606,279 +8907,177 @@
           <a:lstStyle/>
           <a:p>
             <a:r>
-              <a:rPr lang="en-US" dirty="0"/>
-              <a:t>Real-World Project Example</a:t>
-            </a:r>
-          </a:p>
-        </p:txBody>
-      </p:sp>
-      <p:sp>
-        <p:nvSpPr>
-          <p:cNvPr id="3" name="Content Placeholder 2">
+              <a:rPr lang="en-US" sz="2000" dirty="0"/>
+              <a:t>Identify neighborhoods where there are subway stations</a:t>
+            </a:r>
+          </a:p>
+          <a:p>
+            <a:pPr marL="324000" lvl="1" indent="0">
+              <a:buNone/>
+            </a:pPr>
+            <a:r>
+              <a:rPr lang="en-US" sz="2000" dirty="0">
+                <a:solidFill>
+                  <a:srgbClr val="00B0F0"/>
+                </a:solidFill>
+              </a:rPr>
+              <a:t>SELECT </a:t>
+            </a:r>
+            <a:r>
+              <a:rPr lang="en-US" sz="2000" dirty="0" err="1">
+                <a:solidFill>
+                  <a:srgbClr val="00B0F0"/>
+                </a:solidFill>
+              </a:rPr>
+              <a:t>boroname</a:t>
+            </a:r>
+            <a:r>
+              <a:rPr lang="en-US" sz="2000" dirty="0">
+                <a:solidFill>
+                  <a:srgbClr val="00B0F0"/>
+                </a:solidFill>
+              </a:rPr>
+              <a:t>, COUNT(*) AS </a:t>
+            </a:r>
+            <a:r>
+              <a:rPr lang="en-US" sz="2000" dirty="0" err="1">
+                <a:solidFill>
+                  <a:srgbClr val="00B0F0"/>
+                </a:solidFill>
+              </a:rPr>
+              <a:t>station_count</a:t>
+            </a:r>
+            <a:endParaRPr lang="en-US" sz="2000" dirty="0">
+              <a:solidFill>
+                <a:srgbClr val="00B0F0"/>
+              </a:solidFill>
+            </a:endParaRPr>
+          </a:p>
+          <a:p>
+            <a:pPr marL="324000" lvl="1" indent="0">
+              <a:buNone/>
+            </a:pPr>
+            <a:r>
+              <a:rPr lang="en-US" sz="2000" dirty="0">
+                <a:solidFill>
+                  <a:srgbClr val="00B0F0"/>
+                </a:solidFill>
+              </a:rPr>
+              <a:t>FROM ch05.neighborhoods, ch05.subway</a:t>
+            </a:r>
+          </a:p>
+          <a:p>
+            <a:pPr marL="324000" lvl="1" indent="0">
+              <a:buNone/>
+            </a:pPr>
+            <a:r>
+              <a:rPr lang="en-US" sz="2000" dirty="0">
+                <a:solidFill>
+                  <a:srgbClr val="00B0F0"/>
+                </a:solidFill>
+              </a:rPr>
+              <a:t>WHERE </a:t>
+            </a:r>
+            <a:r>
+              <a:rPr lang="en-US" sz="2000" dirty="0" err="1">
+                <a:solidFill>
+                  <a:srgbClr val="00B0F0"/>
+                </a:solidFill>
+              </a:rPr>
+              <a:t>ST_Intersects</a:t>
+            </a:r>
+            <a:r>
+              <a:rPr lang="en-US" sz="2000" dirty="0">
+                <a:solidFill>
+                  <a:srgbClr val="00B0F0"/>
+                </a:solidFill>
+              </a:rPr>
+              <a:t>(ch05.neighborhoods.geom, ch05.subway.geom)</a:t>
+            </a:r>
+          </a:p>
+          <a:p>
+            <a:pPr marL="324000" lvl="1" indent="0">
+              <a:buNone/>
+            </a:pPr>
+            <a:r>
+              <a:rPr lang="en-US" sz="2000" dirty="0">
+                <a:solidFill>
+                  <a:srgbClr val="00B0F0"/>
+                </a:solidFill>
+              </a:rPr>
+              <a:t>GROUP BY </a:t>
+            </a:r>
+            <a:r>
+              <a:rPr lang="en-US" sz="2000" dirty="0" err="1">
+                <a:solidFill>
+                  <a:srgbClr val="00B0F0"/>
+                </a:solidFill>
+              </a:rPr>
+              <a:t>boroname</a:t>
+            </a:r>
+            <a:r>
+              <a:rPr lang="en-US" sz="2000" dirty="0">
+                <a:solidFill>
+                  <a:srgbClr val="00B0F0"/>
+                </a:solidFill>
+              </a:rPr>
+              <a:t>;</a:t>
+            </a:r>
+          </a:p>
+        </p:txBody>
+      </p:sp>
+      <p:sp>
+        <p:nvSpPr>
+          <p:cNvPr id="4" name="TextBox 3">
             <a:extLst>
               <a:ext uri="{FF2B5EF4-FFF2-40B4-BE49-F238E27FC236}">
-                <a16:creationId xmlns:a16="http://schemas.microsoft.com/office/drawing/2014/main" id="{5D5C0DB1-FCD0-2193-7033-AB0BEA2196DC}"/>
+                <a16:creationId xmlns:a16="http://schemas.microsoft.com/office/drawing/2014/main" id="{8310F8FB-E4D3-00B2-587D-339C50534E60}"/>
               </a:ext>
             </a:extLst>
           </p:cNvPr>
-          <p:cNvSpPr>
-            <a:spLocks noGrp="1"/>
-          </p:cNvSpPr>
-          <p:nvPr>
-            <p:ph idx="1"/>
-          </p:nvPr>
+          <p:cNvSpPr txBox="1"/>
+          <p:nvPr/>
         </p:nvSpPr>
         <p:spPr>
           <a:xfrm>
-            <a:off x="581193" y="1454172"/>
-            <a:ext cx="11029615" cy="2833809"/>
+            <a:off x="657392" y="705816"/>
+            <a:ext cx="5514808" cy="523220"/>
           </a:xfrm>
+          <a:prstGeom prst="rect">
+            <a:avLst/>
+          </a:prstGeom>
+          <a:noFill/>
         </p:spPr>
         <p:txBody>
-          <a:bodyPr>
-            <a:normAutofit/>
+          <a:bodyPr wrap="square" rtlCol="0">
+            <a:spAutoFit/>
           </a:bodyPr>
           <a:lstStyle/>
           <a:p>
-            <a:pPr>
-              <a:buFont typeface="Wingdings" panose="05000000000000000000" pitchFamily="2" charset="2"/>
-              <a:buChar char="§"/>
-            </a:pPr>
-            <a:r>
-              <a:rPr lang="en-US" b="1" dirty="0"/>
-              <a:t>NYC Emergency Response Planning:</a:t>
-            </a:r>
-            <a:endParaRPr lang="en-US" dirty="0"/>
-          </a:p>
-          <a:p>
-            <a:pPr marL="742950" lvl="1" indent="-285750">
-              <a:buFont typeface="Arial" panose="020B0604020202020204" pitchFamily="34" charset="0"/>
-              <a:buChar char="•"/>
-            </a:pPr>
-            <a:r>
-              <a:rPr lang="en-US" dirty="0"/>
-              <a:t>Buffer zones around subway stations are used to plan emergency evacuation routes and resource allocation.</a:t>
-            </a:r>
-          </a:p>
-          <a:p>
-            <a:pPr marL="742950" lvl="1" indent="-285750">
-              <a:buFont typeface="Arial" panose="020B0604020202020204" pitchFamily="34" charset="0"/>
-              <a:buChar char="•"/>
-            </a:pPr>
-            <a:r>
-              <a:rPr lang="en-US" b="1" dirty="0"/>
-              <a:t>Example:</a:t>
-            </a:r>
-            <a:r>
-              <a:rPr lang="en-US" dirty="0"/>
-              <a:t> During Hurricane Sandy, buffer analysis helped identify critical infrastructure within flood-prone zones, aiding in evacuation and resource deployment.</a:t>
-            </a:r>
-          </a:p>
-          <a:p>
-            <a:pPr marL="594000" lvl="2" indent="0">
-              <a:buNone/>
-            </a:pPr>
-            <a:r>
-              <a:rPr lang="en-US" dirty="0">
-                <a:solidFill>
-                  <a:srgbClr val="00B0F0"/>
-                </a:solidFill>
-              </a:rPr>
-              <a:t>SELECT st.NAME AS </a:t>
-            </a:r>
-            <a:r>
-              <a:rPr lang="en-US" dirty="0" err="1">
-                <a:solidFill>
-                  <a:srgbClr val="00B0F0"/>
-                </a:solidFill>
-              </a:rPr>
-              <a:t>station_name</a:t>
-            </a:r>
-            <a:r>
-              <a:rPr lang="en-US" dirty="0">
-                <a:solidFill>
-                  <a:srgbClr val="00B0F0"/>
-                </a:solidFill>
-              </a:rPr>
-              <a:t>, s.NAME AS </a:t>
-            </a:r>
-            <a:r>
-              <a:rPr lang="en-US" dirty="0" err="1">
-                <a:solidFill>
-                  <a:srgbClr val="00B0F0"/>
-                </a:solidFill>
-              </a:rPr>
-              <a:t>street_name</a:t>
-            </a:r>
-            <a:r>
-              <a:rPr lang="en-US" dirty="0">
-                <a:solidFill>
-                  <a:srgbClr val="00B0F0"/>
-                </a:solidFill>
-              </a:rPr>
-              <a:t>  </a:t>
-            </a:r>
-          </a:p>
-          <a:p>
-            <a:pPr marL="594000" lvl="2" indent="0">
-              <a:buNone/>
-            </a:pPr>
-            <a:r>
-              <a:rPr lang="en-US" dirty="0">
-                <a:solidFill>
-                  <a:srgbClr val="00B0F0"/>
-                </a:solidFill>
-              </a:rPr>
-              <a:t>FROM </a:t>
-            </a:r>
-            <a:r>
-              <a:rPr lang="en-US" dirty="0" err="1">
-                <a:solidFill>
-                  <a:srgbClr val="00B0F0"/>
-                </a:solidFill>
-              </a:rPr>
-              <a:t>nyc_subway_stations</a:t>
-            </a:r>
-            <a:r>
-              <a:rPr lang="en-US" dirty="0">
-                <a:solidFill>
-                  <a:srgbClr val="00B0F0"/>
-                </a:solidFill>
-              </a:rPr>
-              <a:t> </a:t>
-            </a:r>
-            <a:r>
-              <a:rPr lang="en-US" dirty="0" err="1">
-                <a:solidFill>
-                  <a:srgbClr val="00B0F0"/>
-                </a:solidFill>
-              </a:rPr>
-              <a:t>st</a:t>
-            </a:r>
-            <a:r>
-              <a:rPr lang="en-US" dirty="0">
-                <a:solidFill>
-                  <a:srgbClr val="00B0F0"/>
-                </a:solidFill>
-              </a:rPr>
-              <a:t>, </a:t>
-            </a:r>
-            <a:r>
-              <a:rPr lang="en-US" dirty="0" err="1">
-                <a:solidFill>
-                  <a:srgbClr val="00B0F0"/>
-                </a:solidFill>
-              </a:rPr>
-              <a:t>nyc_streets</a:t>
-            </a:r>
-            <a:r>
-              <a:rPr lang="en-US" dirty="0">
-                <a:solidFill>
-                  <a:srgbClr val="00B0F0"/>
-                </a:solidFill>
-              </a:rPr>
-              <a:t> s  </a:t>
-            </a:r>
-          </a:p>
-          <a:p>
-            <a:pPr marL="594000" lvl="2" indent="0">
-              <a:buNone/>
-            </a:pPr>
-            <a:r>
-              <a:rPr lang="en-US" dirty="0">
-                <a:solidFill>
-                  <a:srgbClr val="00B0F0"/>
-                </a:solidFill>
-              </a:rPr>
-              <a:t>WHERE </a:t>
-            </a:r>
-            <a:r>
-              <a:rPr lang="en-US" dirty="0" err="1">
-                <a:solidFill>
-                  <a:srgbClr val="00B0F0"/>
-                </a:solidFill>
-              </a:rPr>
-              <a:t>ST_DWithin</a:t>
-            </a:r>
-            <a:r>
-              <a:rPr lang="en-US" dirty="0">
-                <a:solidFill>
-                  <a:srgbClr val="00B0F0"/>
-                </a:solidFill>
-              </a:rPr>
-              <a:t>(</a:t>
-            </a:r>
-            <a:r>
-              <a:rPr lang="en-US" dirty="0" err="1">
-                <a:solidFill>
-                  <a:srgbClr val="00B0F0"/>
-                </a:solidFill>
-              </a:rPr>
-              <a:t>st.geometry</a:t>
-            </a:r>
-            <a:r>
-              <a:rPr lang="en-US" dirty="0">
-                <a:solidFill>
-                  <a:srgbClr val="00B0F0"/>
-                </a:solidFill>
-              </a:rPr>
-              <a:t>, </a:t>
-            </a:r>
-            <a:r>
-              <a:rPr lang="en-US" dirty="0" err="1">
-                <a:solidFill>
-                  <a:srgbClr val="00B0F0"/>
-                </a:solidFill>
-              </a:rPr>
-              <a:t>s.geometry</a:t>
-            </a:r>
-            <a:r>
-              <a:rPr lang="en-US" dirty="0">
-                <a:solidFill>
-                  <a:srgbClr val="00B0F0"/>
-                </a:solidFill>
-              </a:rPr>
-              <a:t>, 300)  AND </a:t>
-            </a:r>
-            <a:r>
-              <a:rPr lang="en-US" dirty="0" err="1">
-                <a:solidFill>
-                  <a:srgbClr val="00B0F0"/>
-                </a:solidFill>
-              </a:rPr>
-              <a:t>st.BOROUGH</a:t>
-            </a:r>
-            <a:r>
-              <a:rPr lang="en-US" dirty="0">
-                <a:solidFill>
-                  <a:srgbClr val="00B0F0"/>
-                </a:solidFill>
-              </a:rPr>
-              <a:t> = 'Manhattan'  AND </a:t>
-            </a:r>
-            <a:r>
-              <a:rPr lang="en-US" dirty="0" err="1">
-                <a:solidFill>
-                  <a:srgbClr val="00B0F0"/>
-                </a:solidFill>
-              </a:rPr>
-              <a:t>s.TYPE</a:t>
-            </a:r>
-            <a:r>
-              <a:rPr lang="en-US" dirty="0">
-                <a:solidFill>
-                  <a:srgbClr val="00B0F0"/>
-                </a:solidFill>
-              </a:rPr>
-              <a:t> = 'residential';</a:t>
-            </a:r>
+            <a:r>
+              <a:rPr lang="en-US" sz="2800" dirty="0"/>
+              <a:t>Ex</a:t>
+            </a:r>
+            <a:r>
+              <a:rPr lang="en-US" altLang="zh-CN" sz="2800" dirty="0"/>
+              <a:t>ample 2</a:t>
+            </a:r>
+            <a:r>
+              <a:rPr lang="en-US" sz="2800" dirty="0"/>
+              <a:t>: </a:t>
+            </a:r>
+            <a:r>
+              <a:rPr lang="en-US" sz="2800" dirty="0" err="1"/>
+              <a:t>ST_Intersects</a:t>
+            </a:r>
+            <a:endParaRPr lang="en-US" sz="2800" dirty="0"/>
           </a:p>
         </p:txBody>
       </p:sp>
     </p:spTree>
     <p:extLst>
       <p:ext uri="{BB962C8B-B14F-4D97-AF65-F5344CB8AC3E}">
-        <p14:creationId xmlns:p14="http://schemas.microsoft.com/office/powerpoint/2010/main" val="3118275270"/>
+        <p14:creationId xmlns:p14="http://schemas.microsoft.com/office/powerpoint/2010/main" val="1207980653"/>
       </p:ext>
     </p:extLst>
   </p:cSld>
@@ -6907,10 +9106,10 @@
       </p:grpSpPr>
       <p:sp>
         <p:nvSpPr>
-          <p:cNvPr id="2" name="Title 1">
+          <p:cNvPr id="3" name="Content Placeholder 2">
             <a:extLst>
               <a:ext uri="{FF2B5EF4-FFF2-40B4-BE49-F238E27FC236}">
-                <a16:creationId xmlns:a16="http://schemas.microsoft.com/office/drawing/2014/main" id="{64E36CD5-3DBF-BAE6-7CF6-585C5F525485}"/>
+                <a16:creationId xmlns:a16="http://schemas.microsoft.com/office/drawing/2014/main" id="{0A27886B-078C-2661-2217-FCE82618A57B}"/>
               </a:ext>
             </a:extLst>
           </p:cNvPr>
@@ -6918,129 +9117,193 @@
             <a:spLocks noGrp="1"/>
           </p:cNvSpPr>
           <p:nvPr>
-            <p:ph type="title"/>
-          </p:nvPr>
-        </p:nvSpPr>
-        <p:spPr/>
-        <p:txBody>
-          <a:bodyPr/>
+            <p:ph idx="1"/>
+          </p:nvPr>
+        </p:nvSpPr>
+        <p:spPr>
+          <a:xfrm>
+            <a:off x="581191" y="1369314"/>
+            <a:ext cx="11029615" cy="2497836"/>
+          </a:xfrm>
+        </p:spPr>
+        <p:txBody>
+          <a:bodyPr>
+            <a:normAutofit/>
+          </a:bodyPr>
           <a:lstStyle/>
           <a:p>
             <a:r>
-              <a:rPr lang="en-US" dirty="0"/>
-              <a:t>TOOLS IN PGADMIN 4 – MATERIALIZED VIEWS</a:t>
-            </a:r>
-          </a:p>
-        </p:txBody>
-      </p:sp>
-      <p:sp>
-        <p:nvSpPr>
-          <p:cNvPr id="3" name="Content Placeholder 2">
+              <a:rPr lang="en-US" sz="2000" dirty="0"/>
+              <a:t>Identify neighborhoods with more than 3 subway stations</a:t>
+            </a:r>
+          </a:p>
+          <a:p>
+            <a:pPr marL="324000" lvl="1" indent="0">
+              <a:buNone/>
+            </a:pPr>
+            <a:r>
+              <a:rPr lang="en-US" sz="1800" dirty="0">
+                <a:solidFill>
+                  <a:srgbClr val="00B0F0"/>
+                </a:solidFill>
+              </a:rPr>
+              <a:t>SELECT </a:t>
+            </a:r>
+            <a:r>
+              <a:rPr lang="en-US" sz="1800" dirty="0" err="1">
+                <a:solidFill>
+                  <a:srgbClr val="00B0F0"/>
+                </a:solidFill>
+              </a:rPr>
+              <a:t>boroname</a:t>
+            </a:r>
+            <a:r>
+              <a:rPr lang="en-US" sz="1800" dirty="0">
+                <a:solidFill>
+                  <a:srgbClr val="00B0F0"/>
+                </a:solidFill>
+              </a:rPr>
+              <a:t>, COUNT(*) AS </a:t>
+            </a:r>
+            <a:r>
+              <a:rPr lang="en-US" sz="1800" dirty="0" err="1">
+                <a:solidFill>
+                  <a:srgbClr val="00B0F0"/>
+                </a:solidFill>
+              </a:rPr>
+              <a:t>station_count</a:t>
+            </a:r>
+            <a:endParaRPr lang="en-US" sz="1800" dirty="0">
+              <a:solidFill>
+                <a:srgbClr val="00B0F0"/>
+              </a:solidFill>
+            </a:endParaRPr>
+          </a:p>
+          <a:p>
+            <a:pPr marL="324000" lvl="1" indent="0">
+              <a:buNone/>
+            </a:pPr>
+            <a:r>
+              <a:rPr lang="en-US" sz="1800" dirty="0">
+                <a:solidFill>
+                  <a:srgbClr val="00B0F0"/>
+                </a:solidFill>
+              </a:rPr>
+              <a:t>FROM ch05.neighborhoods, ch05.subway</a:t>
+            </a:r>
+          </a:p>
+          <a:p>
+            <a:pPr marL="324000" lvl="1" indent="0">
+              <a:buNone/>
+            </a:pPr>
+            <a:r>
+              <a:rPr lang="en-US" sz="1800" dirty="0">
+                <a:solidFill>
+                  <a:srgbClr val="00B0F0"/>
+                </a:solidFill>
+              </a:rPr>
+              <a:t>WHERE </a:t>
+            </a:r>
+            <a:r>
+              <a:rPr lang="en-US" sz="1800" dirty="0" err="1">
+                <a:solidFill>
+                  <a:srgbClr val="00B0F0"/>
+                </a:solidFill>
+              </a:rPr>
+              <a:t>ST_Intersects</a:t>
+            </a:r>
+            <a:r>
+              <a:rPr lang="en-US" sz="1800" dirty="0">
+                <a:solidFill>
+                  <a:srgbClr val="00B0F0"/>
+                </a:solidFill>
+              </a:rPr>
+              <a:t>(ch05.neighborhoods.geom, ch05.subway.geom)</a:t>
+            </a:r>
+          </a:p>
+          <a:p>
+            <a:pPr marL="324000" lvl="1" indent="0">
+              <a:buNone/>
+            </a:pPr>
+            <a:r>
+              <a:rPr lang="en-US" sz="1800" dirty="0">
+                <a:solidFill>
+                  <a:srgbClr val="00B0F0"/>
+                </a:solidFill>
+              </a:rPr>
+              <a:t>GROUP BY </a:t>
+            </a:r>
+            <a:r>
+              <a:rPr lang="en-US" sz="1800" dirty="0" err="1">
+                <a:solidFill>
+                  <a:srgbClr val="00B0F0"/>
+                </a:solidFill>
+              </a:rPr>
+              <a:t>boronameHAVING</a:t>
+            </a:r>
+            <a:r>
+              <a:rPr lang="en-US" sz="1800" dirty="0">
+                <a:solidFill>
+                  <a:srgbClr val="00B0F0"/>
+                </a:solidFill>
+              </a:rPr>
+              <a:t> COUNT(*) &gt; 3;</a:t>
+            </a:r>
+          </a:p>
+        </p:txBody>
+      </p:sp>
+      <p:sp>
+        <p:nvSpPr>
+          <p:cNvPr id="4" name="TextBox 3">
             <a:extLst>
               <a:ext uri="{FF2B5EF4-FFF2-40B4-BE49-F238E27FC236}">
-                <a16:creationId xmlns:a16="http://schemas.microsoft.com/office/drawing/2014/main" id="{861D47DB-0F47-DE91-A1F8-68D7581EF238}"/>
+                <a16:creationId xmlns:a16="http://schemas.microsoft.com/office/drawing/2014/main" id="{AAB78236-2600-771A-940B-F5FEF9D7F03C}"/>
               </a:ext>
             </a:extLst>
           </p:cNvPr>
-          <p:cNvSpPr>
-            <a:spLocks noGrp="1"/>
-          </p:cNvSpPr>
-          <p:nvPr>
-            <p:ph idx="1"/>
-          </p:nvPr>
+          <p:cNvSpPr txBox="1"/>
+          <p:nvPr/>
         </p:nvSpPr>
         <p:spPr>
           <a:xfrm>
-            <a:off x="581192" y="2340864"/>
-            <a:ext cx="11029615" cy="1935861"/>
+            <a:off x="657392" y="686766"/>
+            <a:ext cx="5514808" cy="523220"/>
           </a:xfrm>
+          <a:prstGeom prst="rect">
+            <a:avLst/>
+          </a:prstGeom>
+          <a:noFill/>
         </p:spPr>
         <p:txBody>
-          <a:bodyPr/>
+          <a:bodyPr wrap="square" rtlCol="0">
+            <a:spAutoFit/>
+          </a:bodyPr>
           <a:lstStyle/>
           <a:p>
             <a:r>
-              <a:rPr lang="en-US" dirty="0"/>
-              <a:t>Create materialized views to store complex buffer analysis results for faster querying.</a:t>
-            </a:r>
-          </a:p>
-          <a:p>
-            <a:pPr marL="324000" lvl="1" indent="0">
-              <a:buNone/>
-            </a:pPr>
-            <a:r>
-              <a:rPr lang="en-US" dirty="0">
-                <a:solidFill>
-                  <a:srgbClr val="00B0F0"/>
-                </a:solidFill>
-              </a:rPr>
-              <a:t>CREATE MATERIALIZED VIEW ch05.station_buffers AS </a:t>
-            </a:r>
-          </a:p>
-          <a:p>
-            <a:pPr marL="324000" lvl="1" indent="0">
-              <a:buNone/>
-            </a:pPr>
-            <a:r>
-              <a:rPr lang="en-US" dirty="0">
-                <a:solidFill>
-                  <a:srgbClr val="00B0F0"/>
-                </a:solidFill>
-              </a:rPr>
-              <a:t>SELECT NAME, </a:t>
-            </a:r>
-            <a:r>
-              <a:rPr lang="en-US" dirty="0" err="1">
-                <a:solidFill>
-                  <a:srgbClr val="00B0F0"/>
-                </a:solidFill>
-              </a:rPr>
-              <a:t>ST_Buffer</a:t>
-            </a:r>
-            <a:r>
-              <a:rPr lang="en-US" dirty="0">
-                <a:solidFill>
-                  <a:srgbClr val="00B0F0"/>
-                </a:solidFill>
-              </a:rPr>
-              <a:t>(geometry, 300) AS </a:t>
-            </a:r>
-            <a:r>
-              <a:rPr lang="en-US" dirty="0" err="1">
-                <a:solidFill>
-                  <a:srgbClr val="00B0F0"/>
-                </a:solidFill>
-              </a:rPr>
-              <a:t>buffer_geom</a:t>
-            </a:r>
-            <a:r>
-              <a:rPr lang="en-US" dirty="0">
-                <a:solidFill>
-                  <a:srgbClr val="00B0F0"/>
-                </a:solidFill>
-              </a:rPr>
-              <a:t> </a:t>
-            </a:r>
-          </a:p>
-          <a:p>
-            <a:pPr marL="324000" lvl="1" indent="0">
-              <a:buNone/>
-            </a:pPr>
-            <a:r>
-              <a:rPr lang="en-US" dirty="0">
-                <a:solidFill>
-                  <a:srgbClr val="00B0F0"/>
-                </a:solidFill>
-              </a:rPr>
-              <a:t>FROM ch05.nyc_subway_stations;</a:t>
-            </a:r>
+              <a:rPr lang="en-US" sz="2800" dirty="0"/>
+              <a:t>Exercise</a:t>
+            </a:r>
+            <a:r>
+              <a:rPr lang="en-US" altLang="zh-CN" sz="2800" dirty="0"/>
+              <a:t> 2</a:t>
+            </a:r>
+            <a:r>
+              <a:rPr lang="en-US" sz="2800" dirty="0"/>
+              <a:t>: </a:t>
+            </a:r>
+            <a:r>
+              <a:rPr lang="en-US" sz="2800" dirty="0" err="1"/>
+              <a:t>ST_Intersects</a:t>
+            </a:r>
+            <a:endParaRPr lang="en-US" sz="2800" dirty="0"/>
           </a:p>
         </p:txBody>
       </p:sp>
     </p:spTree>
     <p:extLst>
       <p:ext uri="{BB962C8B-B14F-4D97-AF65-F5344CB8AC3E}">
-        <p14:creationId xmlns:p14="http://schemas.microsoft.com/office/powerpoint/2010/main" val="2854411829"/>
+        <p14:creationId xmlns:p14="http://schemas.microsoft.com/office/powerpoint/2010/main" val="2939602522"/>
       </p:ext>
     </p:extLst>
   </p:cSld>
@@ -7069,10 +9332,10 @@
       </p:grpSpPr>
       <p:sp>
         <p:nvSpPr>
-          <p:cNvPr id="2" name="Title 1">
+          <p:cNvPr id="3" name="Content Placeholder 2">
             <a:extLst>
               <a:ext uri="{FF2B5EF4-FFF2-40B4-BE49-F238E27FC236}">
-                <a16:creationId xmlns:a16="http://schemas.microsoft.com/office/drawing/2014/main" id="{E0EC588A-D6DE-08A3-EFFB-AF7F0822DC33}"/>
+                <a16:creationId xmlns:a16="http://schemas.microsoft.com/office/drawing/2014/main" id="{6852EAD1-F4C9-B93E-1A91-8E84463F87AA}"/>
               </a:ext>
             </a:extLst>
           </p:cNvPr>
@@ -7080,274 +9343,244 @@
             <a:spLocks noGrp="1"/>
           </p:cNvSpPr>
           <p:nvPr>
-            <p:ph type="title"/>
-          </p:nvPr>
-        </p:nvSpPr>
-        <p:spPr/>
-        <p:txBody>
-          <a:bodyPr/>
+            <p:ph idx="1"/>
+          </p:nvPr>
+        </p:nvSpPr>
+        <p:spPr>
+          <a:xfrm>
+            <a:off x="581191" y="1340739"/>
+            <a:ext cx="11029615" cy="2383536"/>
+          </a:xfrm>
+        </p:spPr>
+        <p:txBody>
+          <a:bodyPr>
+            <a:normAutofit/>
+          </a:bodyPr>
           <a:lstStyle/>
           <a:p>
             <a:r>
-              <a:rPr lang="en-US" dirty="0"/>
-              <a:t>TOOLS IN PGADMIN 4 - FUNCTIONS</a:t>
-            </a:r>
-          </a:p>
-        </p:txBody>
-      </p:sp>
-      <p:sp>
-        <p:nvSpPr>
-          <p:cNvPr id="3" name="Content Placeholder 2">
+              <a:rPr lang="en-US" sz="2000" dirty="0"/>
+              <a:t>List all subway stations where express trains stop that are within 50 meters of major roads.</a:t>
+            </a:r>
+          </a:p>
+          <a:p>
+            <a:pPr marL="324000" lvl="1" indent="0">
+              <a:buNone/>
+            </a:pPr>
+            <a:r>
+              <a:rPr lang="en-US" sz="2000" dirty="0">
+                <a:solidFill>
+                  <a:srgbClr val="00B0F0"/>
+                </a:solidFill>
+              </a:rPr>
+              <a:t>SELECT </a:t>
+            </a:r>
+            <a:r>
+              <a:rPr lang="en-US" sz="2000" dirty="0" err="1">
+                <a:solidFill>
+                  <a:srgbClr val="00B0F0"/>
+                </a:solidFill>
+              </a:rPr>
+              <a:t>station_name</a:t>
+            </a:r>
+            <a:r>
+              <a:rPr lang="en-US" sz="2000" dirty="0">
+                <a:solidFill>
+                  <a:srgbClr val="00B0F0"/>
+                </a:solidFill>
+              </a:rPr>
+              <a:t>, name AS </a:t>
+            </a:r>
+            <a:r>
+              <a:rPr lang="en-US" sz="2000" dirty="0" err="1">
+                <a:solidFill>
+                  <a:srgbClr val="00B0F0"/>
+                </a:solidFill>
+              </a:rPr>
+              <a:t>street_name</a:t>
+            </a:r>
+            <a:endParaRPr lang="en-US" sz="2000" dirty="0">
+              <a:solidFill>
+                <a:srgbClr val="00B0F0"/>
+              </a:solidFill>
+            </a:endParaRPr>
+          </a:p>
+          <a:p>
+            <a:pPr marL="324000" lvl="1" indent="0">
+              <a:buNone/>
+            </a:pPr>
+            <a:r>
+              <a:rPr lang="en-US" sz="2000" dirty="0">
+                <a:solidFill>
+                  <a:srgbClr val="00B0F0"/>
+                </a:solidFill>
+              </a:rPr>
+              <a:t>FROM ch05.subway, ch05.streets</a:t>
+            </a:r>
+          </a:p>
+          <a:p>
+            <a:pPr marL="324000" lvl="1" indent="0">
+              <a:buNone/>
+            </a:pPr>
+            <a:r>
+              <a:rPr lang="en-US" sz="2000" dirty="0">
+                <a:solidFill>
+                  <a:srgbClr val="00B0F0"/>
+                </a:solidFill>
+              </a:rPr>
+              <a:t>WHERE </a:t>
+            </a:r>
+            <a:r>
+              <a:rPr lang="en-US" sz="2000" dirty="0" err="1">
+                <a:solidFill>
+                  <a:srgbClr val="00B0F0"/>
+                </a:solidFill>
+              </a:rPr>
+              <a:t>express_stop</a:t>
+            </a:r>
+            <a:r>
+              <a:rPr lang="en-US" sz="2000" dirty="0">
+                <a:solidFill>
+                  <a:srgbClr val="00B0F0"/>
+                </a:solidFill>
+              </a:rPr>
+              <a:t> = '</a:t>
+            </a:r>
+            <a:r>
+              <a:rPr lang="en-US" sz="2000" dirty="0" err="1">
+                <a:solidFill>
+                  <a:srgbClr val="00B0F0"/>
+                </a:solidFill>
+              </a:rPr>
+              <a:t>Yes'AND</a:t>
+            </a:r>
+            <a:r>
+              <a:rPr lang="en-US" sz="2000" dirty="0">
+                <a:solidFill>
+                  <a:srgbClr val="00B0F0"/>
+                </a:solidFill>
+              </a:rPr>
+              <a:t> </a:t>
+            </a:r>
+            <a:r>
+              <a:rPr lang="en-US" sz="2000" dirty="0" err="1">
+                <a:solidFill>
+                  <a:srgbClr val="00B0F0"/>
+                </a:solidFill>
+              </a:rPr>
+              <a:t>road_type</a:t>
+            </a:r>
+            <a:r>
+              <a:rPr lang="en-US" sz="2000" dirty="0">
+                <a:solidFill>
+                  <a:srgbClr val="00B0F0"/>
+                </a:solidFill>
+              </a:rPr>
+              <a:t> = '</a:t>
+            </a:r>
+            <a:r>
+              <a:rPr lang="en-US" sz="2000" dirty="0" err="1">
+                <a:solidFill>
+                  <a:srgbClr val="00B0F0"/>
+                </a:solidFill>
+              </a:rPr>
+              <a:t>Major'AND</a:t>
+            </a:r>
+            <a:r>
+              <a:rPr lang="en-US" sz="2000" dirty="0">
+                <a:solidFill>
+                  <a:srgbClr val="00B0F0"/>
+                </a:solidFill>
+              </a:rPr>
+              <a:t> </a:t>
+            </a:r>
+            <a:r>
+              <a:rPr lang="en-US" sz="2000" dirty="0" err="1">
+                <a:solidFill>
+                  <a:srgbClr val="00B0F0"/>
+                </a:solidFill>
+              </a:rPr>
+              <a:t>ST_Intersects</a:t>
+            </a:r>
+            <a:r>
+              <a:rPr lang="en-US" sz="2000" dirty="0">
+                <a:solidFill>
+                  <a:srgbClr val="00B0F0"/>
+                </a:solidFill>
+              </a:rPr>
+              <a:t>(</a:t>
+            </a:r>
+            <a:r>
+              <a:rPr lang="en-US" sz="2000" dirty="0" err="1">
+                <a:solidFill>
+                  <a:srgbClr val="00B0F0"/>
+                </a:solidFill>
+              </a:rPr>
+              <a:t>ST_Buffer</a:t>
+            </a:r>
+            <a:r>
+              <a:rPr lang="en-US" sz="2000" dirty="0">
+                <a:solidFill>
+                  <a:srgbClr val="00B0F0"/>
+                </a:solidFill>
+              </a:rPr>
+              <a:t>(ch05.subway.geom, 50), ch05.streets.geom);</a:t>
+            </a:r>
+          </a:p>
+        </p:txBody>
+      </p:sp>
+      <p:sp>
+        <p:nvSpPr>
+          <p:cNvPr id="4" name="TextBox 3">
             <a:extLst>
               <a:ext uri="{FF2B5EF4-FFF2-40B4-BE49-F238E27FC236}">
-                <a16:creationId xmlns:a16="http://schemas.microsoft.com/office/drawing/2014/main" id="{BE6037DF-D050-5883-3EC2-3BDD696D1E25}"/>
+                <a16:creationId xmlns:a16="http://schemas.microsoft.com/office/drawing/2014/main" id="{34BC40E0-0BFC-8397-E889-FB43DE254A4C}"/>
               </a:ext>
             </a:extLst>
           </p:cNvPr>
-          <p:cNvSpPr>
-            <a:spLocks noGrp="1"/>
-          </p:cNvSpPr>
-          <p:nvPr>
-            <p:ph idx="1"/>
-          </p:nvPr>
-        </p:nvSpPr>
-        <p:spPr/>
-        <p:txBody>
-          <a:bodyPr>
-            <a:normAutofit lnSpcReduction="10000"/>
+          <p:cNvSpPr txBox="1"/>
+          <p:nvPr/>
+        </p:nvSpPr>
+        <p:spPr>
+          <a:xfrm>
+            <a:off x="657392" y="686766"/>
+            <a:ext cx="5514808" cy="523220"/>
+          </a:xfrm>
+          <a:prstGeom prst="rect">
+            <a:avLst/>
+          </a:prstGeom>
+          <a:noFill/>
+        </p:spPr>
+        <p:txBody>
+          <a:bodyPr wrap="square" rtlCol="0">
+            <a:spAutoFit/>
           </a:bodyPr>
           <a:lstStyle/>
           <a:p>
             <a:r>
-              <a:rPr lang="en-US" dirty="0"/>
-              <a:t>Write custom SQL functions to automate repetitive buffer analysis tasks.</a:t>
-            </a:r>
-          </a:p>
-          <a:p>
-            <a:endParaRPr lang="en-US" dirty="0"/>
-          </a:p>
-          <a:p>
-            <a:pPr marL="324000" lvl="1" indent="0">
-              <a:buNone/>
-            </a:pPr>
-            <a:r>
-              <a:rPr lang="en-US" dirty="0">
-                <a:solidFill>
-                  <a:srgbClr val="00B0F0"/>
-                </a:solidFill>
-              </a:rPr>
-              <a:t>CREATE FUNCTION ch05.get_stations_within_buffer(distance FLOAT) </a:t>
-            </a:r>
-          </a:p>
-          <a:p>
-            <a:pPr marL="324000" lvl="1" indent="0">
-              <a:buNone/>
-            </a:pPr>
-            <a:r>
-              <a:rPr lang="en-US" dirty="0">
-                <a:solidFill>
-                  <a:srgbClr val="00B0F0"/>
-                </a:solidFill>
-              </a:rPr>
-              <a:t>RETURNS TABLE(</a:t>
-            </a:r>
-            <a:r>
-              <a:rPr lang="en-US" dirty="0" err="1">
-                <a:solidFill>
-                  <a:srgbClr val="00B0F0"/>
-                </a:solidFill>
-              </a:rPr>
-              <a:t>station_name</a:t>
-            </a:r>
-            <a:r>
-              <a:rPr lang="en-US" dirty="0">
-                <a:solidFill>
-                  <a:srgbClr val="00B0F0"/>
-                </a:solidFill>
-              </a:rPr>
-              <a:t> TEXT, </a:t>
-            </a:r>
-            <a:r>
-              <a:rPr lang="en-US" dirty="0" err="1">
-                <a:solidFill>
-                  <a:srgbClr val="00B0F0"/>
-                </a:solidFill>
-              </a:rPr>
-              <a:t>street_name</a:t>
-            </a:r>
-            <a:r>
-              <a:rPr lang="en-US" dirty="0">
-                <a:solidFill>
-                  <a:srgbClr val="00B0F0"/>
-                </a:solidFill>
-              </a:rPr>
-              <a:t> TEXT) AS $$</a:t>
-            </a:r>
-          </a:p>
-          <a:p>
-            <a:pPr marL="324000" lvl="1" indent="0">
-              <a:buNone/>
-            </a:pPr>
-            <a:r>
-              <a:rPr lang="en-US" dirty="0">
-                <a:solidFill>
-                  <a:srgbClr val="00B0F0"/>
-                </a:solidFill>
-              </a:rPr>
-              <a:t>BEGIN  </a:t>
-            </a:r>
-          </a:p>
-          <a:p>
-            <a:pPr marL="324000" lvl="1" indent="0">
-              <a:buNone/>
-            </a:pPr>
-            <a:r>
-              <a:rPr lang="en-US" dirty="0">
-                <a:solidFill>
-                  <a:srgbClr val="00B0F0"/>
-                </a:solidFill>
-              </a:rPr>
-              <a:t>RETURN QUERY   </a:t>
-            </a:r>
-          </a:p>
-          <a:p>
-            <a:pPr marL="324000" lvl="1" indent="0">
-              <a:buNone/>
-            </a:pPr>
-            <a:r>
-              <a:rPr lang="en-US" dirty="0">
-                <a:solidFill>
-                  <a:srgbClr val="00B0F0"/>
-                </a:solidFill>
-              </a:rPr>
-              <a:t>SELECT st.NAME, s.NAME   </a:t>
-            </a:r>
-          </a:p>
-          <a:p>
-            <a:pPr marL="324000" lvl="1" indent="0">
-              <a:buNone/>
-            </a:pPr>
-            <a:r>
-              <a:rPr lang="en-US" dirty="0">
-                <a:solidFill>
-                  <a:srgbClr val="00B0F0"/>
-                </a:solidFill>
-              </a:rPr>
-              <a:t>FROM ch05.nyc_subway_stations </a:t>
-            </a:r>
-            <a:r>
-              <a:rPr lang="en-US" dirty="0" err="1">
-                <a:solidFill>
-                  <a:srgbClr val="00B0F0"/>
-                </a:solidFill>
-              </a:rPr>
-              <a:t>st</a:t>
-            </a:r>
-            <a:r>
-              <a:rPr lang="en-US" dirty="0">
-                <a:solidFill>
-                  <a:srgbClr val="00B0F0"/>
-                </a:solidFill>
-              </a:rPr>
-              <a:t>, ch05.nyc_streets s   </a:t>
-            </a:r>
-          </a:p>
-          <a:p>
-            <a:pPr marL="324000" lvl="1" indent="0">
-              <a:buNone/>
-            </a:pPr>
-            <a:r>
-              <a:rPr lang="en-US" dirty="0">
-                <a:solidFill>
-                  <a:srgbClr val="00B0F0"/>
-                </a:solidFill>
-              </a:rPr>
-              <a:t>WHERE </a:t>
-            </a:r>
-            <a:r>
-              <a:rPr lang="en-US" dirty="0" err="1">
-                <a:solidFill>
-                  <a:srgbClr val="00B0F0"/>
-                </a:solidFill>
-              </a:rPr>
-              <a:t>ST_DWithin</a:t>
-            </a:r>
-            <a:r>
-              <a:rPr lang="en-US" dirty="0">
-                <a:solidFill>
-                  <a:srgbClr val="00B0F0"/>
-                </a:solidFill>
-              </a:rPr>
-              <a:t>(</a:t>
-            </a:r>
-            <a:r>
-              <a:rPr lang="en-US" dirty="0" err="1">
-                <a:solidFill>
-                  <a:srgbClr val="00B0F0"/>
-                </a:solidFill>
-              </a:rPr>
-              <a:t>st.geometry</a:t>
-            </a:r>
-            <a:r>
-              <a:rPr lang="en-US" dirty="0">
-                <a:solidFill>
-                  <a:srgbClr val="00B0F0"/>
-                </a:solidFill>
-              </a:rPr>
-              <a:t>, </a:t>
-            </a:r>
-            <a:r>
-              <a:rPr lang="en-US" dirty="0" err="1">
-                <a:solidFill>
-                  <a:srgbClr val="00B0F0"/>
-                </a:solidFill>
-              </a:rPr>
-              <a:t>s.geometry</a:t>
-            </a:r>
-            <a:r>
-              <a:rPr lang="en-US" dirty="0">
-                <a:solidFill>
-                  <a:srgbClr val="00B0F0"/>
-                </a:solidFill>
-              </a:rPr>
-              <a:t>, distance);</a:t>
-            </a:r>
-          </a:p>
-          <a:p>
-            <a:pPr marL="324000" lvl="1" indent="0">
-              <a:buNone/>
-            </a:pPr>
-            <a:r>
-              <a:rPr lang="en-US" dirty="0">
-                <a:solidFill>
-                  <a:srgbClr val="00B0F0"/>
-                </a:solidFill>
-              </a:rPr>
-              <a:t>END;$$ LANGUAGE </a:t>
-            </a:r>
-            <a:r>
-              <a:rPr lang="en-US" dirty="0" err="1">
-                <a:solidFill>
-                  <a:srgbClr val="00B0F0"/>
-                </a:solidFill>
-              </a:rPr>
-              <a:t>plpgsql</a:t>
-            </a:r>
-            <a:r>
-              <a:rPr lang="en-US" dirty="0">
-                <a:solidFill>
-                  <a:srgbClr val="00B0F0"/>
-                </a:solidFill>
-              </a:rPr>
-              <a:t>;</a:t>
-            </a:r>
+              <a:rPr lang="en-US" sz="2800" dirty="0"/>
+              <a:t>Example</a:t>
+            </a:r>
+            <a:r>
+              <a:rPr lang="en-US" altLang="zh-CN" sz="2800" dirty="0"/>
+              <a:t> 3</a:t>
+            </a:r>
+            <a:r>
+              <a:rPr lang="en-US" sz="2800" dirty="0"/>
+              <a:t>: </a:t>
+            </a:r>
+            <a:r>
+              <a:rPr lang="en-US" sz="2800" dirty="0" err="1"/>
+              <a:t>ST_Intersects</a:t>
+            </a:r>
+            <a:endParaRPr lang="en-US" sz="2800" dirty="0"/>
           </a:p>
         </p:txBody>
       </p:sp>
     </p:spTree>
     <p:extLst>
       <p:ext uri="{BB962C8B-B14F-4D97-AF65-F5344CB8AC3E}">
-        <p14:creationId xmlns:p14="http://schemas.microsoft.com/office/powerpoint/2010/main" val="2221672660"/>
+        <p14:creationId xmlns:p14="http://schemas.microsoft.com/office/powerpoint/2010/main" val="3669766929"/>
       </p:ext>
     </p:extLst>
   </p:cSld>

</xml_diff>

<commit_message>
update week 05 advanced SQL
</commit_message>
<xml_diff>
--- a/docs/Lectures/Week05/Week05_Park02.pptx
+++ b/docs/Lectures/Week05/Week05_Park02.pptx
@@ -5,10 +5,10 @@
     <p:sldMasterId id="2147483685" r:id="rId1"/>
   </p:sldMasterIdLst>
   <p:notesMasterIdLst>
-    <p:notesMasterId r:id="rId22"/>
+    <p:notesMasterId r:id="rId19"/>
   </p:notesMasterIdLst>
   <p:handoutMasterIdLst>
-    <p:handoutMasterId r:id="rId23"/>
+    <p:handoutMasterId r:id="rId20"/>
   </p:handoutMasterIdLst>
   <p:sldIdLst>
     <p:sldId id="256" r:id="rId2"/>
@@ -20,17 +20,14 @@
     <p:sldId id="343" r:id="rId8"/>
     <p:sldId id="344" r:id="rId9"/>
     <p:sldId id="345" r:id="rId10"/>
-    <p:sldId id="346" r:id="rId11"/>
-    <p:sldId id="347" r:id="rId12"/>
-    <p:sldId id="348" r:id="rId13"/>
-    <p:sldId id="349" r:id="rId14"/>
-    <p:sldId id="350" r:id="rId15"/>
-    <p:sldId id="351" r:id="rId16"/>
-    <p:sldId id="327" r:id="rId17"/>
-    <p:sldId id="326" r:id="rId18"/>
-    <p:sldId id="330" r:id="rId19"/>
-    <p:sldId id="331" r:id="rId20"/>
-    <p:sldId id="332" r:id="rId21"/>
+    <p:sldId id="347" r:id="rId11"/>
+    <p:sldId id="348" r:id="rId12"/>
+    <p:sldId id="349" r:id="rId13"/>
+    <p:sldId id="350" r:id="rId14"/>
+    <p:sldId id="351" r:id="rId15"/>
+    <p:sldId id="330" r:id="rId16"/>
+    <p:sldId id="331" r:id="rId17"/>
+    <p:sldId id="332" r:id="rId18"/>
   </p:sldIdLst>
   <p:sldSz cx="12192000" cy="6858000"/>
   <p:notesSz cx="6858000" cy="9144000"/>
@@ -4832,315 +4829,6 @@
           <p:cNvPr id="3" name="Content Placeholder 2">
             <a:extLst>
               <a:ext uri="{FF2B5EF4-FFF2-40B4-BE49-F238E27FC236}">
-                <a16:creationId xmlns:a16="http://schemas.microsoft.com/office/drawing/2014/main" id="{FA1B1DC5-5C8F-51D6-2B65-9F6B52B8848E}"/>
-              </a:ext>
-            </a:extLst>
-          </p:cNvPr>
-          <p:cNvSpPr>
-            <a:spLocks noGrp="1"/>
-          </p:cNvSpPr>
-          <p:nvPr>
-            <p:ph idx="1"/>
-          </p:nvPr>
-        </p:nvSpPr>
-        <p:spPr>
-          <a:xfrm>
-            <a:off x="581192" y="1426464"/>
-            <a:ext cx="11029615" cy="2697861"/>
-          </a:xfrm>
-        </p:spPr>
-        <p:txBody>
-          <a:bodyPr>
-            <a:normAutofit/>
-          </a:bodyPr>
-          <a:lstStyle/>
-          <a:p>
-            <a:r>
-              <a:rPr lang="en-US" sz="2000" dirty="0"/>
-              <a:t>List express subway stations within 50 meters of one-way major streets.</a:t>
-            </a:r>
-          </a:p>
-          <a:p>
-            <a:pPr marL="324000" lvl="1" indent="0">
-              <a:buNone/>
-            </a:pPr>
-            <a:r>
-              <a:rPr lang="en-US" sz="2000" dirty="0">
-                <a:solidFill>
-                  <a:srgbClr val="00B0F0"/>
-                </a:solidFill>
-              </a:rPr>
-              <a:t>SELECT </a:t>
-            </a:r>
-            <a:r>
-              <a:rPr lang="en-US" sz="2000" dirty="0" err="1">
-                <a:solidFill>
-                  <a:srgbClr val="00B0F0"/>
-                </a:solidFill>
-              </a:rPr>
-              <a:t>station_name</a:t>
-            </a:r>
-            <a:r>
-              <a:rPr lang="en-US" sz="2000" dirty="0">
-                <a:solidFill>
-                  <a:srgbClr val="00B0F0"/>
-                </a:solidFill>
-              </a:rPr>
-              <a:t>, name AS </a:t>
-            </a:r>
-            <a:r>
-              <a:rPr lang="en-US" sz="2000" dirty="0" err="1">
-                <a:solidFill>
-                  <a:srgbClr val="00B0F0"/>
-                </a:solidFill>
-              </a:rPr>
-              <a:t>street_name</a:t>
-            </a:r>
-            <a:endParaRPr lang="en-US" sz="2000" dirty="0">
-              <a:solidFill>
-                <a:srgbClr val="00B0F0"/>
-              </a:solidFill>
-            </a:endParaRPr>
-          </a:p>
-          <a:p>
-            <a:pPr marL="324000" lvl="1" indent="0">
-              <a:buNone/>
-            </a:pPr>
-            <a:r>
-              <a:rPr lang="en-US" sz="2000" dirty="0">
-                <a:solidFill>
-                  <a:srgbClr val="00B0F0"/>
-                </a:solidFill>
-              </a:rPr>
-              <a:t>FROM ch05.subway, ch05.streets</a:t>
-            </a:r>
-          </a:p>
-          <a:p>
-            <a:pPr marL="324000" lvl="1" indent="0">
-              <a:buNone/>
-            </a:pPr>
-            <a:r>
-              <a:rPr lang="en-US" sz="2000" dirty="0">
-                <a:solidFill>
-                  <a:srgbClr val="00B0F0"/>
-                </a:solidFill>
-              </a:rPr>
-              <a:t>WHERE </a:t>
-            </a:r>
-            <a:r>
-              <a:rPr lang="en-US" sz="2000" dirty="0" err="1">
-                <a:solidFill>
-                  <a:srgbClr val="00B0F0"/>
-                </a:solidFill>
-              </a:rPr>
-              <a:t>express_stop</a:t>
-            </a:r>
-            <a:r>
-              <a:rPr lang="en-US" sz="2000" dirty="0">
-                <a:solidFill>
-                  <a:srgbClr val="00B0F0"/>
-                </a:solidFill>
-              </a:rPr>
-              <a:t> = '</a:t>
-            </a:r>
-            <a:r>
-              <a:rPr lang="en-US" sz="2000" dirty="0" err="1">
-                <a:solidFill>
-                  <a:srgbClr val="00B0F0"/>
-                </a:solidFill>
-              </a:rPr>
-              <a:t>Yes'AND</a:t>
-            </a:r>
-            <a:r>
-              <a:rPr lang="en-US" sz="2000" dirty="0">
-                <a:solidFill>
-                  <a:srgbClr val="00B0F0"/>
-                </a:solidFill>
-              </a:rPr>
-              <a:t> </a:t>
-            </a:r>
-            <a:r>
-              <a:rPr lang="en-US" sz="2000" dirty="0" err="1">
-                <a:solidFill>
-                  <a:srgbClr val="00B0F0"/>
-                </a:solidFill>
-              </a:rPr>
-              <a:t>road_type</a:t>
-            </a:r>
-            <a:r>
-              <a:rPr lang="en-US" sz="2000" dirty="0">
-                <a:solidFill>
-                  <a:srgbClr val="00B0F0"/>
-                </a:solidFill>
-              </a:rPr>
-              <a:t> = '</a:t>
-            </a:r>
-            <a:r>
-              <a:rPr lang="en-US" sz="2000" dirty="0" err="1">
-                <a:solidFill>
-                  <a:srgbClr val="00B0F0"/>
-                </a:solidFill>
-              </a:rPr>
-              <a:t>Major'AND</a:t>
-            </a:r>
-            <a:r>
-              <a:rPr lang="en-US" sz="2000" dirty="0">
-                <a:solidFill>
-                  <a:srgbClr val="00B0F0"/>
-                </a:solidFill>
-              </a:rPr>
-              <a:t> </a:t>
-            </a:r>
-            <a:r>
-              <a:rPr lang="en-US" sz="2000" dirty="0" err="1">
-                <a:solidFill>
-                  <a:srgbClr val="00B0F0"/>
-                </a:solidFill>
-              </a:rPr>
-              <a:t>oneway</a:t>
-            </a:r>
-            <a:r>
-              <a:rPr lang="en-US" sz="2000" dirty="0">
-                <a:solidFill>
-                  <a:srgbClr val="00B0F0"/>
-                </a:solidFill>
-              </a:rPr>
-              <a:t> = '</a:t>
-            </a:r>
-            <a:r>
-              <a:rPr lang="en-US" sz="2000" dirty="0" err="1">
-                <a:solidFill>
-                  <a:srgbClr val="00B0F0"/>
-                </a:solidFill>
-              </a:rPr>
-              <a:t>Yes'AND</a:t>
-            </a:r>
-            <a:r>
-              <a:rPr lang="en-US" sz="2000" dirty="0">
-                <a:solidFill>
-                  <a:srgbClr val="00B0F0"/>
-                </a:solidFill>
-              </a:rPr>
-              <a:t> </a:t>
-            </a:r>
-            <a:r>
-              <a:rPr lang="en-US" sz="2000" dirty="0" err="1">
-                <a:solidFill>
-                  <a:srgbClr val="00B0F0"/>
-                </a:solidFill>
-              </a:rPr>
-              <a:t>ST_Intersects</a:t>
-            </a:r>
-            <a:r>
-              <a:rPr lang="en-US" sz="2000" dirty="0">
-                <a:solidFill>
-                  <a:srgbClr val="00B0F0"/>
-                </a:solidFill>
-              </a:rPr>
-              <a:t>(</a:t>
-            </a:r>
-            <a:r>
-              <a:rPr lang="en-US" sz="2000" dirty="0" err="1">
-                <a:solidFill>
-                  <a:srgbClr val="00B0F0"/>
-                </a:solidFill>
-              </a:rPr>
-              <a:t>ST_Buffer</a:t>
-            </a:r>
-            <a:r>
-              <a:rPr lang="en-US" sz="2000" dirty="0">
-                <a:solidFill>
-                  <a:srgbClr val="00B0F0"/>
-                </a:solidFill>
-              </a:rPr>
-              <a:t>(ch05.subway.geom, 50), ch05.streets.geom);</a:t>
-            </a:r>
-          </a:p>
-        </p:txBody>
-      </p:sp>
-      <p:sp>
-        <p:nvSpPr>
-          <p:cNvPr id="4" name="TextBox 3">
-            <a:extLst>
-              <a:ext uri="{FF2B5EF4-FFF2-40B4-BE49-F238E27FC236}">
-                <a16:creationId xmlns:a16="http://schemas.microsoft.com/office/drawing/2014/main" id="{315A5990-DC54-DDC4-3634-E4DBE02D943E}"/>
-              </a:ext>
-            </a:extLst>
-          </p:cNvPr>
-          <p:cNvSpPr txBox="1"/>
-          <p:nvPr/>
-        </p:nvSpPr>
-        <p:spPr>
-          <a:xfrm>
-            <a:off x="504992" y="743916"/>
-            <a:ext cx="5514808" cy="523220"/>
-          </a:xfrm>
-          <a:prstGeom prst="rect">
-            <a:avLst/>
-          </a:prstGeom>
-          <a:noFill/>
-        </p:spPr>
-        <p:txBody>
-          <a:bodyPr wrap="square" rtlCol="0">
-            <a:spAutoFit/>
-          </a:bodyPr>
-          <a:lstStyle/>
-          <a:p>
-            <a:r>
-              <a:rPr lang="en-US" sz="2800" dirty="0"/>
-              <a:t>Exercise</a:t>
-            </a:r>
-            <a:r>
-              <a:rPr lang="en-US" altLang="zh-CN" sz="2800" dirty="0"/>
-              <a:t> 3</a:t>
-            </a:r>
-            <a:r>
-              <a:rPr lang="en-US" sz="2800" dirty="0"/>
-              <a:t>: </a:t>
-            </a:r>
-            <a:r>
-              <a:rPr lang="en-US" sz="2800" dirty="0" err="1"/>
-              <a:t>ST_Intersects</a:t>
-            </a:r>
-            <a:endParaRPr lang="en-US" sz="2800" dirty="0"/>
-          </a:p>
-        </p:txBody>
-      </p:sp>
-    </p:spTree>
-    <p:extLst>
-      <p:ext uri="{BB962C8B-B14F-4D97-AF65-F5344CB8AC3E}">
-        <p14:creationId xmlns:p14="http://schemas.microsoft.com/office/powerpoint/2010/main" val="3127353908"/>
-      </p:ext>
-    </p:extLst>
-  </p:cSld>
-  <p:clrMapOvr>
-    <a:masterClrMapping/>
-  </p:clrMapOvr>
-</p:sld>
-</file>
-
-<file path=ppt/slides/slide11.xml><?xml version="1.0" encoding="utf-8"?>
-<p:sld xmlns:a="http://schemas.openxmlformats.org/drawingml/2006/main" xmlns:r="http://schemas.openxmlformats.org/officeDocument/2006/relationships" xmlns:p="http://schemas.openxmlformats.org/presentationml/2006/main">
-  <p:cSld>
-    <p:spTree>
-      <p:nvGrpSpPr>
-        <p:cNvPr id="1" name=""/>
-        <p:cNvGrpSpPr/>
-        <p:nvPr/>
-      </p:nvGrpSpPr>
-      <p:grpSpPr>
-        <a:xfrm>
-          <a:off x="0" y="0"/>
-          <a:ext cx="0" cy="0"/>
-          <a:chOff x="0" y="0"/>
-          <a:chExt cx="0" cy="0"/>
-        </a:xfrm>
-      </p:grpSpPr>
-      <p:sp>
-        <p:nvSpPr>
-          <p:cNvPr id="3" name="Content Placeholder 2">
-            <a:extLst>
-              <a:ext uri="{FF2B5EF4-FFF2-40B4-BE49-F238E27FC236}">
                 <a16:creationId xmlns:a16="http://schemas.microsoft.com/office/drawing/2014/main" id="{6E4898B9-733B-2765-4ABA-D82A5BB6E3E1}"/>
               </a:ext>
             </a:extLst>
@@ -5155,19 +4843,27 @@
         <p:spPr>
           <a:xfrm>
             <a:off x="581192" y="1426463"/>
-            <a:ext cx="5324308" cy="1535811"/>
+            <a:ext cx="5324308" cy="1935862"/>
           </a:xfrm>
         </p:spPr>
         <p:txBody>
           <a:bodyPr>
-            <a:normAutofit/>
+            <a:normAutofit lnSpcReduction="10000"/>
           </a:bodyPr>
           <a:lstStyle/>
           <a:p>
             <a:r>
+              <a:rPr lang="en-US" dirty="0">
+                <a:solidFill>
+                  <a:schemeClr val="tx1"/>
+                </a:solidFill>
+              </a:rPr>
+              <a:t>The opposite of </a:t>
+            </a:r>
+            <a:r>
               <a:rPr lang="en-US" dirty="0" err="1">
                 <a:solidFill>
-                  <a:srgbClr val="00B0F0"/>
+                  <a:schemeClr val="tx1"/>
                 </a:solidFill>
               </a:rPr>
               <a:t>ST_Intersects</a:t>
@@ -5175,14 +4871,34 @@
             <a:r>
               <a:rPr lang="en-US" dirty="0">
                 <a:solidFill>
-                  <a:srgbClr val="00B0F0"/>
-                </a:solidFill>
-              </a:rPr>
-              <a:t>(geometry A, geometry B) </a:t>
-            </a:r>
-            <a:r>
-              <a:rPr lang="en-US" dirty="0"/>
-              <a:t>returns (TRUE) if the two shapes have any space in common, i.e., if their boundaries or interiors intersect.</a:t>
+                  <a:schemeClr val="tx1"/>
+                </a:solidFill>
+              </a:rPr>
+              <a:t> is </a:t>
+            </a:r>
+            <a:r>
+              <a:rPr lang="en-US" dirty="0" err="1">
+                <a:solidFill>
+                  <a:srgbClr val="00B0F0"/>
+                </a:solidFill>
+              </a:rPr>
+              <a:t>ST_Disjoint</a:t>
+            </a:r>
+            <a:r>
+              <a:rPr lang="en-US" dirty="0">
+                <a:solidFill>
+                  <a:srgbClr val="00B0F0"/>
+                </a:solidFill>
+              </a:rPr>
+              <a:t>(geometry A , geometry B). </a:t>
+            </a:r>
+            <a:r>
+              <a:rPr lang="en-US" dirty="0">
+                <a:solidFill>
+                  <a:schemeClr val="tx1"/>
+                </a:solidFill>
+              </a:rPr>
+              <a:t>If two geometries are disjoint, they do not intersect, and vice-versa. In fact, it is often more efficient to test “not intersects” than to test “disjoint” because the intersects tests can be spatially indexed, while the disjoint test cannot.</a:t>
             </a:r>
           </a:p>
         </p:txBody>
@@ -5266,6 +4982,220 @@
 </p:sld>
 </file>
 
+<file path=ppt/slides/slide11.xml><?xml version="1.0" encoding="utf-8"?>
+<p:sld xmlns:a="http://schemas.openxmlformats.org/drawingml/2006/main" xmlns:r="http://schemas.openxmlformats.org/officeDocument/2006/relationships" xmlns:p="http://schemas.openxmlformats.org/presentationml/2006/main">
+  <p:cSld>
+    <p:spTree>
+      <p:nvGrpSpPr>
+        <p:cNvPr id="1" name=""/>
+        <p:cNvGrpSpPr/>
+        <p:nvPr/>
+      </p:nvGrpSpPr>
+      <p:grpSpPr>
+        <a:xfrm>
+          <a:off x="0" y="0"/>
+          <a:ext cx="0" cy="0"/>
+          <a:chOff x="0" y="0"/>
+          <a:chExt cx="0" cy="0"/>
+        </a:xfrm>
+      </p:grpSpPr>
+      <p:sp>
+        <p:nvSpPr>
+          <p:cNvPr id="5" name="Content Placeholder 4">
+            <a:extLst>
+              <a:ext uri="{FF2B5EF4-FFF2-40B4-BE49-F238E27FC236}">
+                <a16:creationId xmlns:a16="http://schemas.microsoft.com/office/drawing/2014/main" id="{0DEA7FD2-61CD-8E59-CFBE-9C4EF7358AF2}"/>
+              </a:ext>
+            </a:extLst>
+          </p:cNvPr>
+          <p:cNvSpPr txBox="1">
+            <a:spLocks noGrp="1"/>
+          </p:cNvSpPr>
+          <p:nvPr>
+            <p:ph idx="1"/>
+          </p:nvPr>
+        </p:nvSpPr>
+        <p:spPr>
+          <a:xfrm>
+            <a:off x="580858" y="1452061"/>
+            <a:ext cx="11029950" cy="2631490"/>
+          </a:xfrm>
+          <a:prstGeom prst="rect">
+            <a:avLst/>
+          </a:prstGeom>
+          <a:noFill/>
+        </p:spPr>
+        <p:txBody>
+          <a:bodyPr wrap="square" rtlCol="0">
+            <a:spAutoFit/>
+          </a:bodyPr>
+          <a:lstStyle/>
+          <a:p>
+            <a:r>
+              <a:rPr lang="en-US" sz="2000" dirty="0"/>
+              <a:t>Find streets that do not intersect with any subway station.</a:t>
+            </a:r>
+          </a:p>
+          <a:p>
+            <a:pPr marL="324000" lvl="1" indent="0">
+              <a:buNone/>
+            </a:pPr>
+            <a:r>
+              <a:rPr lang="en-US" sz="2000" dirty="0">
+                <a:solidFill>
+                  <a:srgbClr val="00B0F0"/>
+                </a:solidFill>
+              </a:rPr>
+              <a:t>SELECT name</a:t>
+            </a:r>
+          </a:p>
+          <a:p>
+            <a:pPr marL="324000" lvl="1" indent="0">
+              <a:buNone/>
+            </a:pPr>
+            <a:r>
+              <a:rPr lang="en-US" sz="2000" dirty="0">
+                <a:solidFill>
+                  <a:srgbClr val="00B0F0"/>
+                </a:solidFill>
+              </a:rPr>
+              <a:t>FROM ch05.streets</a:t>
+            </a:r>
+          </a:p>
+          <a:p>
+            <a:pPr marL="324000" lvl="1" indent="0">
+              <a:buNone/>
+            </a:pPr>
+            <a:r>
+              <a:rPr lang="en-US" sz="2000" dirty="0">
+                <a:solidFill>
+                  <a:srgbClr val="00B0F0"/>
+                </a:solidFill>
+              </a:rPr>
+              <a:t>WHERE NOT EXISTS (</a:t>
+            </a:r>
+          </a:p>
+          <a:p>
+            <a:pPr marL="324000" lvl="1" indent="0">
+              <a:buNone/>
+            </a:pPr>
+            <a:r>
+              <a:rPr lang="en-US" sz="2000" dirty="0">
+                <a:solidFill>
+                  <a:srgbClr val="00B0F0"/>
+                </a:solidFill>
+              </a:rPr>
+              <a:t>SELECT 1 FROM ch05.subway </a:t>
+            </a:r>
+          </a:p>
+          <a:p>
+            <a:pPr marL="324000" lvl="1" indent="0">
+              <a:buNone/>
+            </a:pPr>
+            <a:r>
+              <a:rPr lang="en-US" sz="2000" dirty="0">
+                <a:solidFill>
+                  <a:srgbClr val="00B0F0"/>
+                </a:solidFill>
+              </a:rPr>
+              <a:t>WHERE </a:t>
+            </a:r>
+            <a:r>
+              <a:rPr lang="en-US" sz="2000" dirty="0" err="1">
+                <a:solidFill>
+                  <a:srgbClr val="00B0F0"/>
+                </a:solidFill>
+              </a:rPr>
+              <a:t>ST_Disjoint</a:t>
+            </a:r>
+            <a:r>
+              <a:rPr lang="en-US" sz="2000" dirty="0">
+                <a:solidFill>
+                  <a:srgbClr val="00B0F0"/>
+                </a:solidFill>
+              </a:rPr>
+              <a:t>(ch05.streets.geom, </a:t>
+            </a:r>
+            <a:r>
+              <a:rPr lang="en-US" sz="2000" dirty="0" err="1">
+                <a:solidFill>
+                  <a:srgbClr val="00B0F0"/>
+                </a:solidFill>
+              </a:rPr>
+              <a:t>ST_Buffer</a:t>
+            </a:r>
+            <a:r>
+              <a:rPr lang="en-US" sz="2000" dirty="0">
+                <a:solidFill>
+                  <a:srgbClr val="00B0F0"/>
+                </a:solidFill>
+              </a:rPr>
+              <a:t>(ch05.subway.geom, 50)) = FALSE);</a:t>
+            </a:r>
+          </a:p>
+        </p:txBody>
+      </p:sp>
+      <p:sp>
+        <p:nvSpPr>
+          <p:cNvPr id="4" name="TextBox 3">
+            <a:extLst>
+              <a:ext uri="{FF2B5EF4-FFF2-40B4-BE49-F238E27FC236}">
+                <a16:creationId xmlns:a16="http://schemas.microsoft.com/office/drawing/2014/main" id="{484B1751-F76A-2FBB-FCFC-16D4EF8C2F07}"/>
+              </a:ext>
+            </a:extLst>
+          </p:cNvPr>
+          <p:cNvSpPr txBox="1"/>
+          <p:nvPr/>
+        </p:nvSpPr>
+        <p:spPr>
+          <a:xfrm>
+            <a:off x="504992" y="743916"/>
+            <a:ext cx="5514808" cy="523220"/>
+          </a:xfrm>
+          <a:prstGeom prst="rect">
+            <a:avLst/>
+          </a:prstGeom>
+          <a:noFill/>
+        </p:spPr>
+        <p:txBody>
+          <a:bodyPr wrap="square" rtlCol="0">
+            <a:spAutoFit/>
+          </a:bodyPr>
+          <a:lstStyle/>
+          <a:p>
+            <a:r>
+              <a:rPr lang="en-US" sz="2800" dirty="0"/>
+              <a:t>Example</a:t>
+            </a:r>
+            <a:r>
+              <a:rPr lang="en-US" altLang="zh-CN" sz="2800" dirty="0"/>
+              <a:t> 1</a:t>
+            </a:r>
+            <a:r>
+              <a:rPr lang="en-US" sz="2800" dirty="0"/>
+              <a:t>: </a:t>
+            </a:r>
+            <a:r>
+              <a:rPr lang="en-US" sz="2800" dirty="0" err="1"/>
+              <a:t>ST_Disjoint</a:t>
+            </a:r>
+            <a:endParaRPr lang="en-US" sz="2800" dirty="0"/>
+          </a:p>
+        </p:txBody>
+      </p:sp>
+    </p:spTree>
+    <p:extLst>
+      <p:ext uri="{BB962C8B-B14F-4D97-AF65-F5344CB8AC3E}">
+        <p14:creationId xmlns:p14="http://schemas.microsoft.com/office/powerpoint/2010/main" val="43407044"/>
+      </p:ext>
+    </p:extLst>
+  </p:cSld>
+  <p:clrMapOvr>
+    <a:masterClrMapping/>
+  </p:clrMapOvr>
+</p:sld>
+</file>
+
 <file path=ppt/slides/slide12.xml><?xml version="1.0" encoding="utf-8"?>
 <p:sld xmlns:a="http://schemas.openxmlformats.org/drawingml/2006/main" xmlns:r="http://schemas.openxmlformats.org/officeDocument/2006/relationships" xmlns:p="http://schemas.openxmlformats.org/presentationml/2006/main">
   <p:cSld>
@@ -5285,14 +5215,14 @@
       </p:grpSpPr>
       <p:sp>
         <p:nvSpPr>
-          <p:cNvPr id="5" name="Content Placeholder 4">
+          <p:cNvPr id="3" name="Content Placeholder 2">
             <a:extLst>
               <a:ext uri="{FF2B5EF4-FFF2-40B4-BE49-F238E27FC236}">
-                <a16:creationId xmlns:a16="http://schemas.microsoft.com/office/drawing/2014/main" id="{0DEA7FD2-61CD-8E59-CFBE-9C4EF7358AF2}"/>
+                <a16:creationId xmlns:a16="http://schemas.microsoft.com/office/drawing/2014/main" id="{2F9E5E82-3C5D-323F-970D-EF112FB5DA03}"/>
               </a:ext>
             </a:extLst>
           </p:cNvPr>
-          <p:cNvSpPr txBox="1">
+          <p:cNvSpPr>
             <a:spLocks noGrp="1"/>
           </p:cNvSpPr>
           <p:nvPr>
@@ -5301,23 +5231,19 @@
         </p:nvSpPr>
         <p:spPr>
           <a:xfrm>
-            <a:off x="580858" y="1452061"/>
-            <a:ext cx="11029950" cy="2631490"/>
+            <a:off x="581191" y="1416938"/>
+            <a:ext cx="11029615" cy="3288411"/>
           </a:xfrm>
-          <a:prstGeom prst="rect">
-            <a:avLst/>
-          </a:prstGeom>
-          <a:noFill/>
         </p:spPr>
         <p:txBody>
-          <a:bodyPr wrap="square" rtlCol="0">
-            <a:spAutoFit/>
+          <a:bodyPr>
+            <a:noAutofit/>
           </a:bodyPr>
           <a:lstStyle/>
           <a:p>
             <a:r>
               <a:rPr lang="en-US" sz="2000" dirty="0"/>
-              <a:t>Find streets that do not intersect with any subway station.</a:t>
+              <a:t>List one-way streets that do not intersect with any subway station.</a:t>
             </a:r>
           </a:p>
           <a:p>
@@ -5325,7 +5251,7 @@
               <a:buNone/>
             </a:pPr>
             <a:r>
-              <a:rPr lang="en-US" sz="2000" dirty="0">
+              <a:rPr lang="en-US" sz="1800" dirty="0">
                 <a:solidFill>
                   <a:srgbClr val="00B0F0"/>
                 </a:solidFill>
@@ -5338,7 +5264,7 @@
               <a:buNone/>
             </a:pPr>
             <a:r>
-              <a:rPr lang="en-US" sz="2000" dirty="0">
+              <a:rPr lang="en-US" sz="1800" dirty="0">
                 <a:solidFill>
                   <a:srgbClr val="00B0F0"/>
                 </a:solidFill>
@@ -5351,12 +5277,28 @@
               <a:buNone/>
             </a:pPr>
             <a:r>
-              <a:rPr lang="en-US" sz="2000" dirty="0">
-                <a:solidFill>
-                  <a:srgbClr val="00B0F0"/>
-                </a:solidFill>
-              </a:rPr>
-              <a:t>WHERE NOT EXISTS (</a:t>
+              <a:rPr lang="en-US" sz="1800" dirty="0">
+                <a:solidFill>
+                  <a:srgbClr val="00B0F0"/>
+                </a:solidFill>
+              </a:rPr>
+              <a:t>WHERE </a:t>
+            </a:r>
+            <a:r>
+              <a:rPr lang="en-US" sz="1800" dirty="0" err="1">
+                <a:solidFill>
+                  <a:srgbClr val="00B0F0"/>
+                </a:solidFill>
+              </a:rPr>
+              <a:t>oneway</a:t>
+            </a:r>
+            <a:r>
+              <a:rPr lang="en-US" sz="1800" dirty="0">
+                <a:solidFill>
+                  <a:srgbClr val="00B0F0"/>
+                </a:solidFill>
+              </a:rPr>
+              <a:t> = 'Yes’</a:t>
             </a:r>
           </a:p>
           <a:p>
@@ -5364,7 +5306,20 @@
               <a:buNone/>
             </a:pPr>
             <a:r>
-              <a:rPr lang="en-US" sz="2000" dirty="0">
+              <a:rPr lang="en-US" sz="1800" dirty="0">
+                <a:solidFill>
+                  <a:srgbClr val="00B0F0"/>
+                </a:solidFill>
+              </a:rPr>
+              <a:t>AND NOT EXISTS ( </a:t>
+            </a:r>
+          </a:p>
+          <a:p>
+            <a:pPr marL="324000" lvl="1" indent="0">
+              <a:buNone/>
+            </a:pPr>
+            <a:r>
+              <a:rPr lang="en-US" sz="1800" dirty="0">
                 <a:solidFill>
                   <a:srgbClr val="00B0F0"/>
                 </a:solidFill>
@@ -5377,7 +5332,7 @@
               <a:buNone/>
             </a:pPr>
             <a:r>
-              <a:rPr lang="en-US" sz="2000" dirty="0">
+              <a:rPr lang="en-US" sz="1800" dirty="0">
                 <a:solidFill>
                   <a:srgbClr val="00B0F0"/>
                 </a:solidFill>
@@ -5385,7 +5340,7 @@
               <a:t>WHERE </a:t>
             </a:r>
             <a:r>
-              <a:rPr lang="en-US" sz="2000" dirty="0" err="1">
+              <a:rPr lang="en-US" sz="1800" dirty="0" err="1">
                 <a:solidFill>
                   <a:srgbClr val="00B0F0"/>
                 </a:solidFill>
@@ -5393,7 +5348,7 @@
               <a:t>ST_Disjoint</a:t>
             </a:r>
             <a:r>
-              <a:rPr lang="en-US" sz="2000" dirty="0">
+              <a:rPr lang="en-US" sz="1800" dirty="0">
                 <a:solidFill>
                   <a:srgbClr val="00B0F0"/>
                 </a:solidFill>
@@ -5401,7 +5356,7 @@
               <a:t>(ch05.streets.geom, </a:t>
             </a:r>
             <a:r>
-              <a:rPr lang="en-US" sz="2000" dirty="0" err="1">
+              <a:rPr lang="en-US" sz="1800" dirty="0" err="1">
                 <a:solidFill>
                   <a:srgbClr val="00B0F0"/>
                 </a:solidFill>
@@ -5409,7 +5364,7 @@
               <a:t>ST_Buffer</a:t>
             </a:r>
             <a:r>
-              <a:rPr lang="en-US" sz="2000" dirty="0">
+              <a:rPr lang="en-US" sz="1800" dirty="0">
                 <a:solidFill>
                   <a:srgbClr val="00B0F0"/>
                 </a:solidFill>
@@ -5424,7 +5379,7 @@
           <p:cNvPr id="4" name="TextBox 3">
             <a:extLst>
               <a:ext uri="{FF2B5EF4-FFF2-40B4-BE49-F238E27FC236}">
-                <a16:creationId xmlns:a16="http://schemas.microsoft.com/office/drawing/2014/main" id="{484B1751-F76A-2FBB-FCFC-16D4EF8C2F07}"/>
+                <a16:creationId xmlns:a16="http://schemas.microsoft.com/office/drawing/2014/main" id="{DE421040-9A45-B9E1-81EB-4AC79DC7CF67}"/>
               </a:ext>
             </a:extLst>
           </p:cNvPr>
@@ -5449,7 +5404,7 @@
           <a:p>
             <a:r>
               <a:rPr lang="en-US" sz="2800" dirty="0"/>
-              <a:t>Example</a:t>
+              <a:t>Exercise</a:t>
             </a:r>
             <a:r>
               <a:rPr lang="en-US" altLang="zh-CN" sz="2800" dirty="0"/>
@@ -5470,7 +5425,7 @@
     </p:spTree>
     <p:extLst>
       <p:ext uri="{BB962C8B-B14F-4D97-AF65-F5344CB8AC3E}">
-        <p14:creationId xmlns:p14="http://schemas.microsoft.com/office/powerpoint/2010/main" val="43407044"/>
+        <p14:creationId xmlns:p14="http://schemas.microsoft.com/office/powerpoint/2010/main" val="964224813"/>
       </p:ext>
     </p:extLst>
   </p:cSld>
@@ -5502,7 +5457,7 @@
           <p:cNvPr id="3" name="Content Placeholder 2">
             <a:extLst>
               <a:ext uri="{FF2B5EF4-FFF2-40B4-BE49-F238E27FC236}">
-                <a16:creationId xmlns:a16="http://schemas.microsoft.com/office/drawing/2014/main" id="{2F9E5E82-3C5D-323F-970D-EF112FB5DA03}"/>
+                <a16:creationId xmlns:a16="http://schemas.microsoft.com/office/drawing/2014/main" id="{560FAE92-1044-2D93-DCDA-90DC459FBE12}"/>
               </a:ext>
             </a:extLst>
           </p:cNvPr>
@@ -5515,8 +5470,8 @@
         </p:nvSpPr>
         <p:spPr>
           <a:xfrm>
-            <a:off x="581191" y="1416938"/>
-            <a:ext cx="11029615" cy="3288411"/>
+            <a:off x="504992" y="1512843"/>
+            <a:ext cx="11029615" cy="3259181"/>
           </a:xfrm>
         </p:spPr>
         <p:txBody>
@@ -5527,7 +5482,7 @@
           <a:p>
             <a:r>
               <a:rPr lang="en-US" sz="2000" dirty="0"/>
-              <a:t>List one-way streets that do not intersect with any subway station.</a:t>
+              <a:t>List neighborhoods with no subway stations.</a:t>
             </a:r>
           </a:p>
           <a:p>
@@ -5535,25 +5490,38 @@
               <a:buNone/>
             </a:pPr>
             <a:r>
-              <a:rPr lang="en-US" sz="1800" dirty="0">
-                <a:solidFill>
-                  <a:srgbClr val="00B0F0"/>
-                </a:solidFill>
-              </a:rPr>
-              <a:t>SELECT name</a:t>
-            </a:r>
+              <a:rPr lang="en-US" sz="2000" dirty="0">
+                <a:solidFill>
+                  <a:srgbClr val="00B0F0"/>
+                </a:solidFill>
+              </a:rPr>
+              <a:t>SELECT </a:t>
+            </a:r>
+            <a:r>
+              <a:rPr lang="en-US" sz="2000" dirty="0" err="1">
+                <a:solidFill>
+                  <a:srgbClr val="00B0F0"/>
+                </a:solidFill>
+              </a:rPr>
+              <a:t>boroname</a:t>
+            </a:r>
+            <a:endParaRPr lang="en-US" sz="2000" dirty="0">
+              <a:solidFill>
+                <a:srgbClr val="00B0F0"/>
+              </a:solidFill>
+            </a:endParaRPr>
           </a:p>
           <a:p>
             <a:pPr marL="324000" lvl="1" indent="0">
               <a:buNone/>
             </a:pPr>
             <a:r>
-              <a:rPr lang="en-US" sz="1800" dirty="0">
-                <a:solidFill>
-                  <a:srgbClr val="00B0F0"/>
-                </a:solidFill>
-              </a:rPr>
-              <a:t>FROM ch05.streets</a:t>
+              <a:rPr lang="en-US" sz="2000" dirty="0">
+                <a:solidFill>
+                  <a:srgbClr val="00B0F0"/>
+                </a:solidFill>
+              </a:rPr>
+              <a:t>FROM ch05.neighborhoods</a:t>
             </a:r>
           </a:p>
           <a:p>
@@ -5561,7 +5529,33 @@
               <a:buNone/>
             </a:pPr>
             <a:r>
-              <a:rPr lang="en-US" sz="1800" dirty="0">
+              <a:rPr lang="en-US" sz="2000" dirty="0">
+                <a:solidFill>
+                  <a:srgbClr val="00B0F0"/>
+                </a:solidFill>
+              </a:rPr>
+              <a:t>WHERE NOT EXISTS ( </a:t>
+            </a:r>
+          </a:p>
+          <a:p>
+            <a:pPr marL="324000" lvl="1" indent="0">
+              <a:buNone/>
+            </a:pPr>
+            <a:r>
+              <a:rPr lang="en-US" sz="2000" dirty="0">
+                <a:solidFill>
+                  <a:srgbClr val="00B0F0"/>
+                </a:solidFill>
+              </a:rPr>
+              <a:t>SELECT 1 FROM ch05.subway    </a:t>
+            </a:r>
+          </a:p>
+          <a:p>
+            <a:pPr marL="324000" lvl="1" indent="0">
+              <a:buNone/>
+            </a:pPr>
+            <a:r>
+              <a:rPr lang="en-US" sz="2000" dirty="0">
                 <a:solidFill>
                   <a:srgbClr val="00B0F0"/>
                 </a:solidFill>
@@ -5569,62 +5563,7 @@
               <a:t>WHERE </a:t>
             </a:r>
             <a:r>
-              <a:rPr lang="en-US" sz="1800" dirty="0" err="1">
-                <a:solidFill>
-                  <a:srgbClr val="00B0F0"/>
-                </a:solidFill>
-              </a:rPr>
-              <a:t>oneway</a:t>
-            </a:r>
-            <a:r>
-              <a:rPr lang="en-US" sz="1800" dirty="0">
-                <a:solidFill>
-                  <a:srgbClr val="00B0F0"/>
-                </a:solidFill>
-              </a:rPr>
-              <a:t> = 'Yes’</a:t>
-            </a:r>
-          </a:p>
-          <a:p>
-            <a:pPr marL="324000" lvl="1" indent="0">
-              <a:buNone/>
-            </a:pPr>
-            <a:r>
-              <a:rPr lang="en-US" sz="1800" dirty="0">
-                <a:solidFill>
-                  <a:srgbClr val="00B0F0"/>
-                </a:solidFill>
-              </a:rPr>
-              <a:t>AND NOT EXISTS ( </a:t>
-            </a:r>
-          </a:p>
-          <a:p>
-            <a:pPr marL="324000" lvl="1" indent="0">
-              <a:buNone/>
-            </a:pPr>
-            <a:r>
-              <a:rPr lang="en-US" sz="1800" dirty="0">
-                <a:solidFill>
-                  <a:srgbClr val="00B0F0"/>
-                </a:solidFill>
-              </a:rPr>
-              <a:t>SELECT 1 FROM ch05.subway </a:t>
-            </a:r>
-          </a:p>
-          <a:p>
-            <a:pPr marL="324000" lvl="1" indent="0">
-              <a:buNone/>
-            </a:pPr>
-            <a:r>
-              <a:rPr lang="en-US" sz="1800" dirty="0">
-                <a:solidFill>
-                  <a:srgbClr val="00B0F0"/>
-                </a:solidFill>
-              </a:rPr>
-              <a:t>WHERE </a:t>
-            </a:r>
-            <a:r>
-              <a:rPr lang="en-US" sz="1800" dirty="0" err="1">
+              <a:rPr lang="en-US" sz="2000" dirty="0" err="1">
                 <a:solidFill>
                   <a:srgbClr val="00B0F0"/>
                 </a:solidFill>
@@ -5632,28 +5571,12 @@
               <a:t>ST_Disjoint</a:t>
             </a:r>
             <a:r>
-              <a:rPr lang="en-US" sz="1800" dirty="0">
-                <a:solidFill>
-                  <a:srgbClr val="00B0F0"/>
-                </a:solidFill>
-              </a:rPr>
-              <a:t>(ch05.streets.geom, </a:t>
-            </a:r>
-            <a:r>
-              <a:rPr lang="en-US" sz="1800" dirty="0" err="1">
-                <a:solidFill>
-                  <a:srgbClr val="00B0F0"/>
-                </a:solidFill>
-              </a:rPr>
-              <a:t>ST_Buffer</a:t>
-            </a:r>
-            <a:r>
-              <a:rPr lang="en-US" sz="1800" dirty="0">
-                <a:solidFill>
-                  <a:srgbClr val="00B0F0"/>
-                </a:solidFill>
-              </a:rPr>
-              <a:t>(ch05.subway.geom, 50)) = FALSE);</a:t>
+              <a:rPr lang="en-US" sz="2000" dirty="0">
+                <a:solidFill>
+                  <a:srgbClr val="00B0F0"/>
+                </a:solidFill>
+              </a:rPr>
+              <a:t>(ch05.neighborhoods.geom, ch05.subway.geom) = FALSE);</a:t>
             </a:r>
           </a:p>
         </p:txBody>
@@ -5663,7 +5586,7 @@
           <p:cNvPr id="4" name="TextBox 3">
             <a:extLst>
               <a:ext uri="{FF2B5EF4-FFF2-40B4-BE49-F238E27FC236}">
-                <a16:creationId xmlns:a16="http://schemas.microsoft.com/office/drawing/2014/main" id="{DE421040-9A45-B9E1-81EB-4AC79DC7CF67}"/>
+                <a16:creationId xmlns:a16="http://schemas.microsoft.com/office/drawing/2014/main" id="{91F3053D-754E-8441-461A-44E8C55A4153}"/>
               </a:ext>
             </a:extLst>
           </p:cNvPr>
@@ -5688,11 +5611,11 @@
           <a:p>
             <a:r>
               <a:rPr lang="en-US" sz="2800" dirty="0"/>
-              <a:t>Exercise</a:t>
+              <a:t>Example</a:t>
             </a:r>
             <a:r>
               <a:rPr lang="en-US" altLang="zh-CN" sz="2800" dirty="0"/>
-              <a:t> 1</a:t>
+              <a:t> 2</a:t>
             </a:r>
             <a:r>
               <a:rPr lang="en-US" sz="2800" dirty="0"/>
@@ -5709,7 +5632,7 @@
     </p:spTree>
     <p:extLst>
       <p:ext uri="{BB962C8B-B14F-4D97-AF65-F5344CB8AC3E}">
-        <p14:creationId xmlns:p14="http://schemas.microsoft.com/office/powerpoint/2010/main" val="964224813"/>
+        <p14:creationId xmlns:p14="http://schemas.microsoft.com/office/powerpoint/2010/main" val="3851545665"/>
       </p:ext>
     </p:extLst>
   </p:cSld>
@@ -5741,7 +5664,7 @@
           <p:cNvPr id="3" name="Content Placeholder 2">
             <a:extLst>
               <a:ext uri="{FF2B5EF4-FFF2-40B4-BE49-F238E27FC236}">
-                <a16:creationId xmlns:a16="http://schemas.microsoft.com/office/drawing/2014/main" id="{560FAE92-1044-2D93-DCDA-90DC459FBE12}"/>
+                <a16:creationId xmlns:a16="http://schemas.microsoft.com/office/drawing/2014/main" id="{7A5F7DF1-4BCE-BE52-535B-C03DD3B0D222}"/>
               </a:ext>
             </a:extLst>
           </p:cNvPr>
@@ -5754,19 +5677,19 @@
         </p:nvSpPr>
         <p:spPr>
           <a:xfrm>
-            <a:off x="504992" y="1512843"/>
-            <a:ext cx="11029615" cy="3259181"/>
+            <a:off x="581191" y="1483613"/>
+            <a:ext cx="11029615" cy="3688461"/>
           </a:xfrm>
         </p:spPr>
         <p:txBody>
           <a:bodyPr>
-            <a:noAutofit/>
+            <a:normAutofit/>
           </a:bodyPr>
           <a:lstStyle/>
           <a:p>
             <a:r>
-              <a:rPr lang="en-US" sz="2000" dirty="0"/>
-              <a:t>List neighborhoods with no subway stations.</a:t>
+              <a:rPr lang="en-US" dirty="0"/>
+              <a:t>Find subway stations that are disjoint from major roads.</a:t>
             </a:r>
           </a:p>
           <a:p>
@@ -5774,7 +5697,7 @@
               <a:buNone/>
             </a:pPr>
             <a:r>
-              <a:rPr lang="en-US" sz="2000" dirty="0">
+              <a:rPr lang="en-US" sz="1800" dirty="0">
                 <a:solidFill>
                   <a:srgbClr val="00B0F0"/>
                 </a:solidFill>
@@ -5782,14 +5705,14 @@
               <a:t>SELECT </a:t>
             </a:r>
             <a:r>
-              <a:rPr lang="en-US" sz="2000" dirty="0" err="1">
-                <a:solidFill>
-                  <a:srgbClr val="00B0F0"/>
-                </a:solidFill>
-              </a:rPr>
-              <a:t>boroname</a:t>
-            </a:r>
-            <a:endParaRPr lang="en-US" sz="2000" dirty="0">
+              <a:rPr lang="en-US" sz="1800" dirty="0" err="1">
+                <a:solidFill>
+                  <a:srgbClr val="00B0F0"/>
+                </a:solidFill>
+              </a:rPr>
+              <a:t>station_name</a:t>
+            </a:r>
+            <a:endParaRPr lang="en-US" sz="1800" dirty="0">
               <a:solidFill>
                 <a:srgbClr val="00B0F0"/>
               </a:solidFill>
@@ -5800,12 +5723,12 @@
               <a:buNone/>
             </a:pPr>
             <a:r>
-              <a:rPr lang="en-US" sz="2000" dirty="0">
-                <a:solidFill>
-                  <a:srgbClr val="00B0F0"/>
-                </a:solidFill>
-              </a:rPr>
-              <a:t>FROM ch05.neighborhoods</a:t>
+              <a:rPr lang="en-US" sz="1800" dirty="0">
+                <a:solidFill>
+                  <a:srgbClr val="00B0F0"/>
+                </a:solidFill>
+              </a:rPr>
+              <a:t>FROM ch05.subway</a:t>
             </a:r>
           </a:p>
           <a:p>
@@ -5813,12 +5736,12 @@
               <a:buNone/>
             </a:pPr>
             <a:r>
-              <a:rPr lang="en-US" sz="2000" dirty="0">
-                <a:solidFill>
-                  <a:srgbClr val="00B0F0"/>
-                </a:solidFill>
-              </a:rPr>
-              <a:t>WHERE NOT EXISTS ( </a:t>
+              <a:rPr lang="en-US" sz="1800" dirty="0">
+                <a:solidFill>
+                  <a:srgbClr val="00B0F0"/>
+                </a:solidFill>
+              </a:rPr>
+              <a:t>WHERE NOT EXISTS (</a:t>
             </a:r>
           </a:p>
           <a:p>
@@ -5826,12 +5749,12 @@
               <a:buNone/>
             </a:pPr>
             <a:r>
-              <a:rPr lang="en-US" sz="2000" dirty="0">
-                <a:solidFill>
-                  <a:srgbClr val="00B0F0"/>
-                </a:solidFill>
-              </a:rPr>
-              <a:t>SELECT 1 FROM ch05.subway    </a:t>
+              <a:rPr lang="en-US" sz="1800" dirty="0">
+                <a:solidFill>
+                  <a:srgbClr val="00B0F0"/>
+                </a:solidFill>
+              </a:rPr>
+              <a:t>SELECT 1 FROM ch05.streets    </a:t>
             </a:r>
           </a:p>
           <a:p>
@@ -5839,7 +5762,7 @@
               <a:buNone/>
             </a:pPr>
             <a:r>
-              <a:rPr lang="en-US" sz="2000" dirty="0">
+              <a:rPr lang="en-US" sz="1800" dirty="0">
                 <a:solidFill>
                   <a:srgbClr val="00B0F0"/>
                 </a:solidFill>
@@ -5847,7 +5770,36 @@
               <a:t>WHERE </a:t>
             </a:r>
             <a:r>
-              <a:rPr lang="en-US" sz="2000" dirty="0" err="1">
+              <a:rPr lang="en-US" sz="1800" dirty="0" err="1">
+                <a:solidFill>
+                  <a:srgbClr val="00B0F0"/>
+                </a:solidFill>
+              </a:rPr>
+              <a:t>road_type</a:t>
+            </a:r>
+            <a:r>
+              <a:rPr lang="en-US" sz="1800" dirty="0">
+                <a:solidFill>
+                  <a:srgbClr val="00B0F0"/>
+                </a:solidFill>
+              </a:rPr>
+              <a:t> = 'Major'    </a:t>
+            </a:r>
+          </a:p>
+          <a:p>
+            <a:pPr marL="324000" lvl="1" indent="0">
+              <a:buNone/>
+            </a:pPr>
+            <a:r>
+              <a:rPr lang="en-US" sz="1800" dirty="0">
+                <a:solidFill>
+                  <a:srgbClr val="00B0F0"/>
+                </a:solidFill>
+              </a:rPr>
+              <a:t>AND </a:t>
+            </a:r>
+            <a:r>
+              <a:rPr lang="en-US" sz="1800" dirty="0" err="1">
                 <a:solidFill>
                   <a:srgbClr val="00B0F0"/>
                 </a:solidFill>
@@ -5855,12 +5807,28 @@
               <a:t>ST_Disjoint</a:t>
             </a:r>
             <a:r>
-              <a:rPr lang="en-US" sz="2000" dirty="0">
-                <a:solidFill>
-                  <a:srgbClr val="00B0F0"/>
-                </a:solidFill>
-              </a:rPr>
-              <a:t>(ch05.neighborhoods.geom, ch05.subway.geom) = FALSE);</a:t>
+              <a:rPr lang="en-US" sz="1800" dirty="0">
+                <a:solidFill>
+                  <a:srgbClr val="00B0F0"/>
+                </a:solidFill>
+              </a:rPr>
+              <a:t>(</a:t>
+            </a:r>
+            <a:r>
+              <a:rPr lang="en-US" sz="1800" dirty="0" err="1">
+                <a:solidFill>
+                  <a:srgbClr val="00B0F0"/>
+                </a:solidFill>
+              </a:rPr>
+              <a:t>ST_Buffer</a:t>
+            </a:r>
+            <a:r>
+              <a:rPr lang="en-US" sz="1800" dirty="0">
+                <a:solidFill>
+                  <a:srgbClr val="00B0F0"/>
+                </a:solidFill>
+              </a:rPr>
+              <a:t>(ch05.subway.geom, 50), ch05.streets.geom) = FALSE);</a:t>
             </a:r>
           </a:p>
         </p:txBody>
@@ -5870,7 +5838,7 @@
           <p:cNvPr id="4" name="TextBox 3">
             <a:extLst>
               <a:ext uri="{FF2B5EF4-FFF2-40B4-BE49-F238E27FC236}">
-                <a16:creationId xmlns:a16="http://schemas.microsoft.com/office/drawing/2014/main" id="{91F3053D-754E-8441-461A-44E8C55A4153}"/>
+                <a16:creationId xmlns:a16="http://schemas.microsoft.com/office/drawing/2014/main" id="{484A90A6-4F20-8935-0B63-0BD0B8C0A82E}"/>
               </a:ext>
             </a:extLst>
           </p:cNvPr>
@@ -5895,7 +5863,7 @@
           <a:p>
             <a:r>
               <a:rPr lang="en-US" sz="2800" dirty="0"/>
-              <a:t>Example</a:t>
+              <a:t>Exercise</a:t>
             </a:r>
             <a:r>
               <a:rPr lang="en-US" altLang="zh-CN" sz="2800" dirty="0"/>
@@ -5916,7 +5884,7 @@
     </p:spTree>
     <p:extLst>
       <p:ext uri="{BB962C8B-B14F-4D97-AF65-F5344CB8AC3E}">
-        <p14:creationId xmlns:p14="http://schemas.microsoft.com/office/powerpoint/2010/main" val="3851545665"/>
+        <p14:creationId xmlns:p14="http://schemas.microsoft.com/office/powerpoint/2010/main" val="1994899666"/>
       </p:ext>
     </p:extLst>
   </p:cSld>
@@ -5945,10 +5913,43 @@
       </p:grpSpPr>
       <p:sp>
         <p:nvSpPr>
+          <p:cNvPr id="2" name="Title 1">
+            <a:extLst>
+              <a:ext uri="{FF2B5EF4-FFF2-40B4-BE49-F238E27FC236}">
+                <a16:creationId xmlns:a16="http://schemas.microsoft.com/office/drawing/2014/main" id="{64E36CD5-3DBF-BAE6-7CF6-585C5F525485}"/>
+              </a:ext>
+            </a:extLst>
+          </p:cNvPr>
+          <p:cNvSpPr>
+            <a:spLocks noGrp="1"/>
+          </p:cNvSpPr>
+          <p:nvPr>
+            <p:ph type="title"/>
+          </p:nvPr>
+        </p:nvSpPr>
+        <p:spPr>
+          <a:xfrm>
+            <a:off x="581192" y="702156"/>
+            <a:ext cx="11029616" cy="574194"/>
+          </a:xfrm>
+        </p:spPr>
+        <p:txBody>
+          <a:bodyPr/>
+          <a:lstStyle/>
+          <a:p>
+            <a:r>
+              <a:rPr lang="en-US" dirty="0"/>
+              <a:t>TOOLS IN PGADMIN 4 – MATERIALIZED VIEWS</a:t>
+            </a:r>
+          </a:p>
+        </p:txBody>
+      </p:sp>
+      <p:sp>
+        <p:nvSpPr>
           <p:cNvPr id="3" name="Content Placeholder 2">
             <a:extLst>
               <a:ext uri="{FF2B5EF4-FFF2-40B4-BE49-F238E27FC236}">
-                <a16:creationId xmlns:a16="http://schemas.microsoft.com/office/drawing/2014/main" id="{7A5F7DF1-4BCE-BE52-535B-C03DD3B0D222}"/>
+                <a16:creationId xmlns:a16="http://schemas.microsoft.com/office/drawing/2014/main" id="{861D47DB-0F47-DE91-A1F8-68D7581EF238}"/>
               </a:ext>
             </a:extLst>
           </p:cNvPr>
@@ -5961,8 +5962,8 @@
         </p:nvSpPr>
         <p:spPr>
           <a:xfrm>
-            <a:off x="581191" y="1483613"/>
-            <a:ext cx="11029615" cy="3688461"/>
+            <a:off x="581193" y="1276350"/>
+            <a:ext cx="11029615" cy="1935861"/>
           </a:xfrm>
         </p:spPr>
         <p:txBody>
@@ -5973,7 +5974,7 @@
           <a:p>
             <a:r>
               <a:rPr lang="en-US" dirty="0"/>
-              <a:t>Find subway stations that are disjoint from major roads.</a:t>
+              <a:t>Create materialized views to store complex buffer analysis results for faster querying.</a:t>
             </a:r>
           </a:p>
           <a:p>
@@ -5986,7 +5987,20 @@
                   <a:srgbClr val="00B0F0"/>
                 </a:solidFill>
               </a:rPr>
-              <a:t>SELECT </a:t>
+              <a:t>CREATE MATERIALIZED VIEW ch05.station_buffers AS </a:t>
+            </a:r>
+          </a:p>
+          <a:p>
+            <a:pPr marL="324000" lvl="1" indent="0">
+              <a:buNone/>
+            </a:pPr>
+            <a:r>
+              <a:rPr lang="en-US" sz="1800" dirty="0">
+                <a:solidFill>
+                  <a:srgbClr val="00B0F0"/>
+                </a:solidFill>
+              </a:rPr>
+              <a:t>SELECT NAME, </a:t>
             </a:r>
             <a:r>
               <a:rPr lang="en-US" sz="1800" dirty="0" err="1">
@@ -5994,13 +6008,32 @@
                   <a:srgbClr val="00B0F0"/>
                 </a:solidFill>
               </a:rPr>
-              <a:t>station_name</a:t>
-            </a:r>
-            <a:endParaRPr lang="en-US" sz="1800" dirty="0">
-              <a:solidFill>
-                <a:srgbClr val="00B0F0"/>
-              </a:solidFill>
-            </a:endParaRPr>
+              <a:t>ST_Buffer</a:t>
+            </a:r>
+            <a:r>
+              <a:rPr lang="en-US" sz="1800" dirty="0">
+                <a:solidFill>
+                  <a:srgbClr val="00B0F0"/>
+                </a:solidFill>
+              </a:rPr>
+              <a:t>(geometry, 300) AS </a:t>
+            </a:r>
+            <a:r>
+              <a:rPr lang="en-US" sz="1800" dirty="0" err="1">
+                <a:solidFill>
+                  <a:srgbClr val="00B0F0"/>
+                </a:solidFill>
+              </a:rPr>
+              <a:t>buffer_geom</a:t>
+            </a:r>
+            <a:r>
+              <a:rPr lang="en-US" sz="1800" dirty="0">
+                <a:solidFill>
+                  <a:srgbClr val="00B0F0"/>
+                </a:solidFill>
+              </a:rPr>
+              <a:t> </a:t>
+            </a:r>
           </a:p>
           <a:p>
             <a:pPr marL="324000" lvl="1" indent="0">
@@ -6012,163 +6045,15 @@
                   <a:srgbClr val="00B0F0"/>
                 </a:solidFill>
               </a:rPr>
-              <a:t>FROM ch05.subway</a:t>
-            </a:r>
-          </a:p>
-          <a:p>
-            <a:pPr marL="324000" lvl="1" indent="0">
-              <a:buNone/>
-            </a:pPr>
-            <a:r>
-              <a:rPr lang="en-US" sz="1800" dirty="0">
-                <a:solidFill>
-                  <a:srgbClr val="00B0F0"/>
-                </a:solidFill>
-              </a:rPr>
-              <a:t>WHERE NOT EXISTS (</a:t>
-            </a:r>
-          </a:p>
-          <a:p>
-            <a:pPr marL="324000" lvl="1" indent="0">
-              <a:buNone/>
-            </a:pPr>
-            <a:r>
-              <a:rPr lang="en-US" sz="1800" dirty="0">
-                <a:solidFill>
-                  <a:srgbClr val="00B0F0"/>
-                </a:solidFill>
-              </a:rPr>
-              <a:t>SELECT 1 FROM ch05.streets    </a:t>
-            </a:r>
-          </a:p>
-          <a:p>
-            <a:pPr marL="324000" lvl="1" indent="0">
-              <a:buNone/>
-            </a:pPr>
-            <a:r>
-              <a:rPr lang="en-US" sz="1800" dirty="0">
-                <a:solidFill>
-                  <a:srgbClr val="00B0F0"/>
-                </a:solidFill>
-              </a:rPr>
-              <a:t>WHERE </a:t>
-            </a:r>
-            <a:r>
-              <a:rPr lang="en-US" sz="1800" dirty="0" err="1">
-                <a:solidFill>
-                  <a:srgbClr val="00B0F0"/>
-                </a:solidFill>
-              </a:rPr>
-              <a:t>road_type</a:t>
-            </a:r>
-            <a:r>
-              <a:rPr lang="en-US" sz="1800" dirty="0">
-                <a:solidFill>
-                  <a:srgbClr val="00B0F0"/>
-                </a:solidFill>
-              </a:rPr>
-              <a:t> = 'Major'    </a:t>
-            </a:r>
-          </a:p>
-          <a:p>
-            <a:pPr marL="324000" lvl="1" indent="0">
-              <a:buNone/>
-            </a:pPr>
-            <a:r>
-              <a:rPr lang="en-US" sz="1800" dirty="0">
-                <a:solidFill>
-                  <a:srgbClr val="00B0F0"/>
-                </a:solidFill>
-              </a:rPr>
-              <a:t>AND </a:t>
-            </a:r>
-            <a:r>
-              <a:rPr lang="en-US" sz="1800" dirty="0" err="1">
-                <a:solidFill>
-                  <a:srgbClr val="00B0F0"/>
-                </a:solidFill>
-              </a:rPr>
-              <a:t>ST_Disjoint</a:t>
-            </a:r>
-            <a:r>
-              <a:rPr lang="en-US" sz="1800" dirty="0">
-                <a:solidFill>
-                  <a:srgbClr val="00B0F0"/>
-                </a:solidFill>
-              </a:rPr>
-              <a:t>(</a:t>
-            </a:r>
-            <a:r>
-              <a:rPr lang="en-US" sz="1800" dirty="0" err="1">
-                <a:solidFill>
-                  <a:srgbClr val="00B0F0"/>
-                </a:solidFill>
-              </a:rPr>
-              <a:t>ST_Buffer</a:t>
-            </a:r>
-            <a:r>
-              <a:rPr lang="en-US" sz="1800" dirty="0">
-                <a:solidFill>
-                  <a:srgbClr val="00B0F0"/>
-                </a:solidFill>
-              </a:rPr>
-              <a:t>(ch05.subway.geom, 50), ch05.streets.geom) = FALSE);</a:t>
-            </a:r>
-          </a:p>
-        </p:txBody>
-      </p:sp>
-      <p:sp>
-        <p:nvSpPr>
-          <p:cNvPr id="4" name="TextBox 3">
-            <a:extLst>
-              <a:ext uri="{FF2B5EF4-FFF2-40B4-BE49-F238E27FC236}">
-                <a16:creationId xmlns:a16="http://schemas.microsoft.com/office/drawing/2014/main" id="{484A90A6-4F20-8935-0B63-0BD0B8C0A82E}"/>
-              </a:ext>
-            </a:extLst>
-          </p:cNvPr>
-          <p:cNvSpPr txBox="1"/>
-          <p:nvPr/>
-        </p:nvSpPr>
-        <p:spPr>
-          <a:xfrm>
-            <a:off x="504992" y="743916"/>
-            <a:ext cx="5514808" cy="523220"/>
-          </a:xfrm>
-          <a:prstGeom prst="rect">
-            <a:avLst/>
-          </a:prstGeom>
-          <a:noFill/>
-        </p:spPr>
-        <p:txBody>
-          <a:bodyPr wrap="square" rtlCol="0">
-            <a:spAutoFit/>
-          </a:bodyPr>
-          <a:lstStyle/>
-          <a:p>
-            <a:r>
-              <a:rPr lang="en-US" sz="2800" dirty="0"/>
-              <a:t>Exercise</a:t>
-            </a:r>
-            <a:r>
-              <a:rPr lang="en-US" altLang="zh-CN" sz="2800" dirty="0"/>
-              <a:t> 2</a:t>
-            </a:r>
-            <a:r>
-              <a:rPr lang="en-US" sz="2800" dirty="0"/>
-              <a:t>: </a:t>
-            </a:r>
-            <a:r>
-              <a:rPr lang="en-US" sz="2800" dirty="0" err="1"/>
-              <a:t>ST_Disjoint</a:t>
-            </a:r>
-            <a:endParaRPr lang="en-US" sz="2800" dirty="0"/>
+              <a:t>FROM ch05.nyc_subway_stations;</a:t>
+            </a:r>
           </a:p>
         </p:txBody>
       </p:sp>
     </p:spTree>
     <p:extLst>
       <p:ext uri="{BB962C8B-B14F-4D97-AF65-F5344CB8AC3E}">
-        <p14:creationId xmlns:p14="http://schemas.microsoft.com/office/powerpoint/2010/main" val="1994899666"/>
+        <p14:creationId xmlns:p14="http://schemas.microsoft.com/office/powerpoint/2010/main" val="2854411829"/>
       </p:ext>
     </p:extLst>
   </p:cSld>
@@ -6200,7 +6085,7 @@
           <p:cNvPr id="2" name="Title 1">
             <a:extLst>
               <a:ext uri="{FF2B5EF4-FFF2-40B4-BE49-F238E27FC236}">
-                <a16:creationId xmlns:a16="http://schemas.microsoft.com/office/drawing/2014/main" id="{68997778-0D92-C897-B435-DC143BD6E979}"/>
+                <a16:creationId xmlns:a16="http://schemas.microsoft.com/office/drawing/2014/main" id="{E0EC588A-D6DE-08A3-EFFB-AF7F0822DC33}"/>
               </a:ext>
             </a:extLst>
           </p:cNvPr>
@@ -6213,16 +6098,13 @@
         </p:nvSpPr>
         <p:spPr/>
         <p:txBody>
-          <a:bodyPr>
-            <a:normAutofit/>
-          </a:bodyPr>
+          <a:bodyPr/>
           <a:lstStyle/>
           <a:p>
             <a:r>
-              <a:rPr lang="en-US" b="1" dirty="0"/>
-              <a:t>Scenario 2</a:t>
-            </a:r>
-            <a:endParaRPr lang="en-US" dirty="0"/>
+              <a:rPr lang="en-US" dirty="0"/>
+              <a:t>TOOLS IN PGADMIN 4 - FUNCTIONS</a:t>
+            </a:r>
           </a:p>
         </p:txBody>
       </p:sp>
@@ -6231,7 +6113,7 @@
           <p:cNvPr id="3" name="Content Placeholder 2">
             <a:extLst>
               <a:ext uri="{FF2B5EF4-FFF2-40B4-BE49-F238E27FC236}">
-                <a16:creationId xmlns:a16="http://schemas.microsoft.com/office/drawing/2014/main" id="{86BB65ED-F08E-6AF8-CE05-FABCF43D860C}"/>
+                <a16:creationId xmlns:a16="http://schemas.microsoft.com/office/drawing/2014/main" id="{BE6037DF-D050-5883-3EC2-3BDD696D1E25}"/>
               </a:ext>
             </a:extLst>
           </p:cNvPr>
@@ -6242,100 +6124,235 @@
             <p:ph idx="1"/>
           </p:nvPr>
         </p:nvSpPr>
-        <p:spPr>
-          <a:xfrm>
-            <a:off x="581192" y="2340864"/>
-            <a:ext cx="11029615" cy="2051027"/>
-          </a:xfrm>
-        </p:spPr>
+        <p:spPr/>
         <p:txBody>
           <a:bodyPr>
-            <a:normAutofit/>
+            <a:normAutofit lnSpcReduction="10000"/>
           </a:bodyPr>
           <a:lstStyle/>
           <a:p>
-            <a:pPr lvl="1"/>
-            <a:r>
-              <a:rPr lang="en-US" sz="1800" dirty="0"/>
-              <a:t>Identify potential flood zones by buffering the coastline and identifying streets within the buffer.</a:t>
-            </a:r>
-          </a:p>
-          <a:p>
-            <a:pPr marL="594000" lvl="2" indent="0">
+            <a:r>
+              <a:rPr lang="en-US" dirty="0"/>
+              <a:t>Write custom SQL functions to automate repetitive buffer analysis tasks.</a:t>
+            </a:r>
+          </a:p>
+          <a:p>
+            <a:endParaRPr lang="en-US" dirty="0"/>
+          </a:p>
+          <a:p>
+            <a:pPr marL="324000" lvl="1" indent="0">
               <a:buNone/>
             </a:pPr>
-            <a:br>
-              <a:rPr lang="en-US" sz="1800" dirty="0"/>
-            </a:br>
-            <a:r>
-              <a:rPr lang="en-US" sz="1800" dirty="0"/>
-              <a:t>SELECT s.NAME  </a:t>
-            </a:r>
-          </a:p>
-          <a:p>
-            <a:pPr marL="594000" lvl="2" indent="0">
+            <a:r>
+              <a:rPr lang="en-US" dirty="0">
+                <a:solidFill>
+                  <a:srgbClr val="00B0F0"/>
+                </a:solidFill>
+              </a:rPr>
+              <a:t>CREATE FUNCTION ch05.get_stations_within_buffer(distance FLOAT) </a:t>
+            </a:r>
+          </a:p>
+          <a:p>
+            <a:pPr marL="324000" lvl="1" indent="0">
               <a:buNone/>
             </a:pPr>
             <a:r>
-              <a:rPr lang="en-US" sz="1800" dirty="0"/>
-              <a:t>FROM </a:t>
-            </a:r>
-            <a:r>
-              <a:rPr lang="en-US" sz="1800" dirty="0" err="1"/>
-              <a:t>nyc_streets</a:t>
-            </a:r>
-            <a:r>
-              <a:rPr lang="en-US" sz="1800" dirty="0"/>
-              <a:t> s, </a:t>
-            </a:r>
-            <a:r>
-              <a:rPr lang="en-US" sz="1800" dirty="0" err="1"/>
-              <a:t>nyc_coastline</a:t>
-            </a:r>
-            <a:r>
-              <a:rPr lang="en-US" sz="1800" dirty="0"/>
-              <a:t> c  </a:t>
-            </a:r>
-          </a:p>
-          <a:p>
-            <a:pPr marL="594000" lvl="2" indent="0">
+              <a:rPr lang="en-US" dirty="0">
+                <a:solidFill>
+                  <a:srgbClr val="00B0F0"/>
+                </a:solidFill>
+              </a:rPr>
+              <a:t>RETURNS TABLE(</a:t>
+            </a:r>
+            <a:r>
+              <a:rPr lang="en-US" dirty="0" err="1">
+                <a:solidFill>
+                  <a:srgbClr val="00B0F0"/>
+                </a:solidFill>
+              </a:rPr>
+              <a:t>station_name</a:t>
+            </a:r>
+            <a:r>
+              <a:rPr lang="en-US" dirty="0">
+                <a:solidFill>
+                  <a:srgbClr val="00B0F0"/>
+                </a:solidFill>
+              </a:rPr>
+              <a:t> TEXT, </a:t>
+            </a:r>
+            <a:r>
+              <a:rPr lang="en-US" dirty="0" err="1">
+                <a:solidFill>
+                  <a:srgbClr val="00B0F0"/>
+                </a:solidFill>
+              </a:rPr>
+              <a:t>street_name</a:t>
+            </a:r>
+            <a:r>
+              <a:rPr lang="en-US" dirty="0">
+                <a:solidFill>
+                  <a:srgbClr val="00B0F0"/>
+                </a:solidFill>
+              </a:rPr>
+              <a:t> TEXT) AS $$</a:t>
+            </a:r>
+          </a:p>
+          <a:p>
+            <a:pPr marL="324000" lvl="1" indent="0">
               <a:buNone/>
             </a:pPr>
             <a:r>
-              <a:rPr lang="en-US" sz="1800" dirty="0"/>
+              <a:rPr lang="en-US" dirty="0">
+                <a:solidFill>
+                  <a:srgbClr val="00B0F0"/>
+                </a:solidFill>
+              </a:rPr>
+              <a:t>BEGIN  </a:t>
+            </a:r>
+          </a:p>
+          <a:p>
+            <a:pPr marL="324000" lvl="1" indent="0">
+              <a:buNone/>
+            </a:pPr>
+            <a:r>
+              <a:rPr lang="en-US" dirty="0">
+                <a:solidFill>
+                  <a:srgbClr val="00B0F0"/>
+                </a:solidFill>
+              </a:rPr>
+              <a:t>RETURN QUERY   </a:t>
+            </a:r>
+          </a:p>
+          <a:p>
+            <a:pPr marL="324000" lvl="1" indent="0">
+              <a:buNone/>
+            </a:pPr>
+            <a:r>
+              <a:rPr lang="en-US" dirty="0">
+                <a:solidFill>
+                  <a:srgbClr val="00B0F0"/>
+                </a:solidFill>
+              </a:rPr>
+              <a:t>SELECT st.NAME, s.NAME   </a:t>
+            </a:r>
+          </a:p>
+          <a:p>
+            <a:pPr marL="324000" lvl="1" indent="0">
+              <a:buNone/>
+            </a:pPr>
+            <a:r>
+              <a:rPr lang="en-US" dirty="0">
+                <a:solidFill>
+                  <a:srgbClr val="00B0F0"/>
+                </a:solidFill>
+              </a:rPr>
+              <a:t>FROM ch05.nyc_subway_stations </a:t>
+            </a:r>
+            <a:r>
+              <a:rPr lang="en-US" dirty="0" err="1">
+                <a:solidFill>
+                  <a:srgbClr val="00B0F0"/>
+                </a:solidFill>
+              </a:rPr>
+              <a:t>st</a:t>
+            </a:r>
+            <a:r>
+              <a:rPr lang="en-US" dirty="0">
+                <a:solidFill>
+                  <a:srgbClr val="00B0F0"/>
+                </a:solidFill>
+              </a:rPr>
+              <a:t>, ch05.nyc_streets s   </a:t>
+            </a:r>
+          </a:p>
+          <a:p>
+            <a:pPr marL="324000" lvl="1" indent="0">
+              <a:buNone/>
+            </a:pPr>
+            <a:r>
+              <a:rPr lang="en-US" dirty="0">
+                <a:solidFill>
+                  <a:srgbClr val="00B0F0"/>
+                </a:solidFill>
+              </a:rPr>
               <a:t>WHERE </a:t>
             </a:r>
             <a:r>
-              <a:rPr lang="en-US" sz="1800" dirty="0" err="1"/>
-              <a:t>ST_Intersects</a:t>
-            </a:r>
-            <a:r>
-              <a:rPr lang="en-US" sz="1800" dirty="0"/>
+              <a:rPr lang="en-US" dirty="0" err="1">
+                <a:solidFill>
+                  <a:srgbClr val="00B0F0"/>
+                </a:solidFill>
+              </a:rPr>
+              <a:t>ST_DWithin</a:t>
+            </a:r>
+            <a:r>
+              <a:rPr lang="en-US" dirty="0">
+                <a:solidFill>
+                  <a:srgbClr val="00B0F0"/>
+                </a:solidFill>
+              </a:rPr>
               <a:t>(</a:t>
             </a:r>
             <a:r>
-              <a:rPr lang="en-US" sz="1800" dirty="0" err="1"/>
-              <a:t>ST_Buffer</a:t>
-            </a:r>
-            <a:r>
-              <a:rPr lang="en-US" sz="1800" dirty="0"/>
-              <a:t>(</a:t>
-            </a:r>
-            <a:r>
-              <a:rPr lang="en-US" sz="1800" dirty="0" err="1"/>
-              <a:t>c.geometry</a:t>
-            </a:r>
-            <a:r>
-              <a:rPr lang="en-US" sz="1800" dirty="0"/>
-              <a:t>, 1000), </a:t>
-            </a:r>
-            <a:r>
-              <a:rPr lang="en-US" sz="1800" dirty="0" err="1"/>
+              <a:rPr lang="en-US" dirty="0" err="1">
+                <a:solidFill>
+                  <a:srgbClr val="00B0F0"/>
+                </a:solidFill>
+              </a:rPr>
+              <a:t>st.geometry</a:t>
+            </a:r>
+            <a:r>
+              <a:rPr lang="en-US" dirty="0">
+                <a:solidFill>
+                  <a:srgbClr val="00B0F0"/>
+                </a:solidFill>
+              </a:rPr>
+              <a:t>, </a:t>
+            </a:r>
+            <a:r>
+              <a:rPr lang="en-US" dirty="0" err="1">
+                <a:solidFill>
+                  <a:srgbClr val="00B0F0"/>
+                </a:solidFill>
+              </a:rPr>
               <a:t>s.geometry</a:t>
             </a:r>
             <a:r>
-              <a:rPr lang="en-US" sz="1800" dirty="0"/>
-              <a:t>);</a:t>
+              <a:rPr lang="en-US" dirty="0">
+                <a:solidFill>
+                  <a:srgbClr val="00B0F0"/>
+                </a:solidFill>
+              </a:rPr>
+              <a:t>, distance);</a:t>
+            </a:r>
+          </a:p>
+          <a:p>
+            <a:pPr marL="324000" lvl="1" indent="0">
+              <a:buNone/>
+            </a:pPr>
+            <a:r>
+              <a:rPr lang="en-US" dirty="0">
+                <a:solidFill>
+                  <a:srgbClr val="00B0F0"/>
+                </a:solidFill>
+              </a:rPr>
+              <a:t>END;$$ LANGUAGE </a:t>
+            </a:r>
+            <a:r>
+              <a:rPr lang="en-US" dirty="0" err="1">
+                <a:solidFill>
+                  <a:srgbClr val="00B0F0"/>
+                </a:solidFill>
+              </a:rPr>
+              <a:t>plpgsql</a:t>
+            </a:r>
+            <a:r>
+              <a:rPr lang="en-US" dirty="0">
+                <a:solidFill>
+                  <a:srgbClr val="00B0F0"/>
+                </a:solidFill>
+              </a:rPr>
+              <a:t>;</a:t>
             </a:r>
           </a:p>
         </p:txBody>
@@ -6343,7 +6360,7 @@
     </p:spTree>
     <p:extLst>
       <p:ext uri="{BB962C8B-B14F-4D97-AF65-F5344CB8AC3E}">
-        <p14:creationId xmlns:p14="http://schemas.microsoft.com/office/powerpoint/2010/main" val="78832131"/>
+        <p14:creationId xmlns:p14="http://schemas.microsoft.com/office/powerpoint/2010/main" val="2221672660"/>
       </p:ext>
     </p:extLst>
   </p:cSld>
@@ -6375,7 +6392,7 @@
           <p:cNvPr id="2" name="Title 1">
             <a:extLst>
               <a:ext uri="{FF2B5EF4-FFF2-40B4-BE49-F238E27FC236}">
-                <a16:creationId xmlns:a16="http://schemas.microsoft.com/office/drawing/2014/main" id="{E9A99951-2173-336C-6657-79F75A79B63A}"/>
+                <a16:creationId xmlns:a16="http://schemas.microsoft.com/office/drawing/2014/main" id="{6AFDAB0B-1269-9F6C-D8A0-E3650409C648}"/>
               </a:ext>
             </a:extLst>
           </p:cNvPr>
@@ -6386,21 +6403,14 @@
             <p:ph type="title"/>
           </p:nvPr>
         </p:nvSpPr>
-        <p:spPr>
-          <a:xfrm>
-            <a:off x="581192" y="702156"/>
-            <a:ext cx="11029616" cy="600171"/>
-          </a:xfrm>
-        </p:spPr>
-        <p:txBody>
-          <a:bodyPr>
-            <a:normAutofit/>
-          </a:bodyPr>
+        <p:spPr/>
+        <p:txBody>
+          <a:bodyPr/>
           <a:lstStyle/>
           <a:p>
             <a:r>
               <a:rPr lang="en-US" dirty="0"/>
-              <a:t>Real-World Project Example</a:t>
+              <a:t>TOOLS IN PGADMIN 4 - VIEWS</a:t>
             </a:r>
           </a:p>
         </p:txBody>
@@ -6410,7 +6420,7 @@
           <p:cNvPr id="3" name="Content Placeholder 2">
             <a:extLst>
               <a:ext uri="{FF2B5EF4-FFF2-40B4-BE49-F238E27FC236}">
-                <a16:creationId xmlns:a16="http://schemas.microsoft.com/office/drawing/2014/main" id="{5D5C0DB1-FCD0-2193-7033-AB0BEA2196DC}"/>
+                <a16:creationId xmlns:a16="http://schemas.microsoft.com/office/drawing/2014/main" id="{57CF7F19-5B2B-AB2D-263A-2A3D1302199B}"/>
               </a:ext>
             </a:extLst>
           </p:cNvPr>
@@ -6421,50 +6431,88 @@
             <p:ph idx="1"/>
           </p:nvPr>
         </p:nvSpPr>
-        <p:spPr>
-          <a:xfrm>
-            <a:off x="581193" y="1454172"/>
-            <a:ext cx="11029615" cy="2833809"/>
-          </a:xfrm>
-        </p:spPr>
-        <p:txBody>
-          <a:bodyPr>
-            <a:normAutofit/>
-          </a:bodyPr>
+        <p:spPr/>
+        <p:txBody>
+          <a:bodyPr/>
           <a:lstStyle/>
           <a:p>
-            <a:pPr>
-              <a:buFont typeface="Wingdings" panose="05000000000000000000" pitchFamily="2" charset="2"/>
-              <a:buChar char="§"/>
+            <a:r>
+              <a:rPr lang="en-US" dirty="0"/>
+              <a:t>Simplify complex queries with views for better data visualization.</a:t>
+            </a:r>
+          </a:p>
+          <a:p>
+            <a:endParaRPr lang="en-US" dirty="0"/>
+          </a:p>
+          <a:p>
+            <a:pPr marL="594000" lvl="2" indent="0">
+              <a:buNone/>
             </a:pPr>
             <a:r>
-              <a:rPr lang="en-US" b="1" dirty="0"/>
-              <a:t>NYC Emergency Response Planning:</a:t>
-            </a:r>
-            <a:endParaRPr lang="en-US" dirty="0"/>
-          </a:p>
-          <a:p>
-            <a:pPr marL="742950" lvl="1" indent="-285750">
-              <a:buFont typeface="Arial" panose="020B0604020202020204" pitchFamily="34" charset="0"/>
-              <a:buChar char="•"/>
+              <a:rPr lang="en-US" dirty="0">
+                <a:solidFill>
+                  <a:srgbClr val="00B0F0"/>
+                </a:solidFill>
+              </a:rPr>
+              <a:t>CREATE VIEW ch05.residential_near_stations AS </a:t>
+            </a:r>
+          </a:p>
+          <a:p>
+            <a:pPr marL="594000" lvl="2" indent="0">
+              <a:buNone/>
             </a:pPr>
             <a:r>
-              <a:rPr lang="en-US" dirty="0"/>
-              <a:t>Buffer zones around subway stations are used to plan emergency evacuation routes and resource allocation.</a:t>
-            </a:r>
-          </a:p>
-          <a:p>
-            <a:pPr marL="742950" lvl="1" indent="-285750">
-              <a:buFont typeface="Arial" panose="020B0604020202020204" pitchFamily="34" charset="0"/>
-              <a:buChar char="•"/>
+              <a:rPr lang="en-US" dirty="0">
+                <a:solidFill>
+                  <a:srgbClr val="00B0F0"/>
+                </a:solidFill>
+              </a:rPr>
+              <a:t>SELECT s.NAME AS </a:t>
+            </a:r>
+            <a:r>
+              <a:rPr lang="en-US" dirty="0" err="1">
+                <a:solidFill>
+                  <a:srgbClr val="00B0F0"/>
+                </a:solidFill>
+              </a:rPr>
+              <a:t>street_name</a:t>
+            </a:r>
+            <a:r>
+              <a:rPr lang="en-US" dirty="0">
+                <a:solidFill>
+                  <a:srgbClr val="00B0F0"/>
+                </a:solidFill>
+              </a:rPr>
+              <a:t>, st.NAME AS </a:t>
+            </a:r>
+            <a:r>
+              <a:rPr lang="en-US" dirty="0" err="1">
+                <a:solidFill>
+                  <a:srgbClr val="00B0F0"/>
+                </a:solidFill>
+              </a:rPr>
+              <a:t>station_name</a:t>
+            </a:r>
+            <a:r>
+              <a:rPr lang="en-US" dirty="0">
+                <a:solidFill>
+                  <a:srgbClr val="00B0F0"/>
+                </a:solidFill>
+              </a:rPr>
+              <a:t> </a:t>
+            </a:r>
+          </a:p>
+          <a:p>
+            <a:pPr marL="594000" lvl="2" indent="0">
+              <a:buNone/>
             </a:pPr>
             <a:r>
-              <a:rPr lang="en-US" b="1" dirty="0"/>
-              <a:t>Example:</a:t>
-            </a:r>
-            <a:r>
-              <a:rPr lang="en-US" dirty="0"/>
-              <a:t> During Hurricane Sandy, buffer analysis helped identify critical infrastructure within flood-prone zones, aiding in evacuation and resource deployment.</a:t>
+              <a:rPr lang="en-US" dirty="0">
+                <a:solidFill>
+                  <a:srgbClr val="00B0F0"/>
+                </a:solidFill>
+              </a:rPr>
+              <a:t>FROM ch05.nyc_streets s </a:t>
             </a:r>
           </a:p>
           <a:p>
@@ -6477,7 +6525,7 @@
                   <a:srgbClr val="00B0F0"/>
                 </a:solidFill>
               </a:rPr>
-              <a:t>SELECT st.NAME AS </a:t>
+              <a:t>JOIN ch05.nyc_subway_stations </a:t>
             </a:r>
             <a:r>
               <a:rPr lang="en-US" dirty="0" err="1">
@@ -6485,7 +6533,7 @@
                   <a:srgbClr val="00B0F0"/>
                 </a:solidFill>
               </a:rPr>
-              <a:t>station_name</a:t>
+              <a:t>st</a:t>
             </a:r>
             <a:r>
               <a:rPr lang="en-US" dirty="0">
@@ -6493,7 +6541,20 @@
                   <a:srgbClr val="00B0F0"/>
                 </a:solidFill>
               </a:rPr>
-              <a:t>, s.NAME AS </a:t>
+              <a:t> </a:t>
+            </a:r>
+          </a:p>
+          <a:p>
+            <a:pPr marL="594000" lvl="2" indent="0">
+              <a:buNone/>
+            </a:pPr>
+            <a:r>
+              <a:rPr lang="en-US" dirty="0">
+                <a:solidFill>
+                  <a:srgbClr val="00B0F0"/>
+                </a:solidFill>
+              </a:rPr>
+              <a:t>ON </a:t>
             </a:r>
             <a:r>
               <a:rPr lang="en-US" dirty="0" err="1">
@@ -6501,7 +6562,7 @@
                   <a:srgbClr val="00B0F0"/>
                 </a:solidFill>
               </a:rPr>
-              <a:t>street_name</a:t>
+              <a:t>ST_DWithin</a:t>
             </a:r>
             <a:r>
               <a:rPr lang="en-US" dirty="0">
@@ -6509,7 +6570,39 @@
                   <a:srgbClr val="00B0F0"/>
                 </a:solidFill>
               </a:rPr>
-              <a:t>  </a:t>
+              <a:t>(</a:t>
+            </a:r>
+            <a:r>
+              <a:rPr lang="en-US" dirty="0" err="1">
+                <a:solidFill>
+                  <a:srgbClr val="00B0F0"/>
+                </a:solidFill>
+              </a:rPr>
+              <a:t>s.geometry</a:t>
+            </a:r>
+            <a:r>
+              <a:rPr lang="en-US" dirty="0">
+                <a:solidFill>
+                  <a:srgbClr val="00B0F0"/>
+                </a:solidFill>
+              </a:rPr>
+              <a:t>, </a:t>
+            </a:r>
+            <a:r>
+              <a:rPr lang="en-US" dirty="0" err="1">
+                <a:solidFill>
+                  <a:srgbClr val="00B0F0"/>
+                </a:solidFill>
+              </a:rPr>
+              <a:t>st.geometry</a:t>
+            </a:r>
+            <a:r>
+              <a:rPr lang="en-US" dirty="0">
+                <a:solidFill>
+                  <a:srgbClr val="00B0F0"/>
+                </a:solidFill>
+              </a:rPr>
+              <a:t>, 300) </a:t>
             </a:r>
           </a:p>
           <a:p>
@@ -6522,132 +6615,7 @@
                   <a:srgbClr val="00B0F0"/>
                 </a:solidFill>
               </a:rPr>
-              <a:t>FROM </a:t>
-            </a:r>
-            <a:r>
-              <a:rPr lang="en-US" dirty="0" err="1">
-                <a:solidFill>
-                  <a:srgbClr val="00B0F0"/>
-                </a:solidFill>
-              </a:rPr>
-              <a:t>nyc_subway_stations</a:t>
-            </a:r>
-            <a:r>
-              <a:rPr lang="en-US" dirty="0">
-                <a:solidFill>
-                  <a:srgbClr val="00B0F0"/>
-                </a:solidFill>
-              </a:rPr>
-              <a:t> </a:t>
-            </a:r>
-            <a:r>
-              <a:rPr lang="en-US" dirty="0" err="1">
-                <a:solidFill>
-                  <a:srgbClr val="00B0F0"/>
-                </a:solidFill>
-              </a:rPr>
-              <a:t>st</a:t>
-            </a:r>
-            <a:r>
-              <a:rPr lang="en-US" dirty="0">
-                <a:solidFill>
-                  <a:srgbClr val="00B0F0"/>
-                </a:solidFill>
-              </a:rPr>
-              <a:t>, </a:t>
-            </a:r>
-            <a:r>
-              <a:rPr lang="en-US" dirty="0" err="1">
-                <a:solidFill>
-                  <a:srgbClr val="00B0F0"/>
-                </a:solidFill>
-              </a:rPr>
-              <a:t>nyc_streets</a:t>
-            </a:r>
-            <a:r>
-              <a:rPr lang="en-US" dirty="0">
-                <a:solidFill>
-                  <a:srgbClr val="00B0F0"/>
-                </a:solidFill>
-              </a:rPr>
-              <a:t> s  </a:t>
-            </a:r>
-          </a:p>
-          <a:p>
-            <a:pPr marL="594000" lvl="2" indent="0">
-              <a:buNone/>
-            </a:pPr>
-            <a:r>
-              <a:rPr lang="en-US" dirty="0">
-                <a:solidFill>
-                  <a:srgbClr val="00B0F0"/>
-                </a:solidFill>
-              </a:rPr>
               <a:t>WHERE </a:t>
-            </a:r>
-            <a:r>
-              <a:rPr lang="en-US" dirty="0" err="1">
-                <a:solidFill>
-                  <a:srgbClr val="00B0F0"/>
-                </a:solidFill>
-              </a:rPr>
-              <a:t>ST_DWithin</a:t>
-            </a:r>
-            <a:r>
-              <a:rPr lang="en-US" dirty="0">
-                <a:solidFill>
-                  <a:srgbClr val="00B0F0"/>
-                </a:solidFill>
-              </a:rPr>
-              <a:t>(</a:t>
-            </a:r>
-            <a:r>
-              <a:rPr lang="en-US" dirty="0" err="1">
-                <a:solidFill>
-                  <a:srgbClr val="00B0F0"/>
-                </a:solidFill>
-              </a:rPr>
-              <a:t>st.geometry</a:t>
-            </a:r>
-            <a:r>
-              <a:rPr lang="en-US" dirty="0">
-                <a:solidFill>
-                  <a:srgbClr val="00B0F0"/>
-                </a:solidFill>
-              </a:rPr>
-              <a:t>, </a:t>
-            </a:r>
-            <a:r>
-              <a:rPr lang="en-US" dirty="0" err="1">
-                <a:solidFill>
-                  <a:srgbClr val="00B0F0"/>
-                </a:solidFill>
-              </a:rPr>
-              <a:t>s.geometry</a:t>
-            </a:r>
-            <a:r>
-              <a:rPr lang="en-US" dirty="0">
-                <a:solidFill>
-                  <a:srgbClr val="00B0F0"/>
-                </a:solidFill>
-              </a:rPr>
-              <a:t>, 300)  AND </a:t>
-            </a:r>
-            <a:r>
-              <a:rPr lang="en-US" dirty="0" err="1">
-                <a:solidFill>
-                  <a:srgbClr val="00B0F0"/>
-                </a:solidFill>
-              </a:rPr>
-              <a:t>st.BOROUGH</a:t>
-            </a:r>
-            <a:r>
-              <a:rPr lang="en-US" dirty="0">
-                <a:solidFill>
-                  <a:srgbClr val="00B0F0"/>
-                </a:solidFill>
-              </a:rPr>
-              <a:t> = 'Manhattan'  AND </a:t>
             </a:r>
             <a:r>
               <a:rPr lang="en-US" dirty="0" err="1">
@@ -6671,476 +6639,7 @@
     </p:spTree>
     <p:extLst>
       <p:ext uri="{BB962C8B-B14F-4D97-AF65-F5344CB8AC3E}">
-        <p14:creationId xmlns:p14="http://schemas.microsoft.com/office/powerpoint/2010/main" val="3118275270"/>
-      </p:ext>
-    </p:extLst>
-  </p:cSld>
-  <p:clrMapOvr>
-    <a:masterClrMapping/>
-  </p:clrMapOvr>
-</p:sld>
-</file>
-
-<file path=ppt/slides/slide18.xml><?xml version="1.0" encoding="utf-8"?>
-<p:sld xmlns:a="http://schemas.openxmlformats.org/drawingml/2006/main" xmlns:r="http://schemas.openxmlformats.org/officeDocument/2006/relationships" xmlns:p="http://schemas.openxmlformats.org/presentationml/2006/main">
-  <p:cSld>
-    <p:spTree>
-      <p:nvGrpSpPr>
-        <p:cNvPr id="1" name=""/>
-        <p:cNvGrpSpPr/>
-        <p:nvPr/>
-      </p:nvGrpSpPr>
-      <p:grpSpPr>
-        <a:xfrm>
-          <a:off x="0" y="0"/>
-          <a:ext cx="0" cy="0"/>
-          <a:chOff x="0" y="0"/>
-          <a:chExt cx="0" cy="0"/>
-        </a:xfrm>
-      </p:grpSpPr>
-      <p:sp>
-        <p:nvSpPr>
-          <p:cNvPr id="2" name="Title 1">
-            <a:extLst>
-              <a:ext uri="{FF2B5EF4-FFF2-40B4-BE49-F238E27FC236}">
-                <a16:creationId xmlns:a16="http://schemas.microsoft.com/office/drawing/2014/main" id="{64E36CD5-3DBF-BAE6-7CF6-585C5F525485}"/>
-              </a:ext>
-            </a:extLst>
-          </p:cNvPr>
-          <p:cNvSpPr>
-            <a:spLocks noGrp="1"/>
-          </p:cNvSpPr>
-          <p:nvPr>
-            <p:ph type="title"/>
-          </p:nvPr>
-        </p:nvSpPr>
-        <p:spPr/>
-        <p:txBody>
-          <a:bodyPr/>
-          <a:lstStyle/>
-          <a:p>
-            <a:r>
-              <a:rPr lang="en-US" dirty="0"/>
-              <a:t>TOOLS IN PGADMIN 4 – MATERIALIZED VIEWS</a:t>
-            </a:r>
-          </a:p>
-        </p:txBody>
-      </p:sp>
-      <p:sp>
-        <p:nvSpPr>
-          <p:cNvPr id="3" name="Content Placeholder 2">
-            <a:extLst>
-              <a:ext uri="{FF2B5EF4-FFF2-40B4-BE49-F238E27FC236}">
-                <a16:creationId xmlns:a16="http://schemas.microsoft.com/office/drawing/2014/main" id="{861D47DB-0F47-DE91-A1F8-68D7581EF238}"/>
-              </a:ext>
-            </a:extLst>
-          </p:cNvPr>
-          <p:cNvSpPr>
-            <a:spLocks noGrp="1"/>
-          </p:cNvSpPr>
-          <p:nvPr>
-            <p:ph idx="1"/>
-          </p:nvPr>
-        </p:nvSpPr>
-        <p:spPr>
-          <a:xfrm>
-            <a:off x="581192" y="2340864"/>
-            <a:ext cx="11029615" cy="1935861"/>
-          </a:xfrm>
-        </p:spPr>
-        <p:txBody>
-          <a:bodyPr/>
-          <a:lstStyle/>
-          <a:p>
-            <a:r>
-              <a:rPr lang="en-US" dirty="0"/>
-              <a:t>Create materialized views to store complex buffer analysis results for faster querying.</a:t>
-            </a:r>
-          </a:p>
-          <a:p>
-            <a:pPr marL="324000" lvl="1" indent="0">
-              <a:buNone/>
-            </a:pPr>
-            <a:r>
-              <a:rPr lang="en-US" dirty="0">
-                <a:solidFill>
-                  <a:srgbClr val="00B0F0"/>
-                </a:solidFill>
-              </a:rPr>
-              <a:t>CREATE MATERIALIZED VIEW ch05.station_buffers AS </a:t>
-            </a:r>
-          </a:p>
-          <a:p>
-            <a:pPr marL="324000" lvl="1" indent="0">
-              <a:buNone/>
-            </a:pPr>
-            <a:r>
-              <a:rPr lang="en-US" dirty="0">
-                <a:solidFill>
-                  <a:srgbClr val="00B0F0"/>
-                </a:solidFill>
-              </a:rPr>
-              <a:t>SELECT NAME, </a:t>
-            </a:r>
-            <a:r>
-              <a:rPr lang="en-US" dirty="0" err="1">
-                <a:solidFill>
-                  <a:srgbClr val="00B0F0"/>
-                </a:solidFill>
-              </a:rPr>
-              <a:t>ST_Buffer</a:t>
-            </a:r>
-            <a:r>
-              <a:rPr lang="en-US" dirty="0">
-                <a:solidFill>
-                  <a:srgbClr val="00B0F0"/>
-                </a:solidFill>
-              </a:rPr>
-              <a:t>(geometry, 300) AS </a:t>
-            </a:r>
-            <a:r>
-              <a:rPr lang="en-US" dirty="0" err="1">
-                <a:solidFill>
-                  <a:srgbClr val="00B0F0"/>
-                </a:solidFill>
-              </a:rPr>
-              <a:t>buffer_geom</a:t>
-            </a:r>
-            <a:r>
-              <a:rPr lang="en-US" dirty="0">
-                <a:solidFill>
-                  <a:srgbClr val="00B0F0"/>
-                </a:solidFill>
-              </a:rPr>
-              <a:t> </a:t>
-            </a:r>
-          </a:p>
-          <a:p>
-            <a:pPr marL="324000" lvl="1" indent="0">
-              <a:buNone/>
-            </a:pPr>
-            <a:r>
-              <a:rPr lang="en-US" dirty="0">
-                <a:solidFill>
-                  <a:srgbClr val="00B0F0"/>
-                </a:solidFill>
-              </a:rPr>
-              <a:t>FROM ch05.nyc_subway_stations;</a:t>
-            </a:r>
-          </a:p>
-        </p:txBody>
-      </p:sp>
-    </p:spTree>
-    <p:extLst>
-      <p:ext uri="{BB962C8B-B14F-4D97-AF65-F5344CB8AC3E}">
-        <p14:creationId xmlns:p14="http://schemas.microsoft.com/office/powerpoint/2010/main" val="2854411829"/>
-      </p:ext>
-    </p:extLst>
-  </p:cSld>
-  <p:clrMapOvr>
-    <a:masterClrMapping/>
-  </p:clrMapOvr>
-</p:sld>
-</file>
-
-<file path=ppt/slides/slide19.xml><?xml version="1.0" encoding="utf-8"?>
-<p:sld xmlns:a="http://schemas.openxmlformats.org/drawingml/2006/main" xmlns:r="http://schemas.openxmlformats.org/officeDocument/2006/relationships" xmlns:p="http://schemas.openxmlformats.org/presentationml/2006/main">
-  <p:cSld>
-    <p:spTree>
-      <p:nvGrpSpPr>
-        <p:cNvPr id="1" name=""/>
-        <p:cNvGrpSpPr/>
-        <p:nvPr/>
-      </p:nvGrpSpPr>
-      <p:grpSpPr>
-        <a:xfrm>
-          <a:off x="0" y="0"/>
-          <a:ext cx="0" cy="0"/>
-          <a:chOff x="0" y="0"/>
-          <a:chExt cx="0" cy="0"/>
-        </a:xfrm>
-      </p:grpSpPr>
-      <p:sp>
-        <p:nvSpPr>
-          <p:cNvPr id="2" name="Title 1">
-            <a:extLst>
-              <a:ext uri="{FF2B5EF4-FFF2-40B4-BE49-F238E27FC236}">
-                <a16:creationId xmlns:a16="http://schemas.microsoft.com/office/drawing/2014/main" id="{E0EC588A-D6DE-08A3-EFFB-AF7F0822DC33}"/>
-              </a:ext>
-            </a:extLst>
-          </p:cNvPr>
-          <p:cNvSpPr>
-            <a:spLocks noGrp="1"/>
-          </p:cNvSpPr>
-          <p:nvPr>
-            <p:ph type="title"/>
-          </p:nvPr>
-        </p:nvSpPr>
-        <p:spPr/>
-        <p:txBody>
-          <a:bodyPr/>
-          <a:lstStyle/>
-          <a:p>
-            <a:r>
-              <a:rPr lang="en-US" dirty="0"/>
-              <a:t>TOOLS IN PGADMIN 4 - FUNCTIONS</a:t>
-            </a:r>
-          </a:p>
-        </p:txBody>
-      </p:sp>
-      <p:sp>
-        <p:nvSpPr>
-          <p:cNvPr id="3" name="Content Placeholder 2">
-            <a:extLst>
-              <a:ext uri="{FF2B5EF4-FFF2-40B4-BE49-F238E27FC236}">
-                <a16:creationId xmlns:a16="http://schemas.microsoft.com/office/drawing/2014/main" id="{BE6037DF-D050-5883-3EC2-3BDD696D1E25}"/>
-              </a:ext>
-            </a:extLst>
-          </p:cNvPr>
-          <p:cNvSpPr>
-            <a:spLocks noGrp="1"/>
-          </p:cNvSpPr>
-          <p:nvPr>
-            <p:ph idx="1"/>
-          </p:nvPr>
-        </p:nvSpPr>
-        <p:spPr/>
-        <p:txBody>
-          <a:bodyPr>
-            <a:normAutofit lnSpcReduction="10000"/>
-          </a:bodyPr>
-          <a:lstStyle/>
-          <a:p>
-            <a:r>
-              <a:rPr lang="en-US" dirty="0"/>
-              <a:t>Write custom SQL functions to automate repetitive buffer analysis tasks.</a:t>
-            </a:r>
-          </a:p>
-          <a:p>
-            <a:endParaRPr lang="en-US" dirty="0"/>
-          </a:p>
-          <a:p>
-            <a:pPr marL="324000" lvl="1" indent="0">
-              <a:buNone/>
-            </a:pPr>
-            <a:r>
-              <a:rPr lang="en-US" dirty="0">
-                <a:solidFill>
-                  <a:srgbClr val="00B0F0"/>
-                </a:solidFill>
-              </a:rPr>
-              <a:t>CREATE FUNCTION ch05.get_stations_within_buffer(distance FLOAT) </a:t>
-            </a:r>
-          </a:p>
-          <a:p>
-            <a:pPr marL="324000" lvl="1" indent="0">
-              <a:buNone/>
-            </a:pPr>
-            <a:r>
-              <a:rPr lang="en-US" dirty="0">
-                <a:solidFill>
-                  <a:srgbClr val="00B0F0"/>
-                </a:solidFill>
-              </a:rPr>
-              <a:t>RETURNS TABLE(</a:t>
-            </a:r>
-            <a:r>
-              <a:rPr lang="en-US" dirty="0" err="1">
-                <a:solidFill>
-                  <a:srgbClr val="00B0F0"/>
-                </a:solidFill>
-              </a:rPr>
-              <a:t>station_name</a:t>
-            </a:r>
-            <a:r>
-              <a:rPr lang="en-US" dirty="0">
-                <a:solidFill>
-                  <a:srgbClr val="00B0F0"/>
-                </a:solidFill>
-              </a:rPr>
-              <a:t> TEXT, </a:t>
-            </a:r>
-            <a:r>
-              <a:rPr lang="en-US" dirty="0" err="1">
-                <a:solidFill>
-                  <a:srgbClr val="00B0F0"/>
-                </a:solidFill>
-              </a:rPr>
-              <a:t>street_name</a:t>
-            </a:r>
-            <a:r>
-              <a:rPr lang="en-US" dirty="0">
-                <a:solidFill>
-                  <a:srgbClr val="00B0F0"/>
-                </a:solidFill>
-              </a:rPr>
-              <a:t> TEXT) AS $$</a:t>
-            </a:r>
-          </a:p>
-          <a:p>
-            <a:pPr marL="324000" lvl="1" indent="0">
-              <a:buNone/>
-            </a:pPr>
-            <a:r>
-              <a:rPr lang="en-US" dirty="0">
-                <a:solidFill>
-                  <a:srgbClr val="00B0F0"/>
-                </a:solidFill>
-              </a:rPr>
-              <a:t>BEGIN  </a:t>
-            </a:r>
-          </a:p>
-          <a:p>
-            <a:pPr marL="324000" lvl="1" indent="0">
-              <a:buNone/>
-            </a:pPr>
-            <a:r>
-              <a:rPr lang="en-US" dirty="0">
-                <a:solidFill>
-                  <a:srgbClr val="00B0F0"/>
-                </a:solidFill>
-              </a:rPr>
-              <a:t>RETURN QUERY   </a:t>
-            </a:r>
-          </a:p>
-          <a:p>
-            <a:pPr marL="324000" lvl="1" indent="0">
-              <a:buNone/>
-            </a:pPr>
-            <a:r>
-              <a:rPr lang="en-US" dirty="0">
-                <a:solidFill>
-                  <a:srgbClr val="00B0F0"/>
-                </a:solidFill>
-              </a:rPr>
-              <a:t>SELECT st.NAME, s.NAME   </a:t>
-            </a:r>
-          </a:p>
-          <a:p>
-            <a:pPr marL="324000" lvl="1" indent="0">
-              <a:buNone/>
-            </a:pPr>
-            <a:r>
-              <a:rPr lang="en-US" dirty="0">
-                <a:solidFill>
-                  <a:srgbClr val="00B0F0"/>
-                </a:solidFill>
-              </a:rPr>
-              <a:t>FROM ch05.nyc_subway_stations </a:t>
-            </a:r>
-            <a:r>
-              <a:rPr lang="en-US" dirty="0" err="1">
-                <a:solidFill>
-                  <a:srgbClr val="00B0F0"/>
-                </a:solidFill>
-              </a:rPr>
-              <a:t>st</a:t>
-            </a:r>
-            <a:r>
-              <a:rPr lang="en-US" dirty="0">
-                <a:solidFill>
-                  <a:srgbClr val="00B0F0"/>
-                </a:solidFill>
-              </a:rPr>
-              <a:t>, ch05.nyc_streets s   </a:t>
-            </a:r>
-          </a:p>
-          <a:p>
-            <a:pPr marL="324000" lvl="1" indent="0">
-              <a:buNone/>
-            </a:pPr>
-            <a:r>
-              <a:rPr lang="en-US" dirty="0">
-                <a:solidFill>
-                  <a:srgbClr val="00B0F0"/>
-                </a:solidFill>
-              </a:rPr>
-              <a:t>WHERE </a:t>
-            </a:r>
-            <a:r>
-              <a:rPr lang="en-US" dirty="0" err="1">
-                <a:solidFill>
-                  <a:srgbClr val="00B0F0"/>
-                </a:solidFill>
-              </a:rPr>
-              <a:t>ST_DWithin</a:t>
-            </a:r>
-            <a:r>
-              <a:rPr lang="en-US" dirty="0">
-                <a:solidFill>
-                  <a:srgbClr val="00B0F0"/>
-                </a:solidFill>
-              </a:rPr>
-              <a:t>(</a:t>
-            </a:r>
-            <a:r>
-              <a:rPr lang="en-US" dirty="0" err="1">
-                <a:solidFill>
-                  <a:srgbClr val="00B0F0"/>
-                </a:solidFill>
-              </a:rPr>
-              <a:t>st.geometry</a:t>
-            </a:r>
-            <a:r>
-              <a:rPr lang="en-US" dirty="0">
-                <a:solidFill>
-                  <a:srgbClr val="00B0F0"/>
-                </a:solidFill>
-              </a:rPr>
-              <a:t>, </a:t>
-            </a:r>
-            <a:r>
-              <a:rPr lang="en-US" dirty="0" err="1">
-                <a:solidFill>
-                  <a:srgbClr val="00B0F0"/>
-                </a:solidFill>
-              </a:rPr>
-              <a:t>s.geometry</a:t>
-            </a:r>
-            <a:r>
-              <a:rPr lang="en-US" dirty="0">
-                <a:solidFill>
-                  <a:srgbClr val="00B0F0"/>
-                </a:solidFill>
-              </a:rPr>
-              <a:t>, distance);</a:t>
-            </a:r>
-          </a:p>
-          <a:p>
-            <a:pPr marL="324000" lvl="1" indent="0">
-              <a:buNone/>
-            </a:pPr>
-            <a:r>
-              <a:rPr lang="en-US" dirty="0">
-                <a:solidFill>
-                  <a:srgbClr val="00B0F0"/>
-                </a:solidFill>
-              </a:rPr>
-              <a:t>END;$$ LANGUAGE </a:t>
-            </a:r>
-            <a:r>
-              <a:rPr lang="en-US" dirty="0" err="1">
-                <a:solidFill>
-                  <a:srgbClr val="00B0F0"/>
-                </a:solidFill>
-              </a:rPr>
-              <a:t>plpgsql</a:t>
-            </a:r>
-            <a:r>
-              <a:rPr lang="en-US" dirty="0">
-                <a:solidFill>
-                  <a:srgbClr val="00B0F0"/>
-                </a:solidFill>
-              </a:rPr>
-              <a:t>;</a:t>
-            </a:r>
-          </a:p>
-        </p:txBody>
-      </p:sp>
-    </p:spTree>
-    <p:extLst>
-      <p:ext uri="{BB962C8B-B14F-4D97-AF65-F5344CB8AC3E}">
-        <p14:creationId xmlns:p14="http://schemas.microsoft.com/office/powerpoint/2010/main" val="2221672660"/>
+        <p14:creationId xmlns:p14="http://schemas.microsoft.com/office/powerpoint/2010/main" val="3857661707"/>
       </p:ext>
     </p:extLst>
   </p:cSld>
@@ -7376,285 +6875,6 @@
     <p:extLst>
       <p:ext uri="{BB962C8B-B14F-4D97-AF65-F5344CB8AC3E}">
         <p14:creationId xmlns:p14="http://schemas.microsoft.com/office/powerpoint/2010/main" val="1888964802"/>
-      </p:ext>
-    </p:extLst>
-  </p:cSld>
-  <p:clrMapOvr>
-    <a:masterClrMapping/>
-  </p:clrMapOvr>
-</p:sld>
-</file>
-
-<file path=ppt/slides/slide20.xml><?xml version="1.0" encoding="utf-8"?>
-<p:sld xmlns:a="http://schemas.openxmlformats.org/drawingml/2006/main" xmlns:r="http://schemas.openxmlformats.org/officeDocument/2006/relationships" xmlns:p="http://schemas.openxmlformats.org/presentationml/2006/main">
-  <p:cSld>
-    <p:spTree>
-      <p:nvGrpSpPr>
-        <p:cNvPr id="1" name=""/>
-        <p:cNvGrpSpPr/>
-        <p:nvPr/>
-      </p:nvGrpSpPr>
-      <p:grpSpPr>
-        <a:xfrm>
-          <a:off x="0" y="0"/>
-          <a:ext cx="0" cy="0"/>
-          <a:chOff x="0" y="0"/>
-          <a:chExt cx="0" cy="0"/>
-        </a:xfrm>
-      </p:grpSpPr>
-      <p:sp>
-        <p:nvSpPr>
-          <p:cNvPr id="2" name="Title 1">
-            <a:extLst>
-              <a:ext uri="{FF2B5EF4-FFF2-40B4-BE49-F238E27FC236}">
-                <a16:creationId xmlns:a16="http://schemas.microsoft.com/office/drawing/2014/main" id="{6AFDAB0B-1269-9F6C-D8A0-E3650409C648}"/>
-              </a:ext>
-            </a:extLst>
-          </p:cNvPr>
-          <p:cNvSpPr>
-            <a:spLocks noGrp="1"/>
-          </p:cNvSpPr>
-          <p:nvPr>
-            <p:ph type="title"/>
-          </p:nvPr>
-        </p:nvSpPr>
-        <p:spPr/>
-        <p:txBody>
-          <a:bodyPr/>
-          <a:lstStyle/>
-          <a:p>
-            <a:r>
-              <a:rPr lang="en-US" dirty="0"/>
-              <a:t>TOOLS IN PGADMIN 4 - VIEWS</a:t>
-            </a:r>
-          </a:p>
-        </p:txBody>
-      </p:sp>
-      <p:sp>
-        <p:nvSpPr>
-          <p:cNvPr id="3" name="Content Placeholder 2">
-            <a:extLst>
-              <a:ext uri="{FF2B5EF4-FFF2-40B4-BE49-F238E27FC236}">
-                <a16:creationId xmlns:a16="http://schemas.microsoft.com/office/drawing/2014/main" id="{57CF7F19-5B2B-AB2D-263A-2A3D1302199B}"/>
-              </a:ext>
-            </a:extLst>
-          </p:cNvPr>
-          <p:cNvSpPr>
-            <a:spLocks noGrp="1"/>
-          </p:cNvSpPr>
-          <p:nvPr>
-            <p:ph idx="1"/>
-          </p:nvPr>
-        </p:nvSpPr>
-        <p:spPr/>
-        <p:txBody>
-          <a:bodyPr/>
-          <a:lstStyle/>
-          <a:p>
-            <a:r>
-              <a:rPr lang="en-US" dirty="0"/>
-              <a:t>Simplify complex queries with views for better data visualization.</a:t>
-            </a:r>
-          </a:p>
-          <a:p>
-            <a:endParaRPr lang="en-US" dirty="0"/>
-          </a:p>
-          <a:p>
-            <a:pPr marL="594000" lvl="2" indent="0">
-              <a:buNone/>
-            </a:pPr>
-            <a:r>
-              <a:rPr lang="en-US" dirty="0">
-                <a:solidFill>
-                  <a:srgbClr val="00B0F0"/>
-                </a:solidFill>
-              </a:rPr>
-              <a:t>CREATE VIEW ch05.residential_near_stations AS </a:t>
-            </a:r>
-          </a:p>
-          <a:p>
-            <a:pPr marL="594000" lvl="2" indent="0">
-              <a:buNone/>
-            </a:pPr>
-            <a:r>
-              <a:rPr lang="en-US" dirty="0">
-                <a:solidFill>
-                  <a:srgbClr val="00B0F0"/>
-                </a:solidFill>
-              </a:rPr>
-              <a:t>SELECT s.NAME AS </a:t>
-            </a:r>
-            <a:r>
-              <a:rPr lang="en-US" dirty="0" err="1">
-                <a:solidFill>
-                  <a:srgbClr val="00B0F0"/>
-                </a:solidFill>
-              </a:rPr>
-              <a:t>street_name</a:t>
-            </a:r>
-            <a:r>
-              <a:rPr lang="en-US" dirty="0">
-                <a:solidFill>
-                  <a:srgbClr val="00B0F0"/>
-                </a:solidFill>
-              </a:rPr>
-              <a:t>, st.NAME AS </a:t>
-            </a:r>
-            <a:r>
-              <a:rPr lang="en-US" dirty="0" err="1">
-                <a:solidFill>
-                  <a:srgbClr val="00B0F0"/>
-                </a:solidFill>
-              </a:rPr>
-              <a:t>station_name</a:t>
-            </a:r>
-            <a:r>
-              <a:rPr lang="en-US" dirty="0">
-                <a:solidFill>
-                  <a:srgbClr val="00B0F0"/>
-                </a:solidFill>
-              </a:rPr>
-              <a:t> </a:t>
-            </a:r>
-          </a:p>
-          <a:p>
-            <a:pPr marL="594000" lvl="2" indent="0">
-              <a:buNone/>
-            </a:pPr>
-            <a:r>
-              <a:rPr lang="en-US" dirty="0">
-                <a:solidFill>
-                  <a:srgbClr val="00B0F0"/>
-                </a:solidFill>
-              </a:rPr>
-              <a:t>FROM ch05.nyc_streets s </a:t>
-            </a:r>
-          </a:p>
-          <a:p>
-            <a:pPr marL="594000" lvl="2" indent="0">
-              <a:buNone/>
-            </a:pPr>
-            <a:r>
-              <a:rPr lang="en-US" dirty="0">
-                <a:solidFill>
-                  <a:srgbClr val="00B0F0"/>
-                </a:solidFill>
-              </a:rPr>
-              <a:t>JOIN ch05.nyc_subway_stations </a:t>
-            </a:r>
-            <a:r>
-              <a:rPr lang="en-US" dirty="0" err="1">
-                <a:solidFill>
-                  <a:srgbClr val="00B0F0"/>
-                </a:solidFill>
-              </a:rPr>
-              <a:t>st</a:t>
-            </a:r>
-            <a:r>
-              <a:rPr lang="en-US" dirty="0">
-                <a:solidFill>
-                  <a:srgbClr val="00B0F0"/>
-                </a:solidFill>
-              </a:rPr>
-              <a:t> </a:t>
-            </a:r>
-          </a:p>
-          <a:p>
-            <a:pPr marL="594000" lvl="2" indent="0">
-              <a:buNone/>
-            </a:pPr>
-            <a:r>
-              <a:rPr lang="en-US" dirty="0">
-                <a:solidFill>
-                  <a:srgbClr val="00B0F0"/>
-                </a:solidFill>
-              </a:rPr>
-              <a:t>ON </a:t>
-            </a:r>
-            <a:r>
-              <a:rPr lang="en-US" dirty="0" err="1">
-                <a:solidFill>
-                  <a:srgbClr val="00B0F0"/>
-                </a:solidFill>
-              </a:rPr>
-              <a:t>ST_DWithin</a:t>
-            </a:r>
-            <a:r>
-              <a:rPr lang="en-US" dirty="0">
-                <a:solidFill>
-                  <a:srgbClr val="00B0F0"/>
-                </a:solidFill>
-              </a:rPr>
-              <a:t>(</a:t>
-            </a:r>
-            <a:r>
-              <a:rPr lang="en-US" dirty="0" err="1">
-                <a:solidFill>
-                  <a:srgbClr val="00B0F0"/>
-                </a:solidFill>
-              </a:rPr>
-              <a:t>s.geometry</a:t>
-            </a:r>
-            <a:r>
-              <a:rPr lang="en-US" dirty="0">
-                <a:solidFill>
-                  <a:srgbClr val="00B0F0"/>
-                </a:solidFill>
-              </a:rPr>
-              <a:t>, </a:t>
-            </a:r>
-            <a:r>
-              <a:rPr lang="en-US" dirty="0" err="1">
-                <a:solidFill>
-                  <a:srgbClr val="00B0F0"/>
-                </a:solidFill>
-              </a:rPr>
-              <a:t>st.geometry</a:t>
-            </a:r>
-            <a:r>
-              <a:rPr lang="en-US" dirty="0">
-                <a:solidFill>
-                  <a:srgbClr val="00B0F0"/>
-                </a:solidFill>
-              </a:rPr>
-              <a:t>, 300) </a:t>
-            </a:r>
-          </a:p>
-          <a:p>
-            <a:pPr marL="594000" lvl="2" indent="0">
-              <a:buNone/>
-            </a:pPr>
-            <a:r>
-              <a:rPr lang="en-US" dirty="0">
-                <a:solidFill>
-                  <a:srgbClr val="00B0F0"/>
-                </a:solidFill>
-              </a:rPr>
-              <a:t>WHERE </a:t>
-            </a:r>
-            <a:r>
-              <a:rPr lang="en-US" dirty="0" err="1">
-                <a:solidFill>
-                  <a:srgbClr val="00B0F0"/>
-                </a:solidFill>
-              </a:rPr>
-              <a:t>s.TYPE</a:t>
-            </a:r>
-            <a:r>
-              <a:rPr lang="en-US" dirty="0">
-                <a:solidFill>
-                  <a:srgbClr val="00B0F0"/>
-                </a:solidFill>
-              </a:rPr>
-              <a:t> = 'residential';</a:t>
-            </a:r>
-          </a:p>
-        </p:txBody>
-      </p:sp>
-    </p:spTree>
-    <p:extLst>
-      <p:ext uri="{BB962C8B-B14F-4D97-AF65-F5344CB8AC3E}">
-        <p14:creationId xmlns:p14="http://schemas.microsoft.com/office/powerpoint/2010/main" val="3857661707"/>
       </p:ext>
     </p:extLst>
   </p:cSld>
@@ -8511,7 +7731,7 @@
                   <a:srgbClr val="00B0F0"/>
                 </a:solidFill>
               </a:rPr>
-              <a:t>SELECT name, </a:t>
+              <a:t>SELECT street.name, </a:t>
             </a:r>
             <a:r>
               <a:rPr lang="en-US" sz="1800" dirty="0" err="1">
@@ -8519,7 +7739,7 @@
                   <a:srgbClr val="00B0F0"/>
                 </a:solidFill>
               </a:rPr>
-              <a:t>borough_name</a:t>
+              <a:t>subway.borough</a:t>
             </a:r>
             <a:endParaRPr lang="en-US" sz="1800" dirty="0">
               <a:solidFill>
@@ -8537,7 +7757,7 @@
                   <a:srgbClr val="00B0F0"/>
                 </a:solidFill>
               </a:rPr>
-              <a:t>FROM ch05.streets , ch05.subway</a:t>
+              <a:t>FROM ch05.streets AS street, ch05.subway AS subway</a:t>
             </a:r>
           </a:p>
           <a:p>
@@ -8566,7 +7786,7 @@
                   <a:srgbClr val="00B0F0"/>
                 </a:solidFill>
               </a:rPr>
-              <a:t>(ch05.streets.geom, </a:t>
+              <a:t>(</a:t>
             </a:r>
             <a:r>
               <a:rPr lang="en-US" sz="1800" dirty="0" err="1">
@@ -8574,6 +7794,22 @@
                   <a:srgbClr val="00B0F0"/>
                 </a:solidFill>
               </a:rPr>
+              <a:t>street.geom</a:t>
+            </a:r>
+            <a:r>
+              <a:rPr lang="en-US" sz="1800" dirty="0">
+                <a:solidFill>
+                  <a:srgbClr val="00B0F0"/>
+                </a:solidFill>
+              </a:rPr>
+              <a:t>, </a:t>
+            </a:r>
+            <a:r>
+              <a:rPr lang="en-US" sz="1800" dirty="0" err="1">
+                <a:solidFill>
+                  <a:srgbClr val="00B0F0"/>
+                </a:solidFill>
+              </a:rPr>
               <a:t>ST_Buffer</a:t>
             </a:r>
             <a:r>
@@ -8582,7 +7818,23 @@
                   <a:srgbClr val="00B0F0"/>
                 </a:solidFill>
               </a:rPr>
-              <a:t>(ch05.subway.geom, 50))</a:t>
+              <a:t>(</a:t>
+            </a:r>
+            <a:r>
+              <a:rPr lang="en-US" sz="1800" dirty="0" err="1">
+                <a:solidFill>
+                  <a:srgbClr val="00B0F0"/>
+                </a:solidFill>
+              </a:rPr>
+              <a:t>subway.geom</a:t>
+            </a:r>
+            <a:r>
+              <a:rPr lang="en-US" sz="1800" dirty="0">
+                <a:solidFill>
+                  <a:srgbClr val="00B0F0"/>
+                </a:solidFill>
+              </a:rPr>
+              <a:t>, 50));</a:t>
             </a:r>
           </a:p>
         </p:txBody>
@@ -8929,7 +8181,7 @@
                   <a:srgbClr val="00B0F0"/>
                 </a:solidFill>
               </a:rPr>
-              <a:t>boroname</a:t>
+              <a:t>nbh.boroname</a:t>
             </a:r>
             <a:r>
               <a:rPr lang="en-US" sz="2000" dirty="0">
@@ -8963,7 +8215,23 @@
                   <a:srgbClr val="00B0F0"/>
                 </a:solidFill>
               </a:rPr>
-              <a:t>FROM ch05.neighborhoods, ch05.subway</a:t>
+              <a:t>FROM ch05.neighborhoods AS </a:t>
+            </a:r>
+            <a:r>
+              <a:rPr lang="en-US" sz="2000" dirty="0" err="1">
+                <a:solidFill>
+                  <a:srgbClr val="00B0F0"/>
+                </a:solidFill>
+              </a:rPr>
+              <a:t>nbh</a:t>
+            </a:r>
+            <a:r>
+              <a:rPr lang="en-US" sz="2000" dirty="0">
+                <a:solidFill>
+                  <a:srgbClr val="00B0F0"/>
+                </a:solidFill>
+              </a:rPr>
+              <a:t>, ch05.subway as subway</a:t>
             </a:r>
           </a:p>
           <a:p>
@@ -8992,7 +8260,39 @@
                   <a:srgbClr val="00B0F0"/>
                 </a:solidFill>
               </a:rPr>
-              <a:t>(ch05.neighborhoods.geom, ch05.subway.geom)</a:t>
+              <a:t>(</a:t>
+            </a:r>
+            <a:r>
+              <a:rPr lang="en-US" sz="2000" dirty="0" err="1">
+                <a:solidFill>
+                  <a:srgbClr val="00B0F0"/>
+                </a:solidFill>
+              </a:rPr>
+              <a:t>nbh.geom</a:t>
+            </a:r>
+            <a:r>
+              <a:rPr lang="en-US" sz="2000" dirty="0">
+                <a:solidFill>
+                  <a:srgbClr val="00B0F0"/>
+                </a:solidFill>
+              </a:rPr>
+              <a:t>, </a:t>
+            </a:r>
+            <a:r>
+              <a:rPr lang="en-US" sz="2000" dirty="0" err="1">
+                <a:solidFill>
+                  <a:srgbClr val="00B0F0"/>
+                </a:solidFill>
+              </a:rPr>
+              <a:t>subway.geom</a:t>
+            </a:r>
+            <a:r>
+              <a:rPr lang="en-US" sz="2000" dirty="0">
+                <a:solidFill>
+                  <a:srgbClr val="00B0F0"/>
+                </a:solidFill>
+              </a:rPr>
+              <a:t>)</a:t>
             </a:r>
           </a:p>
           <a:p>
@@ -9122,8 +8422,8 @@
         </p:nvSpPr>
         <p:spPr>
           <a:xfrm>
-            <a:off x="581191" y="1369314"/>
-            <a:ext cx="11029615" cy="2497836"/>
+            <a:off x="581191" y="1369313"/>
+            <a:ext cx="11029615" cy="3174111"/>
           </a:xfrm>
         </p:spPr>
         <p:txBody>
@@ -9134,7 +8434,7 @@
           <a:p>
             <a:r>
               <a:rPr lang="en-US" sz="2000" dirty="0"/>
-              <a:t>Identify neighborhoods with more than 3 subway stations</a:t>
+              <a:t>Identify neighborhoods with more than 100 subway stations</a:t>
             </a:r>
           </a:p>
           <a:p>
@@ -9155,7 +8455,7 @@
                   <a:srgbClr val="00B0F0"/>
                 </a:solidFill>
               </a:rPr>
-              <a:t>boroname</a:t>
+              <a:t>nbh.boroname</a:t>
             </a:r>
             <a:r>
               <a:rPr lang="en-US" sz="1800" dirty="0">
@@ -9189,7 +8489,23 @@
                   <a:srgbClr val="00B0F0"/>
                 </a:solidFill>
               </a:rPr>
-              <a:t>FROM ch05.neighborhoods, ch05.subway</a:t>
+              <a:t>FROM ch05.neighborhoods AS </a:t>
+            </a:r>
+            <a:r>
+              <a:rPr lang="en-US" sz="1800" dirty="0" err="1">
+                <a:solidFill>
+                  <a:srgbClr val="00B0F0"/>
+                </a:solidFill>
+              </a:rPr>
+              <a:t>nbh</a:t>
+            </a:r>
+            <a:r>
+              <a:rPr lang="en-US" sz="1800" dirty="0">
+                <a:solidFill>
+                  <a:srgbClr val="00B0F0"/>
+                </a:solidFill>
+              </a:rPr>
+              <a:t>, ch05.subway as subway</a:t>
             </a:r>
           </a:p>
           <a:p>
@@ -9218,7 +8534,39 @@
                   <a:srgbClr val="00B0F0"/>
                 </a:solidFill>
               </a:rPr>
-              <a:t>(ch05.neighborhoods.geom, ch05.subway.geom)</a:t>
+              <a:t>(</a:t>
+            </a:r>
+            <a:r>
+              <a:rPr lang="en-US" sz="1800" dirty="0" err="1">
+                <a:solidFill>
+                  <a:srgbClr val="00B0F0"/>
+                </a:solidFill>
+              </a:rPr>
+              <a:t>nbh.geom</a:t>
+            </a:r>
+            <a:r>
+              <a:rPr lang="en-US" sz="1800" dirty="0">
+                <a:solidFill>
+                  <a:srgbClr val="00B0F0"/>
+                </a:solidFill>
+              </a:rPr>
+              <a:t>, </a:t>
+            </a:r>
+            <a:r>
+              <a:rPr lang="en-US" sz="1800" dirty="0" err="1">
+                <a:solidFill>
+                  <a:srgbClr val="00B0F0"/>
+                </a:solidFill>
+              </a:rPr>
+              <a:t>subway.geom</a:t>
+            </a:r>
+            <a:r>
+              <a:rPr lang="en-US" sz="1800" dirty="0">
+                <a:solidFill>
+                  <a:srgbClr val="00B0F0"/>
+                </a:solidFill>
+              </a:rPr>
+              <a:t>)</a:t>
             </a:r>
           </a:p>
           <a:p>
@@ -9239,15 +8587,25 @@
                   <a:srgbClr val="00B0F0"/>
                 </a:solidFill>
               </a:rPr>
-              <a:t>boronameHAVING</a:t>
-            </a:r>
+              <a:t>boroname</a:t>
+            </a:r>
+            <a:endParaRPr lang="en-US" sz="1800" dirty="0">
+              <a:solidFill>
+                <a:srgbClr val="00B0F0"/>
+              </a:solidFill>
+            </a:endParaRPr>
+          </a:p>
+          <a:p>
+            <a:pPr marL="324000" lvl="1" indent="0">
+              <a:buNone/>
+            </a:pPr>
             <a:r>
               <a:rPr lang="en-US" sz="1800" dirty="0">
                 <a:solidFill>
                   <a:srgbClr val="00B0F0"/>
                 </a:solidFill>
               </a:rPr>
-              <a:t> COUNT(*) &gt; 3;</a:t>
+              <a:t>HAVING COUNT(*) &gt; 100;</a:t>
             </a:r>
           </a:p>
         </p:txBody>

</xml_diff>